<commit_message>
Update chapter 2 figures
</commit_message>
<xml_diff>
--- a/SWWOv3/media/ch3/Figures.pptx
+++ b/SWWOv3/media/ch3/Figures.pptx
@@ -6,9 +6,17 @@
   </p:sldMasterIdLst>
   <p:sldIdLst>
     <p:sldId id="256" r:id="rId2"/>
-    <p:sldId id="257" r:id="rId3"/>
-    <p:sldId id="258" r:id="rId4"/>
-    <p:sldId id="259" r:id="rId5"/>
+    <p:sldId id="260" r:id="rId3"/>
+    <p:sldId id="257" r:id="rId4"/>
+    <p:sldId id="258" r:id="rId5"/>
+    <p:sldId id="259" r:id="rId6"/>
+    <p:sldId id="261" r:id="rId7"/>
+    <p:sldId id="262" r:id="rId8"/>
+    <p:sldId id="263" r:id="rId9"/>
+    <p:sldId id="264" r:id="rId10"/>
+    <p:sldId id="265" r:id="rId11"/>
+    <p:sldId id="266" r:id="rId12"/>
+    <p:sldId id="267" r:id="rId13"/>
   </p:sldIdLst>
   <p:sldSz cx="12192000" cy="6858000"/>
   <p:notesSz cx="6858000" cy="9144000"/>
@@ -107,6 +115,11 @@
       </a:defRPr>
     </a:lvl9pPr>
   </p:defaultTextStyle>
+  <p:extLst>
+    <p:ext uri="{EFAFB233-063F-42B5-8137-9DF3F51BA10A}">
+      <p15:sldGuideLst xmlns:p15="http://schemas.microsoft.com/office/powerpoint/2012/main"/>
+    </p:ext>
+  </p:extLst>
 </p:presentation>
 </file>
 
@@ -257,7 +270,7 @@
           <a:p>
             <a:fld id="{62B5A678-4677-4D59-A4E0-C4230956B236}" type="datetimeFigureOut">
               <a:rPr lang="en-US" smtClean="0"/>
-              <a:t>12/20/2019</a:t>
+              <a:t>12/26/2019</a:t>
             </a:fld>
             <a:endParaRPr lang="en-US"/>
           </a:p>
@@ -455,7 +468,7 @@
           <a:p>
             <a:fld id="{62B5A678-4677-4D59-A4E0-C4230956B236}" type="datetimeFigureOut">
               <a:rPr lang="en-US" smtClean="0"/>
-              <a:t>12/20/2019</a:t>
+              <a:t>12/26/2019</a:t>
             </a:fld>
             <a:endParaRPr lang="en-US"/>
           </a:p>
@@ -663,7 +676,7 @@
           <a:p>
             <a:fld id="{62B5A678-4677-4D59-A4E0-C4230956B236}" type="datetimeFigureOut">
               <a:rPr lang="en-US" smtClean="0"/>
-              <a:t>12/20/2019</a:t>
+              <a:t>12/26/2019</a:t>
             </a:fld>
             <a:endParaRPr lang="en-US"/>
           </a:p>
@@ -861,7 +874,7 @@
           <a:p>
             <a:fld id="{62B5A678-4677-4D59-A4E0-C4230956B236}" type="datetimeFigureOut">
               <a:rPr lang="en-US" smtClean="0"/>
-              <a:t>12/20/2019</a:t>
+              <a:t>12/26/2019</a:t>
             </a:fld>
             <a:endParaRPr lang="en-US"/>
           </a:p>
@@ -1136,7 +1149,7 @@
           <a:p>
             <a:fld id="{62B5A678-4677-4D59-A4E0-C4230956B236}" type="datetimeFigureOut">
               <a:rPr lang="en-US" smtClean="0"/>
-              <a:t>12/20/2019</a:t>
+              <a:t>12/26/2019</a:t>
             </a:fld>
             <a:endParaRPr lang="en-US"/>
           </a:p>
@@ -1401,7 +1414,7 @@
           <a:p>
             <a:fld id="{62B5A678-4677-4D59-A4E0-C4230956B236}" type="datetimeFigureOut">
               <a:rPr lang="en-US" smtClean="0"/>
-              <a:t>12/20/2019</a:t>
+              <a:t>12/26/2019</a:t>
             </a:fld>
             <a:endParaRPr lang="en-US"/>
           </a:p>
@@ -1813,7 +1826,7 @@
           <a:p>
             <a:fld id="{62B5A678-4677-4D59-A4E0-C4230956B236}" type="datetimeFigureOut">
               <a:rPr lang="en-US" smtClean="0"/>
-              <a:t>12/20/2019</a:t>
+              <a:t>12/26/2019</a:t>
             </a:fld>
             <a:endParaRPr lang="en-US"/>
           </a:p>
@@ -1954,7 +1967,7 @@
           <a:p>
             <a:fld id="{62B5A678-4677-4D59-A4E0-C4230956B236}" type="datetimeFigureOut">
               <a:rPr lang="en-US" smtClean="0"/>
-              <a:t>12/20/2019</a:t>
+              <a:t>12/26/2019</a:t>
             </a:fld>
             <a:endParaRPr lang="en-US"/>
           </a:p>
@@ -2067,7 +2080,7 @@
           <a:p>
             <a:fld id="{62B5A678-4677-4D59-A4E0-C4230956B236}" type="datetimeFigureOut">
               <a:rPr lang="en-US" smtClean="0"/>
-              <a:t>12/20/2019</a:t>
+              <a:t>12/26/2019</a:t>
             </a:fld>
             <a:endParaRPr lang="en-US"/>
           </a:p>
@@ -2378,7 +2391,7 @@
           <a:p>
             <a:fld id="{62B5A678-4677-4D59-A4E0-C4230956B236}" type="datetimeFigureOut">
               <a:rPr lang="en-US" smtClean="0"/>
-              <a:t>12/20/2019</a:t>
+              <a:t>12/26/2019</a:t>
             </a:fld>
             <a:endParaRPr lang="en-US"/>
           </a:p>
@@ -2666,7 +2679,7 @@
           <a:p>
             <a:fld id="{62B5A678-4677-4D59-A4E0-C4230956B236}" type="datetimeFigureOut">
               <a:rPr lang="en-US" smtClean="0"/>
-              <a:t>12/20/2019</a:t>
+              <a:t>12/26/2019</a:t>
             </a:fld>
             <a:endParaRPr lang="en-US"/>
           </a:p>
@@ -2907,7 +2920,7 @@
           <a:p>
             <a:fld id="{62B5A678-4677-4D59-A4E0-C4230956B236}" type="datetimeFigureOut">
               <a:rPr lang="en-US" smtClean="0"/>
-              <a:t>12/20/2019</a:t>
+              <a:t>12/26/2019</a:t>
             </a:fld>
             <a:endParaRPr lang="en-US"/>
           </a:p>
@@ -3387,7 +3400,3929 @@
 </p:sld>
 </file>
 
+<file path=ppt/slides/slide10.xml><?xml version="1.0" encoding="utf-8"?>
+<p:sld xmlns:a="http://schemas.openxmlformats.org/drawingml/2006/main" xmlns:r="http://schemas.openxmlformats.org/officeDocument/2006/relationships" xmlns:p="http://schemas.openxmlformats.org/presentationml/2006/main">
+  <p:cSld>
+    <p:spTree>
+      <p:nvGrpSpPr>
+        <p:cNvPr id="1" name=""/>
+        <p:cNvGrpSpPr/>
+        <p:nvPr/>
+      </p:nvGrpSpPr>
+      <p:grpSpPr>
+        <a:xfrm>
+          <a:off x="0" y="0"/>
+          <a:ext cx="0" cy="0"/>
+          <a:chOff x="0" y="0"/>
+          <a:chExt cx="0" cy="0"/>
+        </a:xfrm>
+      </p:grpSpPr>
+      <p:sp>
+        <p:nvSpPr>
+          <p:cNvPr id="2" name="TextBox 1">
+            <a:extLst>
+              <a:ext uri="{FF2B5EF4-FFF2-40B4-BE49-F238E27FC236}">
+                <a16:creationId xmlns:a16="http://schemas.microsoft.com/office/drawing/2014/main" id="{CA54DEFC-4B9D-415D-A6AE-900A45D6C396}"/>
+              </a:ext>
+            </a:extLst>
+          </p:cNvPr>
+          <p:cNvSpPr txBox="1"/>
+          <p:nvPr/>
+        </p:nvSpPr>
+        <p:spPr>
+          <a:xfrm>
+            <a:off x="3279228" y="2070340"/>
+            <a:ext cx="709185" cy="230832"/>
+          </a:xfrm>
+          <a:prstGeom prst="rect">
+            <a:avLst/>
+          </a:prstGeom>
+          <a:noFill/>
+          <a:ln>
+            <a:solidFill>
+              <a:schemeClr val="tx1">
+                <a:lumMod val="95000"/>
+                <a:lumOff val="5000"/>
+              </a:schemeClr>
+            </a:solidFill>
+          </a:ln>
+        </p:spPr>
+        <p:txBody>
+          <a:bodyPr wrap="square" rtlCol="0">
+            <a:spAutoFit/>
+          </a:bodyPr>
+          <a:lstStyle/>
+          <a:p>
+            <a:pPr algn="ctr"/>
+            <a:r>
+              <a:rPr lang="en-US" sz="900" dirty="0"/>
+              <a:t>SSB</a:t>
+            </a:r>
+          </a:p>
+        </p:txBody>
+      </p:sp>
+      <p:sp>
+        <p:nvSpPr>
+          <p:cNvPr id="3" name="TextBox 2">
+            <a:extLst>
+              <a:ext uri="{FF2B5EF4-FFF2-40B4-BE49-F238E27FC236}">
+                <a16:creationId xmlns:a16="http://schemas.microsoft.com/office/drawing/2014/main" id="{2B60C58C-B149-4AFA-8FA3-6FA7AADE2106}"/>
+              </a:ext>
+            </a:extLst>
+          </p:cNvPr>
+          <p:cNvSpPr txBox="1"/>
+          <p:nvPr/>
+        </p:nvSpPr>
+        <p:spPr>
+          <a:xfrm>
+            <a:off x="1674824" y="3050315"/>
+            <a:ext cx="1001899" cy="230832"/>
+          </a:xfrm>
+          <a:prstGeom prst="rect">
+            <a:avLst/>
+          </a:prstGeom>
+          <a:noFill/>
+          <a:ln>
+            <a:solidFill>
+              <a:schemeClr val="tx1">
+                <a:lumMod val="95000"/>
+                <a:lumOff val="5000"/>
+              </a:schemeClr>
+            </a:solidFill>
+          </a:ln>
+        </p:spPr>
+        <p:txBody>
+          <a:bodyPr wrap="square" rtlCol="0">
+            <a:spAutoFit/>
+          </a:bodyPr>
+          <a:lstStyle/>
+          <a:p>
+            <a:pPr algn="ctr"/>
+            <a:r>
+              <a:rPr lang="en-US" sz="900" dirty="0" err="1"/>
+              <a:t>astro:Planet</a:t>
+            </a:r>
+            <a:endParaRPr lang="en-US" sz="900" dirty="0"/>
+          </a:p>
+        </p:txBody>
+      </p:sp>
+      <p:sp>
+        <p:nvSpPr>
+          <p:cNvPr id="4" name="TextBox 3">
+            <a:extLst>
+              <a:ext uri="{FF2B5EF4-FFF2-40B4-BE49-F238E27FC236}">
+                <a16:creationId xmlns:a16="http://schemas.microsoft.com/office/drawing/2014/main" id="{D5169CE0-2E5D-4FC6-8733-92533A8765FB}"/>
+              </a:ext>
+            </a:extLst>
+          </p:cNvPr>
+          <p:cNvSpPr txBox="1"/>
+          <p:nvPr/>
+        </p:nvSpPr>
+        <p:spPr>
+          <a:xfrm>
+            <a:off x="2972325" y="3050315"/>
+            <a:ext cx="1308013" cy="230832"/>
+          </a:xfrm>
+          <a:prstGeom prst="rect">
+            <a:avLst/>
+          </a:prstGeom>
+          <a:noFill/>
+          <a:ln>
+            <a:solidFill>
+              <a:schemeClr val="tx1">
+                <a:lumMod val="95000"/>
+                <a:lumOff val="5000"/>
+              </a:schemeClr>
+            </a:solidFill>
+          </a:ln>
+        </p:spPr>
+        <p:txBody>
+          <a:bodyPr wrap="square" rtlCol="0">
+            <a:spAutoFit/>
+          </a:bodyPr>
+          <a:lstStyle/>
+          <a:p>
+            <a:pPr algn="ctr"/>
+            <a:r>
+              <a:rPr lang="en-US" sz="900" dirty="0" err="1"/>
+              <a:t>horo:Planet</a:t>
+            </a:r>
+            <a:endParaRPr lang="en-US" sz="900" dirty="0"/>
+          </a:p>
+        </p:txBody>
+      </p:sp>
+      <p:sp>
+        <p:nvSpPr>
+          <p:cNvPr id="5" name="TextBox 4">
+            <a:extLst>
+              <a:ext uri="{FF2B5EF4-FFF2-40B4-BE49-F238E27FC236}">
+                <a16:creationId xmlns:a16="http://schemas.microsoft.com/office/drawing/2014/main" id="{D3B3B2D3-A321-4C24-BC14-BCAB2553D8E8}"/>
+              </a:ext>
+            </a:extLst>
+          </p:cNvPr>
+          <p:cNvSpPr txBox="1"/>
+          <p:nvPr/>
+        </p:nvSpPr>
+        <p:spPr>
+          <a:xfrm>
+            <a:off x="4505521" y="3052139"/>
+            <a:ext cx="1181889" cy="230832"/>
+          </a:xfrm>
+          <a:prstGeom prst="rect">
+            <a:avLst/>
+          </a:prstGeom>
+          <a:noFill/>
+          <a:ln>
+            <a:solidFill>
+              <a:schemeClr val="tx1">
+                <a:lumMod val="95000"/>
+                <a:lumOff val="5000"/>
+              </a:schemeClr>
+            </a:solidFill>
+          </a:ln>
+        </p:spPr>
+        <p:txBody>
+          <a:bodyPr wrap="square" rtlCol="0">
+            <a:spAutoFit/>
+          </a:bodyPr>
+          <a:lstStyle/>
+          <a:p>
+            <a:pPr algn="ctr"/>
+            <a:r>
+              <a:rPr lang="en-US" sz="900" dirty="0" err="1"/>
+              <a:t>IAU:Planet</a:t>
+            </a:r>
+            <a:endParaRPr lang="en-US" sz="900" dirty="0"/>
+          </a:p>
+        </p:txBody>
+      </p:sp>
+      <p:cxnSp>
+        <p:nvCxnSpPr>
+          <p:cNvPr id="7" name="Straight Arrow Connector 6">
+            <a:extLst>
+              <a:ext uri="{FF2B5EF4-FFF2-40B4-BE49-F238E27FC236}">
+                <a16:creationId xmlns:a16="http://schemas.microsoft.com/office/drawing/2014/main" id="{D8742468-8F6F-4702-8095-8132560931E3}"/>
+              </a:ext>
+            </a:extLst>
+          </p:cNvPr>
+          <p:cNvCxnSpPr>
+            <a:cxnSpLocks/>
+            <a:stCxn id="3" idx="0"/>
+          </p:cNvCxnSpPr>
+          <p:nvPr/>
+        </p:nvCxnSpPr>
+        <p:spPr>
+          <a:xfrm flipV="1">
+            <a:off x="2175774" y="2308826"/>
+            <a:ext cx="1246985" cy="741489"/>
+          </a:xfrm>
+          <a:prstGeom prst="straightConnector1">
+            <a:avLst/>
+          </a:prstGeom>
+          <a:ln>
+            <a:solidFill>
+              <a:schemeClr val="tx1">
+                <a:lumMod val="95000"/>
+                <a:lumOff val="5000"/>
+              </a:schemeClr>
+            </a:solidFill>
+            <a:headEnd type="none" w="med" len="med"/>
+            <a:tailEnd type="arrow" w="med" len="med"/>
+          </a:ln>
+        </p:spPr>
+        <p:style>
+          <a:lnRef idx="1">
+            <a:schemeClr val="accent1"/>
+          </a:lnRef>
+          <a:fillRef idx="0">
+            <a:schemeClr val="accent1"/>
+          </a:fillRef>
+          <a:effectRef idx="0">
+            <a:schemeClr val="accent1"/>
+          </a:effectRef>
+          <a:fontRef idx="minor">
+            <a:schemeClr val="tx1"/>
+          </a:fontRef>
+        </p:style>
+      </p:cxnSp>
+      <p:cxnSp>
+        <p:nvCxnSpPr>
+          <p:cNvPr id="8" name="Straight Arrow Connector 7">
+            <a:extLst>
+              <a:ext uri="{FF2B5EF4-FFF2-40B4-BE49-F238E27FC236}">
+                <a16:creationId xmlns:a16="http://schemas.microsoft.com/office/drawing/2014/main" id="{CAD0F3E4-28FF-4983-9CE9-0555724E1B19}"/>
+              </a:ext>
+            </a:extLst>
+          </p:cNvPr>
+          <p:cNvCxnSpPr>
+            <a:cxnSpLocks/>
+            <a:stCxn id="5" idx="0"/>
+          </p:cNvCxnSpPr>
+          <p:nvPr/>
+        </p:nvCxnSpPr>
+        <p:spPr>
+          <a:xfrm flipH="1" flipV="1">
+            <a:off x="3832860" y="2308826"/>
+            <a:ext cx="1263606" cy="743313"/>
+          </a:xfrm>
+          <a:prstGeom prst="straightConnector1">
+            <a:avLst/>
+          </a:prstGeom>
+          <a:ln>
+            <a:solidFill>
+              <a:schemeClr val="tx1">
+                <a:lumMod val="95000"/>
+                <a:lumOff val="5000"/>
+              </a:schemeClr>
+            </a:solidFill>
+            <a:headEnd type="none" w="med" len="med"/>
+            <a:tailEnd type="arrow" w="med" len="med"/>
+          </a:ln>
+        </p:spPr>
+        <p:style>
+          <a:lnRef idx="1">
+            <a:schemeClr val="accent1"/>
+          </a:lnRef>
+          <a:fillRef idx="0">
+            <a:schemeClr val="accent1"/>
+          </a:fillRef>
+          <a:effectRef idx="0">
+            <a:schemeClr val="accent1"/>
+          </a:effectRef>
+          <a:fontRef idx="minor">
+            <a:schemeClr val="tx1"/>
+          </a:fontRef>
+        </p:style>
+      </p:cxnSp>
+      <p:cxnSp>
+        <p:nvCxnSpPr>
+          <p:cNvPr id="11" name="Straight Arrow Connector 10">
+            <a:extLst>
+              <a:ext uri="{FF2B5EF4-FFF2-40B4-BE49-F238E27FC236}">
+                <a16:creationId xmlns:a16="http://schemas.microsoft.com/office/drawing/2014/main" id="{0E6903A9-F6CA-43D0-8A5F-FB5AB82AC1C5}"/>
+              </a:ext>
+            </a:extLst>
+          </p:cNvPr>
+          <p:cNvCxnSpPr>
+            <a:cxnSpLocks/>
+            <a:stCxn id="4" idx="0"/>
+            <a:endCxn id="2" idx="2"/>
+          </p:cNvCxnSpPr>
+          <p:nvPr/>
+        </p:nvCxnSpPr>
+        <p:spPr>
+          <a:xfrm flipV="1">
+            <a:off x="3626332" y="2301172"/>
+            <a:ext cx="7489" cy="749143"/>
+          </a:xfrm>
+          <a:prstGeom prst="straightConnector1">
+            <a:avLst/>
+          </a:prstGeom>
+          <a:ln>
+            <a:solidFill>
+              <a:schemeClr val="tx1">
+                <a:lumMod val="95000"/>
+                <a:lumOff val="5000"/>
+              </a:schemeClr>
+            </a:solidFill>
+            <a:headEnd type="none" w="med" len="med"/>
+            <a:tailEnd type="arrow" w="med" len="med"/>
+          </a:ln>
+        </p:spPr>
+        <p:style>
+          <a:lnRef idx="1">
+            <a:schemeClr val="accent1"/>
+          </a:lnRef>
+          <a:fillRef idx="0">
+            <a:schemeClr val="accent1"/>
+          </a:fillRef>
+          <a:effectRef idx="0">
+            <a:schemeClr val="accent1"/>
+          </a:effectRef>
+          <a:fontRef idx="minor">
+            <a:schemeClr val="tx1"/>
+          </a:fontRef>
+        </p:style>
+      </p:cxnSp>
+      <p:sp>
+        <p:nvSpPr>
+          <p:cNvPr id="30" name="TextBox 29">
+            <a:extLst>
+              <a:ext uri="{FF2B5EF4-FFF2-40B4-BE49-F238E27FC236}">
+                <a16:creationId xmlns:a16="http://schemas.microsoft.com/office/drawing/2014/main" id="{5D166D42-8EB4-4BF9-8982-9260FB2998CF}"/>
+              </a:ext>
+            </a:extLst>
+          </p:cNvPr>
+          <p:cNvSpPr txBox="1"/>
+          <p:nvPr/>
+        </p:nvSpPr>
+        <p:spPr>
+          <a:xfrm>
+            <a:off x="7263929" y="1688026"/>
+            <a:ext cx="709185" cy="230832"/>
+          </a:xfrm>
+          <a:prstGeom prst="rect">
+            <a:avLst/>
+          </a:prstGeom>
+          <a:noFill/>
+          <a:ln>
+            <a:solidFill>
+              <a:schemeClr val="tx1">
+                <a:lumMod val="95000"/>
+                <a:lumOff val="5000"/>
+              </a:schemeClr>
+            </a:solidFill>
+          </a:ln>
+        </p:spPr>
+        <p:txBody>
+          <a:bodyPr wrap="square" rtlCol="0">
+            <a:spAutoFit/>
+          </a:bodyPr>
+          <a:lstStyle/>
+          <a:p>
+            <a:pPr algn="ctr"/>
+            <a:r>
+              <a:rPr lang="en-US" sz="900" dirty="0"/>
+              <a:t>SSB</a:t>
+            </a:r>
+          </a:p>
+        </p:txBody>
+      </p:sp>
+      <p:sp>
+        <p:nvSpPr>
+          <p:cNvPr id="31" name="TextBox 30">
+            <a:extLst>
+              <a:ext uri="{FF2B5EF4-FFF2-40B4-BE49-F238E27FC236}">
+                <a16:creationId xmlns:a16="http://schemas.microsoft.com/office/drawing/2014/main" id="{CA8261E4-971A-417B-A7FC-F4CFAB16E1DF}"/>
+              </a:ext>
+            </a:extLst>
+          </p:cNvPr>
+          <p:cNvSpPr txBox="1"/>
+          <p:nvPr/>
+        </p:nvSpPr>
+        <p:spPr>
+          <a:xfrm>
+            <a:off x="6504592" y="2637341"/>
+            <a:ext cx="1001899" cy="230832"/>
+          </a:xfrm>
+          <a:prstGeom prst="rect">
+            <a:avLst/>
+          </a:prstGeom>
+          <a:noFill/>
+          <a:ln>
+            <a:solidFill>
+              <a:schemeClr val="tx1">
+                <a:lumMod val="95000"/>
+                <a:lumOff val="5000"/>
+              </a:schemeClr>
+            </a:solidFill>
+          </a:ln>
+        </p:spPr>
+        <p:txBody>
+          <a:bodyPr wrap="square" rtlCol="0">
+            <a:spAutoFit/>
+          </a:bodyPr>
+          <a:lstStyle/>
+          <a:p>
+            <a:pPr algn="ctr"/>
+            <a:r>
+              <a:rPr lang="en-US" sz="900" dirty="0" err="1"/>
+              <a:t>astro:Planet</a:t>
+            </a:r>
+            <a:endParaRPr lang="en-US" sz="900" dirty="0"/>
+          </a:p>
+        </p:txBody>
+      </p:sp>
+      <p:sp>
+        <p:nvSpPr>
+          <p:cNvPr id="32" name="TextBox 31">
+            <a:extLst>
+              <a:ext uri="{FF2B5EF4-FFF2-40B4-BE49-F238E27FC236}">
+                <a16:creationId xmlns:a16="http://schemas.microsoft.com/office/drawing/2014/main" id="{105FDA04-910D-4885-A633-0A80BCABEE30}"/>
+              </a:ext>
+            </a:extLst>
+          </p:cNvPr>
+          <p:cNvSpPr txBox="1"/>
+          <p:nvPr/>
+        </p:nvSpPr>
+        <p:spPr>
+          <a:xfrm>
+            <a:off x="7904011" y="2637341"/>
+            <a:ext cx="1001899" cy="230832"/>
+          </a:xfrm>
+          <a:prstGeom prst="rect">
+            <a:avLst/>
+          </a:prstGeom>
+          <a:noFill/>
+          <a:ln>
+            <a:solidFill>
+              <a:schemeClr val="tx1">
+                <a:lumMod val="95000"/>
+                <a:lumOff val="5000"/>
+              </a:schemeClr>
+            </a:solidFill>
+          </a:ln>
+        </p:spPr>
+        <p:txBody>
+          <a:bodyPr wrap="square" rtlCol="0">
+            <a:spAutoFit/>
+          </a:bodyPr>
+          <a:lstStyle/>
+          <a:p>
+            <a:pPr algn="ctr"/>
+            <a:r>
+              <a:rPr lang="en-US" sz="900" dirty="0" err="1"/>
+              <a:t>horo:Planet</a:t>
+            </a:r>
+            <a:endParaRPr lang="en-US" sz="900" dirty="0"/>
+          </a:p>
+        </p:txBody>
+      </p:sp>
+      <p:sp>
+        <p:nvSpPr>
+          <p:cNvPr id="33" name="TextBox 32">
+            <a:extLst>
+              <a:ext uri="{FF2B5EF4-FFF2-40B4-BE49-F238E27FC236}">
+                <a16:creationId xmlns:a16="http://schemas.microsoft.com/office/drawing/2014/main" id="{02CBCAD7-5252-41E8-9248-C9263346F665}"/>
+              </a:ext>
+            </a:extLst>
+          </p:cNvPr>
+          <p:cNvSpPr txBox="1"/>
+          <p:nvPr/>
+        </p:nvSpPr>
+        <p:spPr>
+          <a:xfrm>
+            <a:off x="7131666" y="3600662"/>
+            <a:ext cx="1181889" cy="230832"/>
+          </a:xfrm>
+          <a:prstGeom prst="rect">
+            <a:avLst/>
+          </a:prstGeom>
+          <a:noFill/>
+          <a:ln>
+            <a:solidFill>
+              <a:schemeClr val="tx1">
+                <a:lumMod val="95000"/>
+                <a:lumOff val="5000"/>
+              </a:schemeClr>
+            </a:solidFill>
+          </a:ln>
+        </p:spPr>
+        <p:txBody>
+          <a:bodyPr wrap="square" rtlCol="0">
+            <a:spAutoFit/>
+          </a:bodyPr>
+          <a:lstStyle/>
+          <a:p>
+            <a:pPr algn="ctr"/>
+            <a:r>
+              <a:rPr lang="en-US" sz="900" dirty="0" err="1"/>
+              <a:t>IAU:Planet</a:t>
+            </a:r>
+            <a:endParaRPr lang="en-US" sz="900" dirty="0"/>
+          </a:p>
+        </p:txBody>
+      </p:sp>
+      <p:cxnSp>
+        <p:nvCxnSpPr>
+          <p:cNvPr id="34" name="Straight Arrow Connector 33">
+            <a:extLst>
+              <a:ext uri="{FF2B5EF4-FFF2-40B4-BE49-F238E27FC236}">
+                <a16:creationId xmlns:a16="http://schemas.microsoft.com/office/drawing/2014/main" id="{93F92ED7-652E-41BF-991C-4A1C427126F9}"/>
+              </a:ext>
+            </a:extLst>
+          </p:cNvPr>
+          <p:cNvCxnSpPr>
+            <a:cxnSpLocks/>
+            <a:stCxn id="31" idx="0"/>
+          </p:cNvCxnSpPr>
+          <p:nvPr/>
+        </p:nvCxnSpPr>
+        <p:spPr>
+          <a:xfrm flipV="1">
+            <a:off x="7005542" y="1904063"/>
+            <a:ext cx="500949" cy="733278"/>
+          </a:xfrm>
+          <a:prstGeom prst="straightConnector1">
+            <a:avLst/>
+          </a:prstGeom>
+          <a:ln>
+            <a:solidFill>
+              <a:schemeClr val="tx1">
+                <a:lumMod val="95000"/>
+                <a:lumOff val="5000"/>
+              </a:schemeClr>
+            </a:solidFill>
+            <a:headEnd type="none" w="med" len="med"/>
+            <a:tailEnd type="arrow" w="med" len="med"/>
+          </a:ln>
+        </p:spPr>
+        <p:style>
+          <a:lnRef idx="1">
+            <a:schemeClr val="accent1"/>
+          </a:lnRef>
+          <a:fillRef idx="0">
+            <a:schemeClr val="accent1"/>
+          </a:fillRef>
+          <a:effectRef idx="0">
+            <a:schemeClr val="accent1"/>
+          </a:effectRef>
+          <a:fontRef idx="minor">
+            <a:schemeClr val="tx1"/>
+          </a:fontRef>
+        </p:style>
+      </p:cxnSp>
+      <p:cxnSp>
+        <p:nvCxnSpPr>
+          <p:cNvPr id="35" name="Straight Arrow Connector 34">
+            <a:extLst>
+              <a:ext uri="{FF2B5EF4-FFF2-40B4-BE49-F238E27FC236}">
+                <a16:creationId xmlns:a16="http://schemas.microsoft.com/office/drawing/2014/main" id="{A370FA4E-40D1-433E-8241-7EE0C4A4902D}"/>
+              </a:ext>
+            </a:extLst>
+          </p:cNvPr>
+          <p:cNvCxnSpPr>
+            <a:cxnSpLocks/>
+            <a:stCxn id="33" idx="0"/>
+            <a:endCxn id="31" idx="2"/>
+          </p:cNvCxnSpPr>
+          <p:nvPr/>
+        </p:nvCxnSpPr>
+        <p:spPr>
+          <a:xfrm flipH="1" flipV="1">
+            <a:off x="7005542" y="2868173"/>
+            <a:ext cx="717069" cy="732489"/>
+          </a:xfrm>
+          <a:prstGeom prst="straightConnector1">
+            <a:avLst/>
+          </a:prstGeom>
+          <a:ln>
+            <a:solidFill>
+              <a:schemeClr val="tx1">
+                <a:lumMod val="95000"/>
+                <a:lumOff val="5000"/>
+              </a:schemeClr>
+            </a:solidFill>
+            <a:headEnd type="none" w="med" len="med"/>
+            <a:tailEnd type="arrow" w="med" len="med"/>
+          </a:ln>
+        </p:spPr>
+        <p:style>
+          <a:lnRef idx="1">
+            <a:schemeClr val="accent1"/>
+          </a:lnRef>
+          <a:fillRef idx="0">
+            <a:schemeClr val="accent1"/>
+          </a:fillRef>
+          <a:effectRef idx="0">
+            <a:schemeClr val="accent1"/>
+          </a:effectRef>
+          <a:fontRef idx="minor">
+            <a:schemeClr val="tx1"/>
+          </a:fontRef>
+        </p:style>
+      </p:cxnSp>
+      <p:cxnSp>
+        <p:nvCxnSpPr>
+          <p:cNvPr id="36" name="Straight Arrow Connector 35">
+            <a:extLst>
+              <a:ext uri="{FF2B5EF4-FFF2-40B4-BE49-F238E27FC236}">
+                <a16:creationId xmlns:a16="http://schemas.microsoft.com/office/drawing/2014/main" id="{42CF3CB5-E885-4EC1-AE28-6D8FE29D42A1}"/>
+              </a:ext>
+            </a:extLst>
+          </p:cNvPr>
+          <p:cNvCxnSpPr>
+            <a:cxnSpLocks/>
+            <a:stCxn id="32" idx="0"/>
+          </p:cNvCxnSpPr>
+          <p:nvPr/>
+        </p:nvCxnSpPr>
+        <p:spPr>
+          <a:xfrm flipH="1" flipV="1">
+            <a:off x="7764878" y="1918858"/>
+            <a:ext cx="640083" cy="718483"/>
+          </a:xfrm>
+          <a:prstGeom prst="straightConnector1">
+            <a:avLst/>
+          </a:prstGeom>
+          <a:ln>
+            <a:solidFill>
+              <a:schemeClr val="tx1">
+                <a:lumMod val="95000"/>
+                <a:lumOff val="5000"/>
+              </a:schemeClr>
+            </a:solidFill>
+            <a:headEnd type="none" w="med" len="med"/>
+            <a:tailEnd type="arrow" w="med" len="med"/>
+          </a:ln>
+        </p:spPr>
+        <p:style>
+          <a:lnRef idx="1">
+            <a:schemeClr val="accent1"/>
+          </a:lnRef>
+          <a:fillRef idx="0">
+            <a:schemeClr val="accent1"/>
+          </a:fillRef>
+          <a:effectRef idx="0">
+            <a:schemeClr val="accent1"/>
+          </a:effectRef>
+          <a:fontRef idx="minor">
+            <a:schemeClr val="tx1"/>
+          </a:fontRef>
+        </p:style>
+      </p:cxnSp>
+      <p:cxnSp>
+        <p:nvCxnSpPr>
+          <p:cNvPr id="42" name="Straight Arrow Connector 41">
+            <a:extLst>
+              <a:ext uri="{FF2B5EF4-FFF2-40B4-BE49-F238E27FC236}">
+                <a16:creationId xmlns:a16="http://schemas.microsoft.com/office/drawing/2014/main" id="{39449B17-62DE-4370-8878-362C115D6BD5}"/>
+              </a:ext>
+            </a:extLst>
+          </p:cNvPr>
+          <p:cNvCxnSpPr>
+            <a:cxnSpLocks/>
+            <a:stCxn id="33" idx="0"/>
+            <a:endCxn id="32" idx="2"/>
+          </p:cNvCxnSpPr>
+          <p:nvPr/>
+        </p:nvCxnSpPr>
+        <p:spPr>
+          <a:xfrm flipV="1">
+            <a:off x="7722611" y="2868173"/>
+            <a:ext cx="682350" cy="732489"/>
+          </a:xfrm>
+          <a:prstGeom prst="straightConnector1">
+            <a:avLst/>
+          </a:prstGeom>
+          <a:ln>
+            <a:solidFill>
+              <a:schemeClr val="tx1">
+                <a:lumMod val="95000"/>
+                <a:lumOff val="5000"/>
+              </a:schemeClr>
+            </a:solidFill>
+            <a:headEnd type="none" w="med" len="med"/>
+            <a:tailEnd type="arrow" w="med" len="med"/>
+          </a:ln>
+        </p:spPr>
+        <p:style>
+          <a:lnRef idx="1">
+            <a:schemeClr val="accent1"/>
+          </a:lnRef>
+          <a:fillRef idx="0">
+            <a:schemeClr val="accent1"/>
+          </a:fillRef>
+          <a:effectRef idx="0">
+            <a:schemeClr val="accent1"/>
+          </a:effectRef>
+          <a:fontRef idx="minor">
+            <a:schemeClr val="tx1"/>
+          </a:fontRef>
+        </p:style>
+      </p:cxnSp>
+    </p:spTree>
+    <p:extLst>
+      <p:ext uri="{BB962C8B-B14F-4D97-AF65-F5344CB8AC3E}">
+        <p14:creationId xmlns:p14="http://schemas.microsoft.com/office/powerpoint/2010/main" val="2453870311"/>
+      </p:ext>
+    </p:extLst>
+  </p:cSld>
+  <p:clrMapOvr>
+    <a:masterClrMapping/>
+  </p:clrMapOvr>
+</p:sld>
+</file>
+
+<file path=ppt/slides/slide11.xml><?xml version="1.0" encoding="utf-8"?>
+<p:sld xmlns:a="http://schemas.openxmlformats.org/drawingml/2006/main" xmlns:r="http://schemas.openxmlformats.org/officeDocument/2006/relationships" xmlns:p="http://schemas.openxmlformats.org/presentationml/2006/main">
+  <p:cSld>
+    <p:spTree>
+      <p:nvGrpSpPr>
+        <p:cNvPr id="1" name=""/>
+        <p:cNvGrpSpPr/>
+        <p:nvPr/>
+      </p:nvGrpSpPr>
+      <p:grpSpPr>
+        <a:xfrm>
+          <a:off x="0" y="0"/>
+          <a:ext cx="0" cy="0"/>
+          <a:chOff x="0" y="0"/>
+          <a:chExt cx="0" cy="0"/>
+        </a:xfrm>
+      </p:grpSpPr>
+      <p:sp>
+        <p:nvSpPr>
+          <p:cNvPr id="3" name="TextBox 2">
+            <a:extLst>
+              <a:ext uri="{FF2B5EF4-FFF2-40B4-BE49-F238E27FC236}">
+                <a16:creationId xmlns:a16="http://schemas.microsoft.com/office/drawing/2014/main" id="{32737677-D4E7-47DD-BCE5-3076E52F2D2C}"/>
+              </a:ext>
+            </a:extLst>
+          </p:cNvPr>
+          <p:cNvSpPr txBox="1"/>
+          <p:nvPr/>
+        </p:nvSpPr>
+        <p:spPr>
+          <a:xfrm>
+            <a:off x="4784058" y="3829785"/>
+            <a:ext cx="328647" cy="369332"/>
+          </a:xfrm>
+          <a:prstGeom prst="rect">
+            <a:avLst/>
+          </a:prstGeom>
+          <a:noFill/>
+          <a:ln>
+            <a:solidFill>
+              <a:schemeClr val="tx1">
+                <a:lumMod val="95000"/>
+                <a:lumOff val="5000"/>
+              </a:schemeClr>
+            </a:solidFill>
+          </a:ln>
+        </p:spPr>
+        <p:txBody>
+          <a:bodyPr wrap="square" rtlCol="0">
+            <a:spAutoFit/>
+          </a:bodyPr>
+          <a:lstStyle/>
+          <a:p>
+            <a:pPr algn="ctr"/>
+            <a:r>
+              <a:rPr lang="en-US" dirty="0"/>
+              <a:t>♇</a:t>
+            </a:r>
+            <a:endParaRPr lang="en-US" sz="900" dirty="0"/>
+          </a:p>
+        </p:txBody>
+      </p:sp>
+      <p:sp>
+        <p:nvSpPr>
+          <p:cNvPr id="4" name="TextBox 3">
+            <a:extLst>
+              <a:ext uri="{FF2B5EF4-FFF2-40B4-BE49-F238E27FC236}">
+                <a16:creationId xmlns:a16="http://schemas.microsoft.com/office/drawing/2014/main" id="{E39D11FB-DA7E-4ABF-97D6-DF8A15F413F9}"/>
+              </a:ext>
+            </a:extLst>
+          </p:cNvPr>
+          <p:cNvSpPr txBox="1"/>
+          <p:nvPr/>
+        </p:nvSpPr>
+        <p:spPr>
+          <a:xfrm>
+            <a:off x="4497709" y="0"/>
+            <a:ext cx="1001899" cy="230832"/>
+          </a:xfrm>
+          <a:prstGeom prst="rect">
+            <a:avLst/>
+          </a:prstGeom>
+          <a:noFill/>
+          <a:ln>
+            <a:solidFill>
+              <a:schemeClr val="tx1">
+                <a:lumMod val="95000"/>
+                <a:lumOff val="5000"/>
+              </a:schemeClr>
+            </a:solidFill>
+          </a:ln>
+        </p:spPr>
+        <p:txBody>
+          <a:bodyPr wrap="square" rtlCol="0">
+            <a:spAutoFit/>
+          </a:bodyPr>
+          <a:lstStyle/>
+          <a:p>
+            <a:pPr algn="ctr"/>
+            <a:r>
+              <a:rPr lang="en-US" sz="900" dirty="0"/>
+              <a:t>Rebirth</a:t>
+            </a:r>
+          </a:p>
+        </p:txBody>
+      </p:sp>
+      <p:sp>
+        <p:nvSpPr>
+          <p:cNvPr id="5" name="TextBox 4">
+            <a:extLst>
+              <a:ext uri="{FF2B5EF4-FFF2-40B4-BE49-F238E27FC236}">
+                <a16:creationId xmlns:a16="http://schemas.microsoft.com/office/drawing/2014/main" id="{980CE397-5E13-46FD-A3DD-45F95F7B8664}"/>
+              </a:ext>
+            </a:extLst>
+          </p:cNvPr>
+          <p:cNvSpPr txBox="1"/>
+          <p:nvPr/>
+        </p:nvSpPr>
+        <p:spPr>
+          <a:xfrm>
+            <a:off x="6117656" y="446493"/>
+            <a:ext cx="1001899" cy="230832"/>
+          </a:xfrm>
+          <a:prstGeom prst="rect">
+            <a:avLst/>
+          </a:prstGeom>
+          <a:noFill/>
+          <a:ln>
+            <a:solidFill>
+              <a:schemeClr val="tx1">
+                <a:lumMod val="95000"/>
+                <a:lumOff val="5000"/>
+              </a:schemeClr>
+            </a:solidFill>
+          </a:ln>
+        </p:spPr>
+        <p:txBody>
+          <a:bodyPr wrap="square" rtlCol="0">
+            <a:spAutoFit/>
+          </a:bodyPr>
+          <a:lstStyle/>
+          <a:p>
+            <a:pPr algn="ctr"/>
+            <a:r>
+              <a:rPr lang="en-US" sz="900" dirty="0"/>
+              <a:t>Pluto</a:t>
+            </a:r>
+          </a:p>
+        </p:txBody>
+      </p:sp>
+      <p:sp>
+        <p:nvSpPr>
+          <p:cNvPr id="6" name="TextBox 5">
+            <a:extLst>
+              <a:ext uri="{FF2B5EF4-FFF2-40B4-BE49-F238E27FC236}">
+                <a16:creationId xmlns:a16="http://schemas.microsoft.com/office/drawing/2014/main" id="{F094D2FC-8EEC-46B0-8C82-5117D4B30875}"/>
+              </a:ext>
+            </a:extLst>
+          </p:cNvPr>
+          <p:cNvSpPr txBox="1"/>
+          <p:nvPr/>
+        </p:nvSpPr>
+        <p:spPr>
+          <a:xfrm>
+            <a:off x="4407714" y="953750"/>
+            <a:ext cx="1181889" cy="230832"/>
+          </a:xfrm>
+          <a:prstGeom prst="rect">
+            <a:avLst/>
+          </a:prstGeom>
+          <a:noFill/>
+          <a:ln>
+            <a:solidFill>
+              <a:schemeClr val="tx1">
+                <a:lumMod val="95000"/>
+                <a:lumOff val="5000"/>
+              </a:schemeClr>
+            </a:solidFill>
+          </a:ln>
+        </p:spPr>
+        <p:txBody>
+          <a:bodyPr wrap="square" rtlCol="0">
+            <a:spAutoFit/>
+          </a:bodyPr>
+          <a:lstStyle/>
+          <a:p>
+            <a:pPr algn="ctr"/>
+            <a:r>
+              <a:rPr lang="en-US" sz="900" dirty="0"/>
+              <a:t>Regeneration</a:t>
+            </a:r>
+          </a:p>
+        </p:txBody>
+      </p:sp>
+      <p:cxnSp>
+        <p:nvCxnSpPr>
+          <p:cNvPr id="9" name="Straight Arrow Connector 8">
+            <a:extLst>
+              <a:ext uri="{FF2B5EF4-FFF2-40B4-BE49-F238E27FC236}">
+                <a16:creationId xmlns:a16="http://schemas.microsoft.com/office/drawing/2014/main" id="{2B1E6568-9662-49B5-B8FB-4F6EFE7E5A28}"/>
+              </a:ext>
+            </a:extLst>
+          </p:cNvPr>
+          <p:cNvCxnSpPr>
+            <a:cxnSpLocks/>
+          </p:cNvCxnSpPr>
+          <p:nvPr/>
+        </p:nvCxnSpPr>
+        <p:spPr>
+          <a:xfrm flipH="1" flipV="1">
+            <a:off x="5235012" y="237213"/>
+            <a:ext cx="882644" cy="209280"/>
+          </a:xfrm>
+          <a:prstGeom prst="straightConnector1">
+            <a:avLst/>
+          </a:prstGeom>
+          <a:ln>
+            <a:solidFill>
+              <a:schemeClr val="tx1">
+                <a:lumMod val="95000"/>
+                <a:lumOff val="5000"/>
+              </a:schemeClr>
+            </a:solidFill>
+            <a:headEnd type="none" w="med" len="med"/>
+            <a:tailEnd type="arrow" w="med" len="med"/>
+          </a:ln>
+        </p:spPr>
+        <p:style>
+          <a:lnRef idx="1">
+            <a:schemeClr val="accent1"/>
+          </a:lnRef>
+          <a:fillRef idx="0">
+            <a:schemeClr val="accent1"/>
+          </a:fillRef>
+          <a:effectRef idx="0">
+            <a:schemeClr val="accent1"/>
+          </a:effectRef>
+          <a:fontRef idx="minor">
+            <a:schemeClr val="tx1"/>
+          </a:fontRef>
+        </p:style>
+      </p:cxnSp>
+      <p:cxnSp>
+        <p:nvCxnSpPr>
+          <p:cNvPr id="10" name="Straight Arrow Connector 9">
+            <a:extLst>
+              <a:ext uri="{FF2B5EF4-FFF2-40B4-BE49-F238E27FC236}">
+                <a16:creationId xmlns:a16="http://schemas.microsoft.com/office/drawing/2014/main" id="{BD1E4513-2A66-4552-8E66-6EB6141EA715}"/>
+              </a:ext>
+            </a:extLst>
+          </p:cNvPr>
+          <p:cNvCxnSpPr>
+            <a:cxnSpLocks/>
+          </p:cNvCxnSpPr>
+          <p:nvPr/>
+        </p:nvCxnSpPr>
+        <p:spPr>
+          <a:xfrm flipH="1">
+            <a:off x="5235012" y="683706"/>
+            <a:ext cx="882644" cy="270044"/>
+          </a:xfrm>
+          <a:prstGeom prst="straightConnector1">
+            <a:avLst/>
+          </a:prstGeom>
+          <a:ln>
+            <a:solidFill>
+              <a:schemeClr val="tx1">
+                <a:lumMod val="95000"/>
+                <a:lumOff val="5000"/>
+              </a:schemeClr>
+            </a:solidFill>
+            <a:headEnd type="none" w="med" len="med"/>
+            <a:tailEnd type="arrow" w="med" len="med"/>
+          </a:ln>
+        </p:spPr>
+        <p:style>
+          <a:lnRef idx="1">
+            <a:schemeClr val="accent1"/>
+          </a:lnRef>
+          <a:fillRef idx="0">
+            <a:schemeClr val="accent1"/>
+          </a:fillRef>
+          <a:effectRef idx="0">
+            <a:schemeClr val="accent1"/>
+          </a:effectRef>
+          <a:fontRef idx="minor">
+            <a:schemeClr val="tx1"/>
+          </a:fontRef>
+        </p:style>
+      </p:cxnSp>
+      <p:grpSp>
+        <p:nvGrpSpPr>
+          <p:cNvPr id="28" name="Group 27">
+            <a:extLst>
+              <a:ext uri="{FF2B5EF4-FFF2-40B4-BE49-F238E27FC236}">
+                <a16:creationId xmlns:a16="http://schemas.microsoft.com/office/drawing/2014/main" id="{F5C0F9A5-65DF-42F4-8880-5E0C0A0E3837}"/>
+              </a:ext>
+            </a:extLst>
+          </p:cNvPr>
+          <p:cNvGrpSpPr/>
+          <p:nvPr/>
+        </p:nvGrpSpPr>
+        <p:grpSpPr>
+          <a:xfrm>
+            <a:off x="6434744" y="1500464"/>
+            <a:ext cx="308661" cy="494948"/>
+            <a:chOff x="6492240" y="3356724"/>
+            <a:chExt cx="308661" cy="494948"/>
+          </a:xfrm>
+        </p:grpSpPr>
+        <p:sp>
+          <p:nvSpPr>
+            <p:cNvPr id="27" name="TextBox 26">
+              <a:extLst>
+                <a:ext uri="{FF2B5EF4-FFF2-40B4-BE49-F238E27FC236}">
+                  <a16:creationId xmlns:a16="http://schemas.microsoft.com/office/drawing/2014/main" id="{20D4CF38-82FA-40A8-B0CE-7D04403FB6B2}"/>
+                </a:ext>
+              </a:extLst>
+            </p:cNvPr>
+            <p:cNvSpPr txBox="1"/>
+            <p:nvPr/>
+          </p:nvSpPr>
+          <p:spPr>
+            <a:xfrm>
+              <a:off x="6492240" y="3482340"/>
+              <a:ext cx="184731" cy="369332"/>
+            </a:xfrm>
+            <a:prstGeom prst="rect">
+              <a:avLst/>
+            </a:prstGeom>
+            <a:noFill/>
+          </p:spPr>
+          <p:txBody>
+            <a:bodyPr wrap="none" rtlCol="0">
+              <a:spAutoFit/>
+            </a:bodyPr>
+            <a:lstStyle/>
+            <a:p>
+              <a:endParaRPr lang="en-US" dirty="0"/>
+            </a:p>
+          </p:txBody>
+        </p:sp>
+        <p:sp>
+          <p:nvSpPr>
+            <p:cNvPr id="30" name="Oval 29">
+              <a:extLst>
+                <a:ext uri="{FF2B5EF4-FFF2-40B4-BE49-F238E27FC236}">
+                  <a16:creationId xmlns:a16="http://schemas.microsoft.com/office/drawing/2014/main" id="{42EBE7C5-A2BA-4DB9-A00C-F4BC933FB619}"/>
+                </a:ext>
+              </a:extLst>
+            </p:cNvPr>
+            <p:cNvSpPr/>
+            <p:nvPr/>
+          </p:nvSpPr>
+          <p:spPr>
+            <a:xfrm>
+              <a:off x="6588100" y="3377928"/>
+              <a:ext cx="184347" cy="162555"/>
+            </a:xfrm>
+            <a:prstGeom prst="ellipse">
+              <a:avLst/>
+            </a:prstGeom>
+            <a:noFill/>
+            <a:ln w="9525">
+              <a:solidFill>
+                <a:schemeClr val="tx1">
+                  <a:lumMod val="95000"/>
+                  <a:lumOff val="5000"/>
+                </a:schemeClr>
+              </a:solidFill>
+            </a:ln>
+          </p:spPr>
+          <p:style>
+            <a:lnRef idx="2">
+              <a:schemeClr val="accent1">
+                <a:shade val="50000"/>
+              </a:schemeClr>
+            </a:lnRef>
+            <a:fillRef idx="1">
+              <a:schemeClr val="accent1"/>
+            </a:fillRef>
+            <a:effectRef idx="0">
+              <a:schemeClr val="accent1"/>
+            </a:effectRef>
+            <a:fontRef idx="minor">
+              <a:schemeClr val="lt1"/>
+            </a:fontRef>
+          </p:style>
+          <p:txBody>
+            <a:bodyPr rtlCol="0" anchor="ctr"/>
+            <a:lstStyle/>
+            <a:p>
+              <a:pPr algn="ctr"/>
+              <a:endParaRPr lang="en-US"/>
+            </a:p>
+          </p:txBody>
+        </p:sp>
+        <p:sp>
+          <p:nvSpPr>
+            <p:cNvPr id="31" name="Rectangle 30">
+              <a:extLst>
+                <a:ext uri="{FF2B5EF4-FFF2-40B4-BE49-F238E27FC236}">
+                  <a16:creationId xmlns:a16="http://schemas.microsoft.com/office/drawing/2014/main" id="{872351B5-94AD-4754-BB30-7E5CE3E176F2}"/>
+                </a:ext>
+              </a:extLst>
+            </p:cNvPr>
+            <p:cNvSpPr/>
+            <p:nvPr/>
+          </p:nvSpPr>
+          <p:spPr>
+            <a:xfrm>
+              <a:off x="6511291" y="3356724"/>
+              <a:ext cx="289610" cy="97153"/>
+            </a:xfrm>
+            <a:prstGeom prst="rect">
+              <a:avLst/>
+            </a:prstGeom>
+            <a:solidFill>
+              <a:schemeClr val="bg1"/>
+            </a:solidFill>
+            <a:ln w="9525">
+              <a:solidFill>
+                <a:schemeClr val="bg1"/>
+              </a:solidFill>
+            </a:ln>
+          </p:spPr>
+          <p:style>
+            <a:lnRef idx="2">
+              <a:schemeClr val="accent1">
+                <a:shade val="50000"/>
+              </a:schemeClr>
+            </a:lnRef>
+            <a:fillRef idx="1">
+              <a:schemeClr val="accent1"/>
+            </a:fillRef>
+            <a:effectRef idx="0">
+              <a:schemeClr val="accent1"/>
+            </a:effectRef>
+            <a:fontRef idx="minor">
+              <a:schemeClr val="lt1"/>
+            </a:fontRef>
+          </p:style>
+          <p:txBody>
+            <a:bodyPr rtlCol="0" anchor="ctr"/>
+            <a:lstStyle/>
+            <a:p>
+              <a:pPr algn="ctr"/>
+              <a:endParaRPr lang="en-US"/>
+            </a:p>
+          </p:txBody>
+        </p:sp>
+        <p:sp>
+          <p:nvSpPr>
+            <p:cNvPr id="32" name="Oval 31">
+              <a:extLst>
+                <a:ext uri="{FF2B5EF4-FFF2-40B4-BE49-F238E27FC236}">
+                  <a16:creationId xmlns:a16="http://schemas.microsoft.com/office/drawing/2014/main" id="{D1E6E115-BCA2-4002-B34D-61805F486564}"/>
+                </a:ext>
+              </a:extLst>
+            </p:cNvPr>
+            <p:cNvSpPr/>
+            <p:nvPr/>
+          </p:nvSpPr>
+          <p:spPr>
+            <a:xfrm>
+              <a:off x="6615396" y="3385504"/>
+              <a:ext cx="124606" cy="126516"/>
+            </a:xfrm>
+            <a:prstGeom prst="ellipse">
+              <a:avLst/>
+            </a:prstGeom>
+            <a:noFill/>
+            <a:ln w="9525">
+              <a:solidFill>
+                <a:schemeClr val="tx1">
+                  <a:lumMod val="95000"/>
+                  <a:lumOff val="5000"/>
+                </a:schemeClr>
+              </a:solidFill>
+            </a:ln>
+          </p:spPr>
+          <p:style>
+            <a:lnRef idx="2">
+              <a:schemeClr val="accent1">
+                <a:shade val="50000"/>
+              </a:schemeClr>
+            </a:lnRef>
+            <a:fillRef idx="1">
+              <a:schemeClr val="accent1"/>
+            </a:fillRef>
+            <a:effectRef idx="0">
+              <a:schemeClr val="accent1"/>
+            </a:effectRef>
+            <a:fontRef idx="minor">
+              <a:schemeClr val="lt1"/>
+            </a:fontRef>
+          </p:style>
+          <p:txBody>
+            <a:bodyPr rtlCol="0" anchor="ctr"/>
+            <a:lstStyle/>
+            <a:p>
+              <a:pPr algn="ctr"/>
+              <a:endParaRPr lang="en-US"/>
+            </a:p>
+          </p:txBody>
+        </p:sp>
+        <p:cxnSp>
+          <p:nvCxnSpPr>
+            <p:cNvPr id="33" name="Straight Connector 32">
+              <a:extLst>
+                <a:ext uri="{FF2B5EF4-FFF2-40B4-BE49-F238E27FC236}">
+                  <a16:creationId xmlns:a16="http://schemas.microsoft.com/office/drawing/2014/main" id="{6387681E-E74B-4FF1-B841-6DB7534844A3}"/>
+                </a:ext>
+              </a:extLst>
+            </p:cNvPr>
+            <p:cNvCxnSpPr>
+              <a:cxnSpLocks/>
+            </p:cNvCxnSpPr>
+            <p:nvPr/>
+          </p:nvCxnSpPr>
+          <p:spPr>
+            <a:xfrm>
+              <a:off x="6677699" y="3540490"/>
+              <a:ext cx="0" cy="126516"/>
+            </a:xfrm>
+            <a:prstGeom prst="line">
+              <a:avLst/>
+            </a:prstGeom>
+            <a:noFill/>
+            <a:ln w="9525">
+              <a:solidFill>
+                <a:schemeClr val="tx1">
+                  <a:lumMod val="95000"/>
+                  <a:lumOff val="5000"/>
+                </a:schemeClr>
+              </a:solidFill>
+            </a:ln>
+          </p:spPr>
+          <p:style>
+            <a:lnRef idx="2">
+              <a:schemeClr val="accent1">
+                <a:shade val="50000"/>
+              </a:schemeClr>
+            </a:lnRef>
+            <a:fillRef idx="1">
+              <a:schemeClr val="accent1"/>
+            </a:fillRef>
+            <a:effectRef idx="0">
+              <a:schemeClr val="accent1"/>
+            </a:effectRef>
+            <a:fontRef idx="minor">
+              <a:schemeClr val="lt1"/>
+            </a:fontRef>
+          </p:style>
+        </p:cxnSp>
+        <p:cxnSp>
+          <p:nvCxnSpPr>
+            <p:cNvPr id="34" name="Straight Connector 33">
+              <a:extLst>
+                <a:ext uri="{FF2B5EF4-FFF2-40B4-BE49-F238E27FC236}">
+                  <a16:creationId xmlns:a16="http://schemas.microsoft.com/office/drawing/2014/main" id="{6E5F9F93-14E0-4E5C-BE53-BB35819BAD49}"/>
+                </a:ext>
+              </a:extLst>
+            </p:cNvPr>
+            <p:cNvCxnSpPr>
+              <a:cxnSpLocks/>
+            </p:cNvCxnSpPr>
+            <p:nvPr/>
+          </p:nvCxnSpPr>
+          <p:spPr>
+            <a:xfrm>
+              <a:off x="6621226" y="3595620"/>
+              <a:ext cx="124606" cy="0"/>
+            </a:xfrm>
+            <a:prstGeom prst="line">
+              <a:avLst/>
+            </a:prstGeom>
+            <a:noFill/>
+            <a:ln w="9525">
+              <a:solidFill>
+                <a:schemeClr val="tx1">
+                  <a:lumMod val="95000"/>
+                  <a:lumOff val="5000"/>
+                </a:schemeClr>
+              </a:solidFill>
+            </a:ln>
+          </p:spPr>
+          <p:style>
+            <a:lnRef idx="2">
+              <a:schemeClr val="accent1">
+                <a:shade val="50000"/>
+              </a:schemeClr>
+            </a:lnRef>
+            <a:fillRef idx="1">
+              <a:schemeClr val="accent1"/>
+            </a:fillRef>
+            <a:effectRef idx="0">
+              <a:schemeClr val="accent1"/>
+            </a:effectRef>
+            <a:fontRef idx="minor">
+              <a:schemeClr val="lt1"/>
+            </a:fontRef>
+          </p:style>
+        </p:cxnSp>
+      </p:grpSp>
+      <p:cxnSp>
+        <p:nvCxnSpPr>
+          <p:cNvPr id="36" name="Straight Arrow Connector 35">
+            <a:extLst>
+              <a:ext uri="{FF2B5EF4-FFF2-40B4-BE49-F238E27FC236}">
+                <a16:creationId xmlns:a16="http://schemas.microsoft.com/office/drawing/2014/main" id="{1546AA14-4163-422E-A713-880E33A9500E}"/>
+              </a:ext>
+            </a:extLst>
+          </p:cNvPr>
+          <p:cNvCxnSpPr>
+            <a:cxnSpLocks/>
+            <a:stCxn id="5" idx="2"/>
+          </p:cNvCxnSpPr>
+          <p:nvPr/>
+        </p:nvCxnSpPr>
+        <p:spPr>
+          <a:xfrm flipH="1">
+            <a:off x="6618605" y="677325"/>
+            <a:ext cx="1" cy="772958"/>
+          </a:xfrm>
+          <a:prstGeom prst="straightConnector1">
+            <a:avLst/>
+          </a:prstGeom>
+          <a:ln>
+            <a:solidFill>
+              <a:schemeClr val="tx1">
+                <a:lumMod val="95000"/>
+                <a:lumOff val="5000"/>
+              </a:schemeClr>
+            </a:solidFill>
+            <a:headEnd type="none" w="med" len="med"/>
+            <a:tailEnd type="arrow" w="med" len="med"/>
+          </a:ln>
+        </p:spPr>
+        <p:style>
+          <a:lnRef idx="1">
+            <a:schemeClr val="accent1"/>
+          </a:lnRef>
+          <a:fillRef idx="0">
+            <a:schemeClr val="accent1"/>
+          </a:fillRef>
+          <a:effectRef idx="0">
+            <a:schemeClr val="accent1"/>
+          </a:effectRef>
+          <a:fontRef idx="minor">
+            <a:schemeClr val="tx1"/>
+          </a:fontRef>
+        </p:style>
+      </p:cxnSp>
+      <p:sp>
+        <p:nvSpPr>
+          <p:cNvPr id="38" name="TextBox 37">
+            <a:extLst>
+              <a:ext uri="{FF2B5EF4-FFF2-40B4-BE49-F238E27FC236}">
+                <a16:creationId xmlns:a16="http://schemas.microsoft.com/office/drawing/2014/main" id="{6C1A3FE1-8C28-4F55-83A5-204B2B79F696}"/>
+              </a:ext>
+            </a:extLst>
+          </p:cNvPr>
+          <p:cNvSpPr txBox="1"/>
+          <p:nvPr/>
+        </p:nvSpPr>
+        <p:spPr>
+          <a:xfrm rot="778896">
+            <a:off x="5534366" y="166581"/>
+            <a:ext cx="564578" cy="230832"/>
+          </a:xfrm>
+          <a:prstGeom prst="rect">
+            <a:avLst/>
+          </a:prstGeom>
+          <a:noFill/>
+        </p:spPr>
+        <p:txBody>
+          <a:bodyPr wrap="none" rtlCol="0">
+            <a:spAutoFit/>
+          </a:bodyPr>
+          <a:lstStyle/>
+          <a:p>
+            <a:r>
+              <a:rPr lang="en-US" sz="900" dirty="0"/>
+              <a:t>signifies</a:t>
+            </a:r>
+          </a:p>
+        </p:txBody>
+      </p:sp>
+      <p:sp>
+        <p:nvSpPr>
+          <p:cNvPr id="40" name="TextBox 39">
+            <a:extLst>
+              <a:ext uri="{FF2B5EF4-FFF2-40B4-BE49-F238E27FC236}">
+                <a16:creationId xmlns:a16="http://schemas.microsoft.com/office/drawing/2014/main" id="{3E3DD94A-4E6F-4882-B01F-09A6F14E4699}"/>
+              </a:ext>
+            </a:extLst>
+          </p:cNvPr>
+          <p:cNvSpPr txBox="1"/>
+          <p:nvPr/>
+        </p:nvSpPr>
+        <p:spPr>
+          <a:xfrm rot="20476662">
+            <a:off x="5394045" y="617656"/>
+            <a:ext cx="564578" cy="230832"/>
+          </a:xfrm>
+          <a:prstGeom prst="rect">
+            <a:avLst/>
+          </a:prstGeom>
+          <a:noFill/>
+        </p:spPr>
+        <p:txBody>
+          <a:bodyPr wrap="none" rtlCol="0">
+            <a:spAutoFit/>
+          </a:bodyPr>
+          <a:lstStyle/>
+          <a:p>
+            <a:r>
+              <a:rPr lang="en-US" sz="900" dirty="0"/>
+              <a:t>signifies</a:t>
+            </a:r>
+          </a:p>
+        </p:txBody>
+      </p:sp>
+      <p:sp>
+        <p:nvSpPr>
+          <p:cNvPr id="41" name="TextBox 40">
+            <a:extLst>
+              <a:ext uri="{FF2B5EF4-FFF2-40B4-BE49-F238E27FC236}">
+                <a16:creationId xmlns:a16="http://schemas.microsoft.com/office/drawing/2014/main" id="{F7C404ED-B133-4287-8DF3-432D4D4DF00F}"/>
+              </a:ext>
+            </a:extLst>
+          </p:cNvPr>
+          <p:cNvSpPr txBox="1"/>
+          <p:nvPr/>
+        </p:nvSpPr>
+        <p:spPr>
+          <a:xfrm rot="5400000">
+            <a:off x="6355334" y="913857"/>
+            <a:ext cx="726481" cy="230832"/>
+          </a:xfrm>
+          <a:prstGeom prst="rect">
+            <a:avLst/>
+          </a:prstGeom>
+          <a:noFill/>
+        </p:spPr>
+        <p:txBody>
+          <a:bodyPr wrap="none" rtlCol="0">
+            <a:spAutoFit/>
+          </a:bodyPr>
+          <a:lstStyle/>
+          <a:p>
+            <a:r>
+              <a:rPr lang="en-US" sz="900" dirty="0" err="1"/>
+              <a:t>prefSymbol</a:t>
+            </a:r>
+            <a:endParaRPr lang="en-US" sz="900" dirty="0"/>
+          </a:p>
+        </p:txBody>
+      </p:sp>
+      <p:sp>
+        <p:nvSpPr>
+          <p:cNvPr id="62" name="TextBox 61">
+            <a:extLst>
+              <a:ext uri="{FF2B5EF4-FFF2-40B4-BE49-F238E27FC236}">
+                <a16:creationId xmlns:a16="http://schemas.microsoft.com/office/drawing/2014/main" id="{A237B13F-709D-4CFB-9574-9196971B55AF}"/>
+              </a:ext>
+            </a:extLst>
+          </p:cNvPr>
+          <p:cNvSpPr txBox="1"/>
+          <p:nvPr/>
+        </p:nvSpPr>
+        <p:spPr>
+          <a:xfrm>
+            <a:off x="6031680" y="2310104"/>
+            <a:ext cx="1001899" cy="230832"/>
+          </a:xfrm>
+          <a:prstGeom prst="rect">
+            <a:avLst/>
+          </a:prstGeom>
+          <a:noFill/>
+          <a:ln>
+            <a:solidFill>
+              <a:schemeClr val="tx1">
+                <a:lumMod val="95000"/>
+                <a:lumOff val="5000"/>
+              </a:schemeClr>
+            </a:solidFill>
+          </a:ln>
+        </p:spPr>
+        <p:txBody>
+          <a:bodyPr wrap="square" rtlCol="0">
+            <a:spAutoFit/>
+          </a:bodyPr>
+          <a:lstStyle/>
+          <a:p>
+            <a:pPr algn="ctr"/>
+            <a:r>
+              <a:rPr lang="en-US" sz="900" dirty="0"/>
+              <a:t>Methane</a:t>
+            </a:r>
+          </a:p>
+        </p:txBody>
+      </p:sp>
+      <p:sp>
+        <p:nvSpPr>
+          <p:cNvPr id="63" name="TextBox 62">
+            <a:extLst>
+              <a:ext uri="{FF2B5EF4-FFF2-40B4-BE49-F238E27FC236}">
+                <a16:creationId xmlns:a16="http://schemas.microsoft.com/office/drawing/2014/main" id="{1037A0A9-9A3E-4671-9EFD-0F1680B2D546}"/>
+              </a:ext>
+            </a:extLst>
+          </p:cNvPr>
+          <p:cNvSpPr txBox="1"/>
+          <p:nvPr/>
+        </p:nvSpPr>
+        <p:spPr>
+          <a:xfrm>
+            <a:off x="4407714" y="2780071"/>
+            <a:ext cx="1001899" cy="230832"/>
+          </a:xfrm>
+          <a:prstGeom prst="rect">
+            <a:avLst/>
+          </a:prstGeom>
+          <a:noFill/>
+          <a:ln>
+            <a:solidFill>
+              <a:schemeClr val="tx1">
+                <a:lumMod val="95000"/>
+                <a:lumOff val="5000"/>
+              </a:schemeClr>
+            </a:solidFill>
+          </a:ln>
+        </p:spPr>
+        <p:txBody>
+          <a:bodyPr wrap="square" rtlCol="0">
+            <a:spAutoFit/>
+          </a:bodyPr>
+          <a:lstStyle/>
+          <a:p>
+            <a:pPr algn="ctr"/>
+            <a:r>
+              <a:rPr lang="en-US" sz="900" dirty="0"/>
+              <a:t>Pluto</a:t>
+            </a:r>
+          </a:p>
+        </p:txBody>
+      </p:sp>
+      <p:sp>
+        <p:nvSpPr>
+          <p:cNvPr id="64" name="TextBox 63">
+            <a:extLst>
+              <a:ext uri="{FF2B5EF4-FFF2-40B4-BE49-F238E27FC236}">
+                <a16:creationId xmlns:a16="http://schemas.microsoft.com/office/drawing/2014/main" id="{4AF38764-3295-4CDE-B232-8453F6691F87}"/>
+              </a:ext>
+            </a:extLst>
+          </p:cNvPr>
+          <p:cNvSpPr txBox="1"/>
+          <p:nvPr/>
+        </p:nvSpPr>
+        <p:spPr>
+          <a:xfrm>
+            <a:off x="5941684" y="3143217"/>
+            <a:ext cx="1181889" cy="230832"/>
+          </a:xfrm>
+          <a:prstGeom prst="rect">
+            <a:avLst/>
+          </a:prstGeom>
+          <a:noFill/>
+          <a:ln>
+            <a:solidFill>
+              <a:schemeClr val="tx1">
+                <a:lumMod val="95000"/>
+                <a:lumOff val="5000"/>
+              </a:schemeClr>
+            </a:solidFill>
+          </a:ln>
+        </p:spPr>
+        <p:txBody>
+          <a:bodyPr wrap="square" rtlCol="0">
+            <a:spAutoFit/>
+          </a:bodyPr>
+          <a:lstStyle/>
+          <a:p>
+            <a:pPr algn="ctr"/>
+            <a:r>
+              <a:rPr lang="en-US" sz="900" dirty="0"/>
+              <a:t>Nitrogen</a:t>
+            </a:r>
+          </a:p>
+        </p:txBody>
+      </p:sp>
+      <p:cxnSp>
+        <p:nvCxnSpPr>
+          <p:cNvPr id="65" name="Straight Arrow Connector 64">
+            <a:extLst>
+              <a:ext uri="{FF2B5EF4-FFF2-40B4-BE49-F238E27FC236}">
+                <a16:creationId xmlns:a16="http://schemas.microsoft.com/office/drawing/2014/main" id="{80F12FAB-C000-4F4A-A149-838831612429}"/>
+              </a:ext>
+            </a:extLst>
+          </p:cNvPr>
+          <p:cNvCxnSpPr>
+            <a:cxnSpLocks/>
+          </p:cNvCxnSpPr>
+          <p:nvPr/>
+        </p:nvCxnSpPr>
+        <p:spPr>
+          <a:xfrm flipV="1">
+            <a:off x="5315347" y="2556291"/>
+            <a:ext cx="716333" cy="230832"/>
+          </a:xfrm>
+          <a:prstGeom prst="straightConnector1">
+            <a:avLst/>
+          </a:prstGeom>
+          <a:ln>
+            <a:solidFill>
+              <a:schemeClr val="tx1">
+                <a:lumMod val="95000"/>
+                <a:lumOff val="5000"/>
+              </a:schemeClr>
+            </a:solidFill>
+            <a:headEnd type="none" w="med" len="med"/>
+            <a:tailEnd type="arrow" w="med" len="med"/>
+          </a:ln>
+        </p:spPr>
+        <p:style>
+          <a:lnRef idx="1">
+            <a:schemeClr val="accent1"/>
+          </a:lnRef>
+          <a:fillRef idx="0">
+            <a:schemeClr val="accent1"/>
+          </a:fillRef>
+          <a:effectRef idx="0">
+            <a:schemeClr val="accent1"/>
+          </a:effectRef>
+          <a:fontRef idx="minor">
+            <a:schemeClr val="tx1"/>
+          </a:fontRef>
+        </p:style>
+      </p:cxnSp>
+      <p:cxnSp>
+        <p:nvCxnSpPr>
+          <p:cNvPr id="74" name="Straight Arrow Connector 73">
+            <a:extLst>
+              <a:ext uri="{FF2B5EF4-FFF2-40B4-BE49-F238E27FC236}">
+                <a16:creationId xmlns:a16="http://schemas.microsoft.com/office/drawing/2014/main" id="{DC9F0653-52BB-463B-9ED2-152A162275B6}"/>
+              </a:ext>
+            </a:extLst>
+          </p:cNvPr>
+          <p:cNvCxnSpPr>
+            <a:cxnSpLocks/>
+            <a:stCxn id="63" idx="2"/>
+          </p:cNvCxnSpPr>
+          <p:nvPr/>
+        </p:nvCxnSpPr>
+        <p:spPr>
+          <a:xfrm flipH="1">
+            <a:off x="4908663" y="3010903"/>
+            <a:ext cx="1" cy="772958"/>
+          </a:xfrm>
+          <a:prstGeom prst="straightConnector1">
+            <a:avLst/>
+          </a:prstGeom>
+          <a:ln>
+            <a:solidFill>
+              <a:schemeClr val="tx1">
+                <a:lumMod val="95000"/>
+                <a:lumOff val="5000"/>
+              </a:schemeClr>
+            </a:solidFill>
+            <a:headEnd type="none" w="med" len="med"/>
+            <a:tailEnd type="arrow" w="med" len="med"/>
+          </a:ln>
+        </p:spPr>
+        <p:style>
+          <a:lnRef idx="1">
+            <a:schemeClr val="accent1"/>
+          </a:lnRef>
+          <a:fillRef idx="0">
+            <a:schemeClr val="accent1"/>
+          </a:fillRef>
+          <a:effectRef idx="0">
+            <a:schemeClr val="accent1"/>
+          </a:effectRef>
+          <a:fontRef idx="minor">
+            <a:schemeClr val="tx1"/>
+          </a:fontRef>
+        </p:style>
+      </p:cxnSp>
+      <p:sp>
+        <p:nvSpPr>
+          <p:cNvPr id="75" name="TextBox 74">
+            <a:extLst>
+              <a:ext uri="{FF2B5EF4-FFF2-40B4-BE49-F238E27FC236}">
+                <a16:creationId xmlns:a16="http://schemas.microsoft.com/office/drawing/2014/main" id="{90972D65-ECCC-4CB9-85A5-0B64025225F6}"/>
+              </a:ext>
+            </a:extLst>
+          </p:cNvPr>
+          <p:cNvSpPr txBox="1"/>
+          <p:nvPr/>
+        </p:nvSpPr>
+        <p:spPr>
+          <a:xfrm rot="20537847">
+            <a:off x="5371752" y="2469110"/>
+            <a:ext cx="562975" cy="230832"/>
+          </a:xfrm>
+          <a:prstGeom prst="rect">
+            <a:avLst/>
+          </a:prstGeom>
+          <a:noFill/>
+        </p:spPr>
+        <p:txBody>
+          <a:bodyPr wrap="none" rtlCol="0">
+            <a:spAutoFit/>
+          </a:bodyPr>
+          <a:lstStyle/>
+          <a:p>
+            <a:r>
+              <a:rPr lang="en-US" sz="900" dirty="0" err="1"/>
+              <a:t>madeOf</a:t>
+            </a:r>
+            <a:endParaRPr lang="en-US" sz="900" dirty="0"/>
+          </a:p>
+        </p:txBody>
+      </p:sp>
+      <p:sp>
+        <p:nvSpPr>
+          <p:cNvPr id="76" name="TextBox 75">
+            <a:extLst>
+              <a:ext uri="{FF2B5EF4-FFF2-40B4-BE49-F238E27FC236}">
+                <a16:creationId xmlns:a16="http://schemas.microsoft.com/office/drawing/2014/main" id="{AC1B1793-646B-4AC0-AF42-2FD5853E7E6C}"/>
+              </a:ext>
+            </a:extLst>
+          </p:cNvPr>
+          <p:cNvSpPr txBox="1"/>
+          <p:nvPr/>
+        </p:nvSpPr>
+        <p:spPr>
+          <a:xfrm rot="753859">
+            <a:off x="5403071" y="2900364"/>
+            <a:ext cx="562975" cy="230832"/>
+          </a:xfrm>
+          <a:prstGeom prst="rect">
+            <a:avLst/>
+          </a:prstGeom>
+          <a:noFill/>
+        </p:spPr>
+        <p:txBody>
+          <a:bodyPr wrap="none" rtlCol="0">
+            <a:spAutoFit/>
+          </a:bodyPr>
+          <a:lstStyle/>
+          <a:p>
+            <a:r>
+              <a:rPr lang="en-US" sz="900" dirty="0" err="1"/>
+              <a:t>madeOf</a:t>
+            </a:r>
+            <a:endParaRPr lang="en-US" sz="900" dirty="0"/>
+          </a:p>
+        </p:txBody>
+      </p:sp>
+      <p:sp>
+        <p:nvSpPr>
+          <p:cNvPr id="77" name="TextBox 76">
+            <a:extLst>
+              <a:ext uri="{FF2B5EF4-FFF2-40B4-BE49-F238E27FC236}">
+                <a16:creationId xmlns:a16="http://schemas.microsoft.com/office/drawing/2014/main" id="{E7A96F2C-BDFE-431C-B99B-58F9C465E915}"/>
+              </a:ext>
+            </a:extLst>
+          </p:cNvPr>
+          <p:cNvSpPr txBox="1"/>
+          <p:nvPr/>
+        </p:nvSpPr>
+        <p:spPr>
+          <a:xfrm rot="5400000">
+            <a:off x="4660838" y="3263820"/>
+            <a:ext cx="726481" cy="230832"/>
+          </a:xfrm>
+          <a:prstGeom prst="rect">
+            <a:avLst/>
+          </a:prstGeom>
+          <a:noFill/>
+        </p:spPr>
+        <p:txBody>
+          <a:bodyPr wrap="none" rtlCol="0">
+            <a:spAutoFit/>
+          </a:bodyPr>
+          <a:lstStyle/>
+          <a:p>
+            <a:r>
+              <a:rPr lang="en-US" sz="900" dirty="0" err="1"/>
+              <a:t>prefSymbol</a:t>
+            </a:r>
+            <a:endParaRPr lang="en-US" sz="900" dirty="0"/>
+          </a:p>
+        </p:txBody>
+      </p:sp>
+      <p:sp>
+        <p:nvSpPr>
+          <p:cNvPr id="45" name="Rectangle 44">
+            <a:extLst>
+              <a:ext uri="{FF2B5EF4-FFF2-40B4-BE49-F238E27FC236}">
+                <a16:creationId xmlns:a16="http://schemas.microsoft.com/office/drawing/2014/main" id="{8E0E6F27-F2FC-49CD-9556-7FEE99E66E66}"/>
+              </a:ext>
+            </a:extLst>
+          </p:cNvPr>
+          <p:cNvSpPr/>
+          <p:nvPr/>
+        </p:nvSpPr>
+        <p:spPr>
+          <a:xfrm>
+            <a:off x="6434744" y="1450283"/>
+            <a:ext cx="365061" cy="453227"/>
+          </a:xfrm>
+          <a:prstGeom prst="rect">
+            <a:avLst/>
+          </a:prstGeom>
+          <a:noFill/>
+          <a:ln>
+            <a:solidFill>
+              <a:schemeClr val="tx1">
+                <a:lumMod val="95000"/>
+                <a:lumOff val="5000"/>
+              </a:schemeClr>
+            </a:solidFill>
+          </a:ln>
+        </p:spPr>
+        <p:style>
+          <a:lnRef idx="2">
+            <a:schemeClr val="accent1">
+              <a:shade val="50000"/>
+            </a:schemeClr>
+          </a:lnRef>
+          <a:fillRef idx="1">
+            <a:schemeClr val="accent1"/>
+          </a:fillRef>
+          <a:effectRef idx="0">
+            <a:schemeClr val="accent1"/>
+          </a:effectRef>
+          <a:fontRef idx="minor">
+            <a:schemeClr val="lt1"/>
+          </a:fontRef>
+        </p:style>
+        <p:txBody>
+          <a:bodyPr rtlCol="0" anchor="ctr"/>
+          <a:lstStyle/>
+          <a:p>
+            <a:pPr algn="ctr"/>
+            <a:endParaRPr lang="en-US"/>
+          </a:p>
+        </p:txBody>
+      </p:sp>
+      <p:cxnSp>
+        <p:nvCxnSpPr>
+          <p:cNvPr id="81" name="Straight Arrow Connector 80">
+            <a:extLst>
+              <a:ext uri="{FF2B5EF4-FFF2-40B4-BE49-F238E27FC236}">
+                <a16:creationId xmlns:a16="http://schemas.microsoft.com/office/drawing/2014/main" id="{DDFBEEE5-ACDE-437F-A746-6DE6FCFF6334}"/>
+              </a:ext>
+            </a:extLst>
+          </p:cNvPr>
+          <p:cNvCxnSpPr>
+            <a:cxnSpLocks/>
+          </p:cNvCxnSpPr>
+          <p:nvPr/>
+        </p:nvCxnSpPr>
+        <p:spPr>
+          <a:xfrm>
+            <a:off x="5345713" y="3010903"/>
+            <a:ext cx="595971" cy="132314"/>
+          </a:xfrm>
+          <a:prstGeom prst="straightConnector1">
+            <a:avLst/>
+          </a:prstGeom>
+          <a:ln>
+            <a:solidFill>
+              <a:schemeClr val="tx1">
+                <a:lumMod val="95000"/>
+                <a:lumOff val="5000"/>
+              </a:schemeClr>
+            </a:solidFill>
+            <a:headEnd type="none" w="med" len="med"/>
+            <a:tailEnd type="arrow" w="med" len="med"/>
+          </a:ln>
+        </p:spPr>
+        <p:style>
+          <a:lnRef idx="1">
+            <a:schemeClr val="accent1"/>
+          </a:lnRef>
+          <a:fillRef idx="0">
+            <a:schemeClr val="accent1"/>
+          </a:fillRef>
+          <a:effectRef idx="0">
+            <a:schemeClr val="accent1"/>
+          </a:effectRef>
+          <a:fontRef idx="minor">
+            <a:schemeClr val="tx1"/>
+          </a:fontRef>
+        </p:style>
+      </p:cxnSp>
+      <p:sp>
+        <p:nvSpPr>
+          <p:cNvPr id="84" name="TextBox 83">
+            <a:extLst>
+              <a:ext uri="{FF2B5EF4-FFF2-40B4-BE49-F238E27FC236}">
+                <a16:creationId xmlns:a16="http://schemas.microsoft.com/office/drawing/2014/main" id="{100D6023-4660-4CDE-AD72-364528B24BB5}"/>
+              </a:ext>
+            </a:extLst>
+          </p:cNvPr>
+          <p:cNvSpPr txBox="1"/>
+          <p:nvPr/>
+        </p:nvSpPr>
+        <p:spPr>
+          <a:xfrm>
+            <a:off x="6310289" y="7034398"/>
+            <a:ext cx="328647" cy="369332"/>
+          </a:xfrm>
+          <a:prstGeom prst="rect">
+            <a:avLst/>
+          </a:prstGeom>
+          <a:noFill/>
+          <a:ln>
+            <a:solidFill>
+              <a:schemeClr val="tx1">
+                <a:lumMod val="95000"/>
+                <a:lumOff val="5000"/>
+              </a:schemeClr>
+            </a:solidFill>
+          </a:ln>
+        </p:spPr>
+        <p:txBody>
+          <a:bodyPr wrap="square" rtlCol="0">
+            <a:spAutoFit/>
+          </a:bodyPr>
+          <a:lstStyle/>
+          <a:p>
+            <a:pPr algn="ctr"/>
+            <a:r>
+              <a:rPr lang="en-US" dirty="0"/>
+              <a:t>♇</a:t>
+            </a:r>
+            <a:endParaRPr lang="en-US" sz="900" dirty="0"/>
+          </a:p>
+        </p:txBody>
+      </p:sp>
+      <p:sp>
+        <p:nvSpPr>
+          <p:cNvPr id="85" name="TextBox 84">
+            <a:extLst>
+              <a:ext uri="{FF2B5EF4-FFF2-40B4-BE49-F238E27FC236}">
+                <a16:creationId xmlns:a16="http://schemas.microsoft.com/office/drawing/2014/main" id="{0161229C-1B37-405F-A1AD-B44DE7CEE25A}"/>
+              </a:ext>
+            </a:extLst>
+          </p:cNvPr>
+          <p:cNvSpPr txBox="1"/>
+          <p:nvPr/>
+        </p:nvSpPr>
+        <p:spPr>
+          <a:xfrm>
+            <a:off x="7557911" y="5514717"/>
+            <a:ext cx="1001899" cy="230832"/>
+          </a:xfrm>
+          <a:prstGeom prst="rect">
+            <a:avLst/>
+          </a:prstGeom>
+          <a:noFill/>
+          <a:ln>
+            <a:solidFill>
+              <a:schemeClr val="tx1">
+                <a:lumMod val="95000"/>
+                <a:lumOff val="5000"/>
+              </a:schemeClr>
+            </a:solidFill>
+          </a:ln>
+        </p:spPr>
+        <p:txBody>
+          <a:bodyPr wrap="square" rtlCol="0">
+            <a:spAutoFit/>
+          </a:bodyPr>
+          <a:lstStyle/>
+          <a:p>
+            <a:pPr algn="ctr"/>
+            <a:r>
+              <a:rPr lang="en-US" sz="900" dirty="0"/>
+              <a:t>Methane</a:t>
+            </a:r>
+          </a:p>
+        </p:txBody>
+      </p:sp>
+      <p:sp>
+        <p:nvSpPr>
+          <p:cNvPr id="86" name="TextBox 85">
+            <a:extLst>
+              <a:ext uri="{FF2B5EF4-FFF2-40B4-BE49-F238E27FC236}">
+                <a16:creationId xmlns:a16="http://schemas.microsoft.com/office/drawing/2014/main" id="{2D456171-F7C5-4430-A1E3-7D81C6BC7707}"/>
+              </a:ext>
+            </a:extLst>
+          </p:cNvPr>
+          <p:cNvSpPr txBox="1"/>
+          <p:nvPr/>
+        </p:nvSpPr>
+        <p:spPr>
+          <a:xfrm>
+            <a:off x="5933945" y="5984684"/>
+            <a:ext cx="1001899" cy="230832"/>
+          </a:xfrm>
+          <a:prstGeom prst="rect">
+            <a:avLst/>
+          </a:prstGeom>
+          <a:noFill/>
+          <a:ln>
+            <a:solidFill>
+              <a:schemeClr val="tx1">
+                <a:lumMod val="95000"/>
+                <a:lumOff val="5000"/>
+              </a:schemeClr>
+            </a:solidFill>
+          </a:ln>
+        </p:spPr>
+        <p:txBody>
+          <a:bodyPr wrap="square" rtlCol="0">
+            <a:spAutoFit/>
+          </a:bodyPr>
+          <a:lstStyle/>
+          <a:p>
+            <a:pPr algn="ctr"/>
+            <a:r>
+              <a:rPr lang="en-US" sz="900" dirty="0"/>
+              <a:t>Pluto</a:t>
+            </a:r>
+          </a:p>
+        </p:txBody>
+      </p:sp>
+      <p:sp>
+        <p:nvSpPr>
+          <p:cNvPr id="87" name="TextBox 86">
+            <a:extLst>
+              <a:ext uri="{FF2B5EF4-FFF2-40B4-BE49-F238E27FC236}">
+                <a16:creationId xmlns:a16="http://schemas.microsoft.com/office/drawing/2014/main" id="{50446F50-09B7-444D-ACCA-0D22F08303B2}"/>
+              </a:ext>
+            </a:extLst>
+          </p:cNvPr>
+          <p:cNvSpPr txBox="1"/>
+          <p:nvPr/>
+        </p:nvSpPr>
+        <p:spPr>
+          <a:xfrm>
+            <a:off x="7467915" y="6347830"/>
+            <a:ext cx="1181889" cy="230832"/>
+          </a:xfrm>
+          <a:prstGeom prst="rect">
+            <a:avLst/>
+          </a:prstGeom>
+          <a:noFill/>
+          <a:ln>
+            <a:solidFill>
+              <a:schemeClr val="tx1">
+                <a:lumMod val="95000"/>
+                <a:lumOff val="5000"/>
+              </a:schemeClr>
+            </a:solidFill>
+          </a:ln>
+        </p:spPr>
+        <p:txBody>
+          <a:bodyPr wrap="square" rtlCol="0">
+            <a:spAutoFit/>
+          </a:bodyPr>
+          <a:lstStyle/>
+          <a:p>
+            <a:pPr algn="ctr"/>
+            <a:r>
+              <a:rPr lang="en-US" sz="900" dirty="0"/>
+              <a:t>Nitrogen</a:t>
+            </a:r>
+          </a:p>
+        </p:txBody>
+      </p:sp>
+      <p:cxnSp>
+        <p:nvCxnSpPr>
+          <p:cNvPr id="88" name="Straight Arrow Connector 87">
+            <a:extLst>
+              <a:ext uri="{FF2B5EF4-FFF2-40B4-BE49-F238E27FC236}">
+                <a16:creationId xmlns:a16="http://schemas.microsoft.com/office/drawing/2014/main" id="{F628F8A0-2FDF-40E6-BDD8-DDE747F6E895}"/>
+              </a:ext>
+            </a:extLst>
+          </p:cNvPr>
+          <p:cNvCxnSpPr>
+            <a:cxnSpLocks/>
+          </p:cNvCxnSpPr>
+          <p:nvPr/>
+        </p:nvCxnSpPr>
+        <p:spPr>
+          <a:xfrm flipV="1">
+            <a:off x="6841578" y="5760904"/>
+            <a:ext cx="716333" cy="230832"/>
+          </a:xfrm>
+          <a:prstGeom prst="straightConnector1">
+            <a:avLst/>
+          </a:prstGeom>
+          <a:ln>
+            <a:solidFill>
+              <a:schemeClr val="tx1">
+                <a:lumMod val="95000"/>
+                <a:lumOff val="5000"/>
+              </a:schemeClr>
+            </a:solidFill>
+            <a:headEnd type="none" w="med" len="med"/>
+            <a:tailEnd type="arrow" w="med" len="med"/>
+          </a:ln>
+        </p:spPr>
+        <p:style>
+          <a:lnRef idx="1">
+            <a:schemeClr val="accent1"/>
+          </a:lnRef>
+          <a:fillRef idx="0">
+            <a:schemeClr val="accent1"/>
+          </a:fillRef>
+          <a:effectRef idx="0">
+            <a:schemeClr val="accent1"/>
+          </a:effectRef>
+          <a:fontRef idx="minor">
+            <a:schemeClr val="tx1"/>
+          </a:fontRef>
+        </p:style>
+      </p:cxnSp>
+      <p:cxnSp>
+        <p:nvCxnSpPr>
+          <p:cNvPr id="89" name="Straight Arrow Connector 88">
+            <a:extLst>
+              <a:ext uri="{FF2B5EF4-FFF2-40B4-BE49-F238E27FC236}">
+                <a16:creationId xmlns:a16="http://schemas.microsoft.com/office/drawing/2014/main" id="{E9856425-23EC-4B17-A12C-7658B0A82797}"/>
+              </a:ext>
+            </a:extLst>
+          </p:cNvPr>
+          <p:cNvCxnSpPr>
+            <a:cxnSpLocks/>
+            <a:stCxn id="86" idx="2"/>
+          </p:cNvCxnSpPr>
+          <p:nvPr/>
+        </p:nvCxnSpPr>
+        <p:spPr>
+          <a:xfrm flipH="1">
+            <a:off x="6434894" y="6215516"/>
+            <a:ext cx="1" cy="772958"/>
+          </a:xfrm>
+          <a:prstGeom prst="straightConnector1">
+            <a:avLst/>
+          </a:prstGeom>
+          <a:ln>
+            <a:solidFill>
+              <a:schemeClr val="tx1">
+                <a:lumMod val="95000"/>
+                <a:lumOff val="5000"/>
+              </a:schemeClr>
+            </a:solidFill>
+            <a:headEnd type="none" w="med" len="med"/>
+            <a:tailEnd type="arrow" w="med" len="med"/>
+          </a:ln>
+        </p:spPr>
+        <p:style>
+          <a:lnRef idx="1">
+            <a:schemeClr val="accent1"/>
+          </a:lnRef>
+          <a:fillRef idx="0">
+            <a:schemeClr val="accent1"/>
+          </a:fillRef>
+          <a:effectRef idx="0">
+            <a:schemeClr val="accent1"/>
+          </a:effectRef>
+          <a:fontRef idx="minor">
+            <a:schemeClr val="tx1"/>
+          </a:fontRef>
+        </p:style>
+      </p:cxnSp>
+      <p:sp>
+        <p:nvSpPr>
+          <p:cNvPr id="90" name="TextBox 89">
+            <a:extLst>
+              <a:ext uri="{FF2B5EF4-FFF2-40B4-BE49-F238E27FC236}">
+                <a16:creationId xmlns:a16="http://schemas.microsoft.com/office/drawing/2014/main" id="{382E1AD6-A533-490C-B2AE-C3960A575753}"/>
+              </a:ext>
+            </a:extLst>
+          </p:cNvPr>
+          <p:cNvSpPr txBox="1"/>
+          <p:nvPr/>
+        </p:nvSpPr>
+        <p:spPr>
+          <a:xfrm rot="20537847">
+            <a:off x="6897983" y="5673723"/>
+            <a:ext cx="562975" cy="230832"/>
+          </a:xfrm>
+          <a:prstGeom prst="rect">
+            <a:avLst/>
+          </a:prstGeom>
+          <a:noFill/>
+        </p:spPr>
+        <p:txBody>
+          <a:bodyPr wrap="none" rtlCol="0">
+            <a:spAutoFit/>
+          </a:bodyPr>
+          <a:lstStyle/>
+          <a:p>
+            <a:r>
+              <a:rPr lang="en-US" sz="900" dirty="0" err="1"/>
+              <a:t>madeOf</a:t>
+            </a:r>
+            <a:endParaRPr lang="en-US" sz="900" dirty="0"/>
+          </a:p>
+        </p:txBody>
+      </p:sp>
+      <p:sp>
+        <p:nvSpPr>
+          <p:cNvPr id="91" name="TextBox 90">
+            <a:extLst>
+              <a:ext uri="{FF2B5EF4-FFF2-40B4-BE49-F238E27FC236}">
+                <a16:creationId xmlns:a16="http://schemas.microsoft.com/office/drawing/2014/main" id="{96A60420-231E-4742-8F4C-638329415982}"/>
+              </a:ext>
+            </a:extLst>
+          </p:cNvPr>
+          <p:cNvSpPr txBox="1"/>
+          <p:nvPr/>
+        </p:nvSpPr>
+        <p:spPr>
+          <a:xfrm rot="753859">
+            <a:off x="6929302" y="6104977"/>
+            <a:ext cx="562975" cy="230832"/>
+          </a:xfrm>
+          <a:prstGeom prst="rect">
+            <a:avLst/>
+          </a:prstGeom>
+          <a:noFill/>
+        </p:spPr>
+        <p:txBody>
+          <a:bodyPr wrap="none" rtlCol="0">
+            <a:spAutoFit/>
+          </a:bodyPr>
+          <a:lstStyle/>
+          <a:p>
+            <a:r>
+              <a:rPr lang="en-US" sz="900" dirty="0" err="1"/>
+              <a:t>madeOf</a:t>
+            </a:r>
+            <a:endParaRPr lang="en-US" sz="900" dirty="0"/>
+          </a:p>
+        </p:txBody>
+      </p:sp>
+      <p:sp>
+        <p:nvSpPr>
+          <p:cNvPr id="92" name="TextBox 91">
+            <a:extLst>
+              <a:ext uri="{FF2B5EF4-FFF2-40B4-BE49-F238E27FC236}">
+                <a16:creationId xmlns:a16="http://schemas.microsoft.com/office/drawing/2014/main" id="{60F5C368-74F3-4DC9-BA37-00F19699A53C}"/>
+              </a:ext>
+            </a:extLst>
+          </p:cNvPr>
+          <p:cNvSpPr txBox="1"/>
+          <p:nvPr/>
+        </p:nvSpPr>
+        <p:spPr>
+          <a:xfrm rot="5400000">
+            <a:off x="6187069" y="6468433"/>
+            <a:ext cx="726481" cy="230832"/>
+          </a:xfrm>
+          <a:prstGeom prst="rect">
+            <a:avLst/>
+          </a:prstGeom>
+          <a:noFill/>
+        </p:spPr>
+        <p:txBody>
+          <a:bodyPr wrap="none" rtlCol="0">
+            <a:spAutoFit/>
+          </a:bodyPr>
+          <a:lstStyle/>
+          <a:p>
+            <a:r>
+              <a:rPr lang="en-US" sz="900" dirty="0" err="1"/>
+              <a:t>prefSymbol</a:t>
+            </a:r>
+            <a:endParaRPr lang="en-US" sz="900" dirty="0"/>
+          </a:p>
+        </p:txBody>
+      </p:sp>
+      <p:cxnSp>
+        <p:nvCxnSpPr>
+          <p:cNvPr id="93" name="Straight Arrow Connector 92">
+            <a:extLst>
+              <a:ext uri="{FF2B5EF4-FFF2-40B4-BE49-F238E27FC236}">
+                <a16:creationId xmlns:a16="http://schemas.microsoft.com/office/drawing/2014/main" id="{3BD182D7-93A7-4525-9391-3D0901CDA16E}"/>
+              </a:ext>
+            </a:extLst>
+          </p:cNvPr>
+          <p:cNvCxnSpPr>
+            <a:cxnSpLocks/>
+          </p:cNvCxnSpPr>
+          <p:nvPr/>
+        </p:nvCxnSpPr>
+        <p:spPr>
+          <a:xfrm>
+            <a:off x="6871944" y="6215516"/>
+            <a:ext cx="595971" cy="132314"/>
+          </a:xfrm>
+          <a:prstGeom prst="straightConnector1">
+            <a:avLst/>
+          </a:prstGeom>
+          <a:ln>
+            <a:solidFill>
+              <a:schemeClr val="tx1">
+                <a:lumMod val="95000"/>
+                <a:lumOff val="5000"/>
+              </a:schemeClr>
+            </a:solidFill>
+            <a:headEnd type="none" w="med" len="med"/>
+            <a:tailEnd type="arrow" w="med" len="med"/>
+          </a:ln>
+        </p:spPr>
+        <p:style>
+          <a:lnRef idx="1">
+            <a:schemeClr val="accent1"/>
+          </a:lnRef>
+          <a:fillRef idx="0">
+            <a:schemeClr val="accent1"/>
+          </a:fillRef>
+          <a:effectRef idx="0">
+            <a:schemeClr val="accent1"/>
+          </a:effectRef>
+          <a:fontRef idx="minor">
+            <a:schemeClr val="tx1"/>
+          </a:fontRef>
+        </p:style>
+      </p:cxnSp>
+      <p:sp>
+        <p:nvSpPr>
+          <p:cNvPr id="94" name="TextBox 93">
+            <a:extLst>
+              <a:ext uri="{FF2B5EF4-FFF2-40B4-BE49-F238E27FC236}">
+                <a16:creationId xmlns:a16="http://schemas.microsoft.com/office/drawing/2014/main" id="{59EAB3DA-26B0-48EA-805E-37F7186429EA}"/>
+              </a:ext>
+            </a:extLst>
+          </p:cNvPr>
+          <p:cNvSpPr txBox="1"/>
+          <p:nvPr/>
+        </p:nvSpPr>
+        <p:spPr>
+          <a:xfrm>
+            <a:off x="4309980" y="5540117"/>
+            <a:ext cx="1001899" cy="230832"/>
+          </a:xfrm>
+          <a:prstGeom prst="rect">
+            <a:avLst/>
+          </a:prstGeom>
+          <a:noFill/>
+          <a:ln>
+            <a:solidFill>
+              <a:schemeClr val="tx1">
+                <a:lumMod val="95000"/>
+                <a:lumOff val="5000"/>
+              </a:schemeClr>
+            </a:solidFill>
+          </a:ln>
+        </p:spPr>
+        <p:txBody>
+          <a:bodyPr wrap="square" rtlCol="0">
+            <a:spAutoFit/>
+          </a:bodyPr>
+          <a:lstStyle/>
+          <a:p>
+            <a:pPr algn="ctr"/>
+            <a:r>
+              <a:rPr lang="en-US" sz="900" dirty="0"/>
+              <a:t>Rebirth</a:t>
+            </a:r>
+          </a:p>
+        </p:txBody>
+      </p:sp>
+      <p:sp>
+        <p:nvSpPr>
+          <p:cNvPr id="95" name="TextBox 94">
+            <a:extLst>
+              <a:ext uri="{FF2B5EF4-FFF2-40B4-BE49-F238E27FC236}">
+                <a16:creationId xmlns:a16="http://schemas.microsoft.com/office/drawing/2014/main" id="{60C6782F-3849-48F0-B453-9937CA3C09E7}"/>
+              </a:ext>
+            </a:extLst>
+          </p:cNvPr>
+          <p:cNvSpPr txBox="1"/>
+          <p:nvPr/>
+        </p:nvSpPr>
+        <p:spPr>
+          <a:xfrm>
+            <a:off x="4219985" y="6493867"/>
+            <a:ext cx="1181889" cy="230832"/>
+          </a:xfrm>
+          <a:prstGeom prst="rect">
+            <a:avLst/>
+          </a:prstGeom>
+          <a:noFill/>
+          <a:ln>
+            <a:solidFill>
+              <a:schemeClr val="tx1">
+                <a:lumMod val="95000"/>
+                <a:lumOff val="5000"/>
+              </a:schemeClr>
+            </a:solidFill>
+          </a:ln>
+        </p:spPr>
+        <p:txBody>
+          <a:bodyPr wrap="square" rtlCol="0">
+            <a:spAutoFit/>
+          </a:bodyPr>
+          <a:lstStyle/>
+          <a:p>
+            <a:pPr algn="ctr"/>
+            <a:r>
+              <a:rPr lang="en-US" sz="900" dirty="0"/>
+              <a:t>Regeneration</a:t>
+            </a:r>
+          </a:p>
+        </p:txBody>
+      </p:sp>
+      <p:cxnSp>
+        <p:nvCxnSpPr>
+          <p:cNvPr id="96" name="Straight Arrow Connector 95">
+            <a:extLst>
+              <a:ext uri="{FF2B5EF4-FFF2-40B4-BE49-F238E27FC236}">
+                <a16:creationId xmlns:a16="http://schemas.microsoft.com/office/drawing/2014/main" id="{5A812E9D-2753-429A-B02C-6AB7DD776815}"/>
+              </a:ext>
+            </a:extLst>
+          </p:cNvPr>
+          <p:cNvCxnSpPr>
+            <a:cxnSpLocks/>
+          </p:cNvCxnSpPr>
+          <p:nvPr/>
+        </p:nvCxnSpPr>
+        <p:spPr>
+          <a:xfrm flipH="1" flipV="1">
+            <a:off x="5047283" y="5777330"/>
+            <a:ext cx="882644" cy="209280"/>
+          </a:xfrm>
+          <a:prstGeom prst="straightConnector1">
+            <a:avLst/>
+          </a:prstGeom>
+          <a:ln>
+            <a:solidFill>
+              <a:schemeClr val="tx1">
+                <a:lumMod val="95000"/>
+                <a:lumOff val="5000"/>
+              </a:schemeClr>
+            </a:solidFill>
+            <a:headEnd type="none" w="med" len="med"/>
+            <a:tailEnd type="arrow" w="med" len="med"/>
+          </a:ln>
+        </p:spPr>
+        <p:style>
+          <a:lnRef idx="1">
+            <a:schemeClr val="accent1"/>
+          </a:lnRef>
+          <a:fillRef idx="0">
+            <a:schemeClr val="accent1"/>
+          </a:fillRef>
+          <a:effectRef idx="0">
+            <a:schemeClr val="accent1"/>
+          </a:effectRef>
+          <a:fontRef idx="minor">
+            <a:schemeClr val="tx1"/>
+          </a:fontRef>
+        </p:style>
+      </p:cxnSp>
+      <p:cxnSp>
+        <p:nvCxnSpPr>
+          <p:cNvPr id="97" name="Straight Arrow Connector 96">
+            <a:extLst>
+              <a:ext uri="{FF2B5EF4-FFF2-40B4-BE49-F238E27FC236}">
+                <a16:creationId xmlns:a16="http://schemas.microsoft.com/office/drawing/2014/main" id="{4CAEDEDA-6BC9-44BF-9737-EE969144CEA8}"/>
+              </a:ext>
+            </a:extLst>
+          </p:cNvPr>
+          <p:cNvCxnSpPr>
+            <a:cxnSpLocks/>
+          </p:cNvCxnSpPr>
+          <p:nvPr/>
+        </p:nvCxnSpPr>
+        <p:spPr>
+          <a:xfrm flipH="1">
+            <a:off x="5047283" y="6223823"/>
+            <a:ext cx="882644" cy="270044"/>
+          </a:xfrm>
+          <a:prstGeom prst="straightConnector1">
+            <a:avLst/>
+          </a:prstGeom>
+          <a:ln>
+            <a:solidFill>
+              <a:schemeClr val="tx1">
+                <a:lumMod val="95000"/>
+                <a:lumOff val="5000"/>
+              </a:schemeClr>
+            </a:solidFill>
+            <a:headEnd type="none" w="med" len="med"/>
+            <a:tailEnd type="arrow" w="med" len="med"/>
+          </a:ln>
+        </p:spPr>
+        <p:style>
+          <a:lnRef idx="1">
+            <a:schemeClr val="accent1"/>
+          </a:lnRef>
+          <a:fillRef idx="0">
+            <a:schemeClr val="accent1"/>
+          </a:fillRef>
+          <a:effectRef idx="0">
+            <a:schemeClr val="accent1"/>
+          </a:effectRef>
+          <a:fontRef idx="minor">
+            <a:schemeClr val="tx1"/>
+          </a:fontRef>
+        </p:style>
+      </p:cxnSp>
+      <p:sp>
+        <p:nvSpPr>
+          <p:cNvPr id="98" name="TextBox 97">
+            <a:extLst>
+              <a:ext uri="{FF2B5EF4-FFF2-40B4-BE49-F238E27FC236}">
+                <a16:creationId xmlns:a16="http://schemas.microsoft.com/office/drawing/2014/main" id="{7EC0E415-F803-4D07-A04A-3D83911D5D25}"/>
+              </a:ext>
+            </a:extLst>
+          </p:cNvPr>
+          <p:cNvSpPr txBox="1"/>
+          <p:nvPr/>
+        </p:nvSpPr>
+        <p:spPr>
+          <a:xfrm rot="778896">
+            <a:off x="5346637" y="5706698"/>
+            <a:ext cx="564578" cy="230832"/>
+          </a:xfrm>
+          <a:prstGeom prst="rect">
+            <a:avLst/>
+          </a:prstGeom>
+          <a:noFill/>
+        </p:spPr>
+        <p:txBody>
+          <a:bodyPr wrap="none" rtlCol="0">
+            <a:spAutoFit/>
+          </a:bodyPr>
+          <a:lstStyle/>
+          <a:p>
+            <a:r>
+              <a:rPr lang="en-US" sz="900" dirty="0"/>
+              <a:t>signifies</a:t>
+            </a:r>
+          </a:p>
+        </p:txBody>
+      </p:sp>
+      <p:sp>
+        <p:nvSpPr>
+          <p:cNvPr id="99" name="TextBox 98">
+            <a:extLst>
+              <a:ext uri="{FF2B5EF4-FFF2-40B4-BE49-F238E27FC236}">
+                <a16:creationId xmlns:a16="http://schemas.microsoft.com/office/drawing/2014/main" id="{F520CD69-0103-409D-A71F-6A4D570DF505}"/>
+              </a:ext>
+            </a:extLst>
+          </p:cNvPr>
+          <p:cNvSpPr txBox="1"/>
+          <p:nvPr/>
+        </p:nvSpPr>
+        <p:spPr>
+          <a:xfrm rot="20476662">
+            <a:off x="5206316" y="6157773"/>
+            <a:ext cx="564578" cy="230832"/>
+          </a:xfrm>
+          <a:prstGeom prst="rect">
+            <a:avLst/>
+          </a:prstGeom>
+          <a:noFill/>
+        </p:spPr>
+        <p:txBody>
+          <a:bodyPr wrap="none" rtlCol="0">
+            <a:spAutoFit/>
+          </a:bodyPr>
+          <a:lstStyle/>
+          <a:p>
+            <a:r>
+              <a:rPr lang="en-US" sz="900" dirty="0"/>
+              <a:t>signifies</a:t>
+            </a:r>
+          </a:p>
+        </p:txBody>
+      </p:sp>
+      <p:cxnSp>
+        <p:nvCxnSpPr>
+          <p:cNvPr id="100" name="Straight Arrow Connector 99">
+            <a:extLst>
+              <a:ext uri="{FF2B5EF4-FFF2-40B4-BE49-F238E27FC236}">
+                <a16:creationId xmlns:a16="http://schemas.microsoft.com/office/drawing/2014/main" id="{DECDDBC1-5A47-4FD6-8D23-FAE5E06525ED}"/>
+              </a:ext>
+            </a:extLst>
+          </p:cNvPr>
+          <p:cNvCxnSpPr>
+            <a:cxnSpLocks/>
+            <a:stCxn id="86" idx="0"/>
+          </p:cNvCxnSpPr>
+          <p:nvPr/>
+        </p:nvCxnSpPr>
+        <p:spPr>
+          <a:xfrm flipH="1" flipV="1">
+            <a:off x="6434893" y="5257298"/>
+            <a:ext cx="2" cy="727386"/>
+          </a:xfrm>
+          <a:prstGeom prst="straightConnector1">
+            <a:avLst/>
+          </a:prstGeom>
+          <a:ln>
+            <a:solidFill>
+              <a:schemeClr val="tx1">
+                <a:lumMod val="95000"/>
+                <a:lumOff val="5000"/>
+              </a:schemeClr>
+            </a:solidFill>
+            <a:headEnd type="none" w="med" len="med"/>
+            <a:tailEnd type="arrow" w="med" len="med"/>
+          </a:ln>
+        </p:spPr>
+        <p:style>
+          <a:lnRef idx="1">
+            <a:schemeClr val="accent1"/>
+          </a:lnRef>
+          <a:fillRef idx="0">
+            <a:schemeClr val="accent1"/>
+          </a:fillRef>
+          <a:effectRef idx="0">
+            <a:schemeClr val="accent1"/>
+          </a:effectRef>
+          <a:fontRef idx="minor">
+            <a:schemeClr val="tx1"/>
+          </a:fontRef>
+        </p:style>
+      </p:cxnSp>
+      <p:sp>
+        <p:nvSpPr>
+          <p:cNvPr id="103" name="TextBox 102">
+            <a:extLst>
+              <a:ext uri="{FF2B5EF4-FFF2-40B4-BE49-F238E27FC236}">
+                <a16:creationId xmlns:a16="http://schemas.microsoft.com/office/drawing/2014/main" id="{3342478C-FE60-4C85-A934-41FE03C5A006}"/>
+              </a:ext>
+            </a:extLst>
+          </p:cNvPr>
+          <p:cNvSpPr txBox="1"/>
+          <p:nvPr/>
+        </p:nvSpPr>
+        <p:spPr>
+          <a:xfrm rot="5400000">
+            <a:off x="6177035" y="5526720"/>
+            <a:ext cx="726481" cy="230832"/>
+          </a:xfrm>
+          <a:prstGeom prst="rect">
+            <a:avLst/>
+          </a:prstGeom>
+          <a:noFill/>
+        </p:spPr>
+        <p:txBody>
+          <a:bodyPr wrap="none" rtlCol="0">
+            <a:spAutoFit/>
+          </a:bodyPr>
+          <a:lstStyle/>
+          <a:p>
+            <a:r>
+              <a:rPr lang="en-US" sz="900" dirty="0" err="1"/>
+              <a:t>prefSymbol</a:t>
+            </a:r>
+            <a:endParaRPr lang="en-US" sz="900" dirty="0"/>
+          </a:p>
+        </p:txBody>
+      </p:sp>
+      <p:grpSp>
+        <p:nvGrpSpPr>
+          <p:cNvPr id="104" name="Group 103">
+            <a:extLst>
+              <a:ext uri="{FF2B5EF4-FFF2-40B4-BE49-F238E27FC236}">
+                <a16:creationId xmlns:a16="http://schemas.microsoft.com/office/drawing/2014/main" id="{9F4FD708-4C0F-4BF9-82E6-3C5267B4A0C6}"/>
+              </a:ext>
+            </a:extLst>
+          </p:cNvPr>
+          <p:cNvGrpSpPr/>
+          <p:nvPr/>
+        </p:nvGrpSpPr>
+        <p:grpSpPr>
+          <a:xfrm>
+            <a:off x="6257983" y="4819099"/>
+            <a:ext cx="308661" cy="494948"/>
+            <a:chOff x="6492240" y="3356724"/>
+            <a:chExt cx="308661" cy="494948"/>
+          </a:xfrm>
+        </p:grpSpPr>
+        <p:sp>
+          <p:nvSpPr>
+            <p:cNvPr id="105" name="TextBox 104">
+              <a:extLst>
+                <a:ext uri="{FF2B5EF4-FFF2-40B4-BE49-F238E27FC236}">
+                  <a16:creationId xmlns:a16="http://schemas.microsoft.com/office/drawing/2014/main" id="{76D70339-750E-407C-8596-353FAEC16D5E}"/>
+                </a:ext>
+              </a:extLst>
+            </p:cNvPr>
+            <p:cNvSpPr txBox="1"/>
+            <p:nvPr/>
+          </p:nvSpPr>
+          <p:spPr>
+            <a:xfrm>
+              <a:off x="6492240" y="3482340"/>
+              <a:ext cx="184731" cy="369332"/>
+            </a:xfrm>
+            <a:prstGeom prst="rect">
+              <a:avLst/>
+            </a:prstGeom>
+            <a:noFill/>
+          </p:spPr>
+          <p:txBody>
+            <a:bodyPr wrap="none" rtlCol="0">
+              <a:spAutoFit/>
+            </a:bodyPr>
+            <a:lstStyle/>
+            <a:p>
+              <a:endParaRPr lang="en-US" dirty="0"/>
+            </a:p>
+          </p:txBody>
+        </p:sp>
+        <p:sp>
+          <p:nvSpPr>
+            <p:cNvPr id="106" name="Oval 105">
+              <a:extLst>
+                <a:ext uri="{FF2B5EF4-FFF2-40B4-BE49-F238E27FC236}">
+                  <a16:creationId xmlns:a16="http://schemas.microsoft.com/office/drawing/2014/main" id="{6F084C80-89B4-4A55-BFAD-A5F84035C8E0}"/>
+                </a:ext>
+              </a:extLst>
+            </p:cNvPr>
+            <p:cNvSpPr/>
+            <p:nvPr/>
+          </p:nvSpPr>
+          <p:spPr>
+            <a:xfrm>
+              <a:off x="6588100" y="3377928"/>
+              <a:ext cx="184347" cy="162555"/>
+            </a:xfrm>
+            <a:prstGeom prst="ellipse">
+              <a:avLst/>
+            </a:prstGeom>
+            <a:noFill/>
+            <a:ln w="9525">
+              <a:solidFill>
+                <a:schemeClr val="tx1">
+                  <a:lumMod val="95000"/>
+                  <a:lumOff val="5000"/>
+                </a:schemeClr>
+              </a:solidFill>
+            </a:ln>
+          </p:spPr>
+          <p:style>
+            <a:lnRef idx="2">
+              <a:schemeClr val="accent1">
+                <a:shade val="50000"/>
+              </a:schemeClr>
+            </a:lnRef>
+            <a:fillRef idx="1">
+              <a:schemeClr val="accent1"/>
+            </a:fillRef>
+            <a:effectRef idx="0">
+              <a:schemeClr val="accent1"/>
+            </a:effectRef>
+            <a:fontRef idx="minor">
+              <a:schemeClr val="lt1"/>
+            </a:fontRef>
+          </p:style>
+          <p:txBody>
+            <a:bodyPr rtlCol="0" anchor="ctr"/>
+            <a:lstStyle/>
+            <a:p>
+              <a:pPr algn="ctr"/>
+              <a:endParaRPr lang="en-US"/>
+            </a:p>
+          </p:txBody>
+        </p:sp>
+        <p:sp>
+          <p:nvSpPr>
+            <p:cNvPr id="107" name="Rectangle 106">
+              <a:extLst>
+                <a:ext uri="{FF2B5EF4-FFF2-40B4-BE49-F238E27FC236}">
+                  <a16:creationId xmlns:a16="http://schemas.microsoft.com/office/drawing/2014/main" id="{E28F0B16-5866-4DDF-88FA-90EAC1B614F1}"/>
+                </a:ext>
+              </a:extLst>
+            </p:cNvPr>
+            <p:cNvSpPr/>
+            <p:nvPr/>
+          </p:nvSpPr>
+          <p:spPr>
+            <a:xfrm>
+              <a:off x="6511291" y="3356724"/>
+              <a:ext cx="289610" cy="97153"/>
+            </a:xfrm>
+            <a:prstGeom prst="rect">
+              <a:avLst/>
+            </a:prstGeom>
+            <a:solidFill>
+              <a:schemeClr val="bg1"/>
+            </a:solidFill>
+            <a:ln w="9525">
+              <a:solidFill>
+                <a:schemeClr val="bg1"/>
+              </a:solidFill>
+            </a:ln>
+          </p:spPr>
+          <p:style>
+            <a:lnRef idx="2">
+              <a:schemeClr val="accent1">
+                <a:shade val="50000"/>
+              </a:schemeClr>
+            </a:lnRef>
+            <a:fillRef idx="1">
+              <a:schemeClr val="accent1"/>
+            </a:fillRef>
+            <a:effectRef idx="0">
+              <a:schemeClr val="accent1"/>
+            </a:effectRef>
+            <a:fontRef idx="minor">
+              <a:schemeClr val="lt1"/>
+            </a:fontRef>
+          </p:style>
+          <p:txBody>
+            <a:bodyPr rtlCol="0" anchor="ctr"/>
+            <a:lstStyle/>
+            <a:p>
+              <a:pPr algn="ctr"/>
+              <a:endParaRPr lang="en-US"/>
+            </a:p>
+          </p:txBody>
+        </p:sp>
+        <p:sp>
+          <p:nvSpPr>
+            <p:cNvPr id="108" name="Oval 107">
+              <a:extLst>
+                <a:ext uri="{FF2B5EF4-FFF2-40B4-BE49-F238E27FC236}">
+                  <a16:creationId xmlns:a16="http://schemas.microsoft.com/office/drawing/2014/main" id="{CC253FDF-ABBD-4576-95F8-3B1719063B71}"/>
+                </a:ext>
+              </a:extLst>
+            </p:cNvPr>
+            <p:cNvSpPr/>
+            <p:nvPr/>
+          </p:nvSpPr>
+          <p:spPr>
+            <a:xfrm>
+              <a:off x="6615396" y="3385504"/>
+              <a:ext cx="124606" cy="126516"/>
+            </a:xfrm>
+            <a:prstGeom prst="ellipse">
+              <a:avLst/>
+            </a:prstGeom>
+            <a:noFill/>
+            <a:ln w="9525">
+              <a:solidFill>
+                <a:schemeClr val="tx1">
+                  <a:lumMod val="95000"/>
+                  <a:lumOff val="5000"/>
+                </a:schemeClr>
+              </a:solidFill>
+            </a:ln>
+          </p:spPr>
+          <p:style>
+            <a:lnRef idx="2">
+              <a:schemeClr val="accent1">
+                <a:shade val="50000"/>
+              </a:schemeClr>
+            </a:lnRef>
+            <a:fillRef idx="1">
+              <a:schemeClr val="accent1"/>
+            </a:fillRef>
+            <a:effectRef idx="0">
+              <a:schemeClr val="accent1"/>
+            </a:effectRef>
+            <a:fontRef idx="minor">
+              <a:schemeClr val="lt1"/>
+            </a:fontRef>
+          </p:style>
+          <p:txBody>
+            <a:bodyPr rtlCol="0" anchor="ctr"/>
+            <a:lstStyle/>
+            <a:p>
+              <a:pPr algn="ctr"/>
+              <a:endParaRPr lang="en-US"/>
+            </a:p>
+          </p:txBody>
+        </p:sp>
+        <p:cxnSp>
+          <p:nvCxnSpPr>
+            <p:cNvPr id="109" name="Straight Connector 108">
+              <a:extLst>
+                <a:ext uri="{FF2B5EF4-FFF2-40B4-BE49-F238E27FC236}">
+                  <a16:creationId xmlns:a16="http://schemas.microsoft.com/office/drawing/2014/main" id="{701B01AC-FCCB-486E-8F99-D1F4292886E9}"/>
+                </a:ext>
+              </a:extLst>
+            </p:cNvPr>
+            <p:cNvCxnSpPr>
+              <a:cxnSpLocks/>
+            </p:cNvCxnSpPr>
+            <p:nvPr/>
+          </p:nvCxnSpPr>
+          <p:spPr>
+            <a:xfrm>
+              <a:off x="6677699" y="3540490"/>
+              <a:ext cx="0" cy="126516"/>
+            </a:xfrm>
+            <a:prstGeom prst="line">
+              <a:avLst/>
+            </a:prstGeom>
+            <a:noFill/>
+            <a:ln w="9525">
+              <a:solidFill>
+                <a:schemeClr val="tx1">
+                  <a:lumMod val="95000"/>
+                  <a:lumOff val="5000"/>
+                </a:schemeClr>
+              </a:solidFill>
+            </a:ln>
+          </p:spPr>
+          <p:style>
+            <a:lnRef idx="2">
+              <a:schemeClr val="accent1">
+                <a:shade val="50000"/>
+              </a:schemeClr>
+            </a:lnRef>
+            <a:fillRef idx="1">
+              <a:schemeClr val="accent1"/>
+            </a:fillRef>
+            <a:effectRef idx="0">
+              <a:schemeClr val="accent1"/>
+            </a:effectRef>
+            <a:fontRef idx="minor">
+              <a:schemeClr val="lt1"/>
+            </a:fontRef>
+          </p:style>
+        </p:cxnSp>
+        <p:cxnSp>
+          <p:nvCxnSpPr>
+            <p:cNvPr id="110" name="Straight Connector 109">
+              <a:extLst>
+                <a:ext uri="{FF2B5EF4-FFF2-40B4-BE49-F238E27FC236}">
+                  <a16:creationId xmlns:a16="http://schemas.microsoft.com/office/drawing/2014/main" id="{1F8534B9-E5F5-4638-B148-2EEA9C7B8009}"/>
+                </a:ext>
+              </a:extLst>
+            </p:cNvPr>
+            <p:cNvCxnSpPr>
+              <a:cxnSpLocks/>
+            </p:cNvCxnSpPr>
+            <p:nvPr/>
+          </p:nvCxnSpPr>
+          <p:spPr>
+            <a:xfrm>
+              <a:off x="6621226" y="3595620"/>
+              <a:ext cx="124606" cy="0"/>
+            </a:xfrm>
+            <a:prstGeom prst="line">
+              <a:avLst/>
+            </a:prstGeom>
+            <a:noFill/>
+            <a:ln w="9525">
+              <a:solidFill>
+                <a:schemeClr val="tx1">
+                  <a:lumMod val="95000"/>
+                  <a:lumOff val="5000"/>
+                </a:schemeClr>
+              </a:solidFill>
+            </a:ln>
+          </p:spPr>
+          <p:style>
+            <a:lnRef idx="2">
+              <a:schemeClr val="accent1">
+                <a:shade val="50000"/>
+              </a:schemeClr>
+            </a:lnRef>
+            <a:fillRef idx="1">
+              <a:schemeClr val="accent1"/>
+            </a:fillRef>
+            <a:effectRef idx="0">
+              <a:schemeClr val="accent1"/>
+            </a:effectRef>
+            <a:fontRef idx="minor">
+              <a:schemeClr val="lt1"/>
+            </a:fontRef>
+          </p:style>
+        </p:cxnSp>
+      </p:grpSp>
+      <p:sp>
+        <p:nvSpPr>
+          <p:cNvPr id="111" name="Rectangle 110">
+            <a:extLst>
+              <a:ext uri="{FF2B5EF4-FFF2-40B4-BE49-F238E27FC236}">
+                <a16:creationId xmlns:a16="http://schemas.microsoft.com/office/drawing/2014/main" id="{7DDBB903-1E93-412F-834E-0F3A4FCB17B8}"/>
+              </a:ext>
+            </a:extLst>
+          </p:cNvPr>
+          <p:cNvSpPr/>
+          <p:nvPr/>
+        </p:nvSpPr>
+        <p:spPr>
+          <a:xfrm>
+            <a:off x="6257983" y="4768918"/>
+            <a:ext cx="365061" cy="453227"/>
+          </a:xfrm>
+          <a:prstGeom prst="rect">
+            <a:avLst/>
+          </a:prstGeom>
+          <a:noFill/>
+          <a:ln>
+            <a:solidFill>
+              <a:schemeClr val="tx1">
+                <a:lumMod val="95000"/>
+                <a:lumOff val="5000"/>
+              </a:schemeClr>
+            </a:solidFill>
+          </a:ln>
+        </p:spPr>
+        <p:style>
+          <a:lnRef idx="2">
+            <a:schemeClr val="accent1">
+              <a:shade val="50000"/>
+            </a:schemeClr>
+          </a:lnRef>
+          <a:fillRef idx="1">
+            <a:schemeClr val="accent1"/>
+          </a:fillRef>
+          <a:effectRef idx="0">
+            <a:schemeClr val="accent1"/>
+          </a:effectRef>
+          <a:fontRef idx="minor">
+            <a:schemeClr val="lt1"/>
+          </a:fontRef>
+        </p:style>
+        <p:txBody>
+          <a:bodyPr rtlCol="0" anchor="ctr"/>
+          <a:lstStyle/>
+          <a:p>
+            <a:pPr algn="ctr"/>
+            <a:endParaRPr lang="en-US"/>
+          </a:p>
+        </p:txBody>
+      </p:sp>
+      <p:sp>
+        <p:nvSpPr>
+          <p:cNvPr id="102" name="TextBox 101">
+            <a:extLst>
+              <a:ext uri="{FF2B5EF4-FFF2-40B4-BE49-F238E27FC236}">
+                <a16:creationId xmlns:a16="http://schemas.microsoft.com/office/drawing/2014/main" id="{D94BDBA8-4045-4110-B5D9-6D907734FAE2}"/>
+              </a:ext>
+            </a:extLst>
+          </p:cNvPr>
+          <p:cNvSpPr txBox="1"/>
+          <p:nvPr/>
+        </p:nvSpPr>
+        <p:spPr>
+          <a:xfrm>
+            <a:off x="3495811" y="-69250"/>
+            <a:ext cx="442750" cy="369332"/>
+          </a:xfrm>
+          <a:prstGeom prst="rect">
+            <a:avLst/>
+          </a:prstGeom>
+          <a:noFill/>
+        </p:spPr>
+        <p:txBody>
+          <a:bodyPr wrap="none" rtlCol="0">
+            <a:spAutoFit/>
+          </a:bodyPr>
+          <a:lstStyle/>
+          <a:p>
+            <a:r>
+              <a:rPr lang="en-US" b="1" dirty="0"/>
+              <a:t>(a)</a:t>
+            </a:r>
+          </a:p>
+        </p:txBody>
+      </p:sp>
+      <p:sp>
+        <p:nvSpPr>
+          <p:cNvPr id="113" name="TextBox 112">
+            <a:extLst>
+              <a:ext uri="{FF2B5EF4-FFF2-40B4-BE49-F238E27FC236}">
+                <a16:creationId xmlns:a16="http://schemas.microsoft.com/office/drawing/2014/main" id="{F09357DD-D95F-4DE2-9E5C-98330320CB22}"/>
+              </a:ext>
+            </a:extLst>
+          </p:cNvPr>
+          <p:cNvSpPr txBox="1"/>
+          <p:nvPr/>
+        </p:nvSpPr>
+        <p:spPr>
+          <a:xfrm>
+            <a:off x="3495811" y="2240854"/>
+            <a:ext cx="452368" cy="369332"/>
+          </a:xfrm>
+          <a:prstGeom prst="rect">
+            <a:avLst/>
+          </a:prstGeom>
+          <a:noFill/>
+        </p:spPr>
+        <p:txBody>
+          <a:bodyPr wrap="none" rtlCol="0">
+            <a:spAutoFit/>
+          </a:bodyPr>
+          <a:lstStyle/>
+          <a:p>
+            <a:r>
+              <a:rPr lang="en-US" b="1" dirty="0"/>
+              <a:t>(b)</a:t>
+            </a:r>
+          </a:p>
+        </p:txBody>
+      </p:sp>
+      <p:sp>
+        <p:nvSpPr>
+          <p:cNvPr id="115" name="TextBox 114">
+            <a:extLst>
+              <a:ext uri="{FF2B5EF4-FFF2-40B4-BE49-F238E27FC236}">
+                <a16:creationId xmlns:a16="http://schemas.microsoft.com/office/drawing/2014/main" id="{D7DE32D0-DA11-444E-B55D-DA1ACD0927C9}"/>
+              </a:ext>
+            </a:extLst>
+          </p:cNvPr>
+          <p:cNvSpPr txBox="1"/>
+          <p:nvPr/>
+        </p:nvSpPr>
+        <p:spPr>
+          <a:xfrm>
+            <a:off x="3495811" y="4771281"/>
+            <a:ext cx="425116" cy="369332"/>
+          </a:xfrm>
+          <a:prstGeom prst="rect">
+            <a:avLst/>
+          </a:prstGeom>
+          <a:noFill/>
+        </p:spPr>
+        <p:txBody>
+          <a:bodyPr wrap="none" rtlCol="0">
+            <a:spAutoFit/>
+          </a:bodyPr>
+          <a:lstStyle/>
+          <a:p>
+            <a:r>
+              <a:rPr lang="en-US" b="1" dirty="0"/>
+              <a:t>(c)</a:t>
+            </a:r>
+          </a:p>
+        </p:txBody>
+      </p:sp>
+    </p:spTree>
+    <p:extLst>
+      <p:ext uri="{BB962C8B-B14F-4D97-AF65-F5344CB8AC3E}">
+        <p14:creationId xmlns:p14="http://schemas.microsoft.com/office/powerpoint/2010/main" val="2615515012"/>
+      </p:ext>
+    </p:extLst>
+  </p:cSld>
+  <p:clrMapOvr>
+    <a:masterClrMapping/>
+  </p:clrMapOvr>
+</p:sld>
+</file>
+
+<file path=ppt/slides/slide12.xml><?xml version="1.0" encoding="utf-8"?>
+<p:sld xmlns:a="http://schemas.openxmlformats.org/drawingml/2006/main" xmlns:r="http://schemas.openxmlformats.org/officeDocument/2006/relationships" xmlns:p="http://schemas.openxmlformats.org/presentationml/2006/main">
+  <p:cSld>
+    <p:spTree>
+      <p:nvGrpSpPr>
+        <p:cNvPr id="1" name=""/>
+        <p:cNvGrpSpPr/>
+        <p:nvPr/>
+      </p:nvGrpSpPr>
+      <p:grpSpPr>
+        <a:xfrm>
+          <a:off x="0" y="0"/>
+          <a:ext cx="0" cy="0"/>
+          <a:chOff x="0" y="0"/>
+          <a:chExt cx="0" cy="0"/>
+        </a:xfrm>
+      </p:grpSpPr>
+      <p:sp>
+        <p:nvSpPr>
+          <p:cNvPr id="3" name="Partial Circle 2">
+            <a:extLst>
+              <a:ext uri="{FF2B5EF4-FFF2-40B4-BE49-F238E27FC236}">
+                <a16:creationId xmlns:a16="http://schemas.microsoft.com/office/drawing/2014/main" id="{02078DDD-5E46-4C63-9450-69166DA47F3B}"/>
+              </a:ext>
+            </a:extLst>
+          </p:cNvPr>
+          <p:cNvSpPr/>
+          <p:nvPr/>
+        </p:nvSpPr>
+        <p:spPr>
+          <a:xfrm>
+            <a:off x="7452360" y="2042160"/>
+            <a:ext cx="579120" cy="754380"/>
+          </a:xfrm>
+          <a:prstGeom prst="pie">
+            <a:avLst>
+              <a:gd name="adj1" fmla="val 0"/>
+              <a:gd name="adj2" fmla="val 10760028"/>
+            </a:avLst>
+          </a:prstGeom>
+          <a:noFill/>
+          <a:ln w="38100">
+            <a:solidFill>
+              <a:schemeClr val="tx1">
+                <a:lumMod val="95000"/>
+                <a:lumOff val="5000"/>
+              </a:schemeClr>
+            </a:solidFill>
+          </a:ln>
+        </p:spPr>
+        <p:style>
+          <a:lnRef idx="2">
+            <a:schemeClr val="accent1">
+              <a:shade val="50000"/>
+            </a:schemeClr>
+          </a:lnRef>
+          <a:fillRef idx="1">
+            <a:schemeClr val="accent1"/>
+          </a:fillRef>
+          <a:effectRef idx="0">
+            <a:schemeClr val="accent1"/>
+          </a:effectRef>
+          <a:fontRef idx="minor">
+            <a:schemeClr val="lt1"/>
+          </a:fontRef>
+        </p:style>
+        <p:txBody>
+          <a:bodyPr rot="0" spcFirstLastPara="0" vertOverflow="overflow" horzOverflow="overflow" vert="horz" wrap="square" lIns="91440" tIns="45720" rIns="91440" bIns="45720" numCol="1" spcCol="0" rtlCol="0" fromWordArt="0" anchor="ctr" anchorCtr="0" forceAA="0" compatLnSpc="1">
+            <a:prstTxWarp prst="textNoShape">
+              <a:avLst/>
+            </a:prstTxWarp>
+            <a:noAutofit/>
+          </a:bodyPr>
+          <a:lstStyle/>
+          <a:p>
+            <a:pPr algn="ctr"/>
+            <a:endParaRPr lang="en-US"/>
+          </a:p>
+        </p:txBody>
+      </p:sp>
+      <p:grpSp>
+        <p:nvGrpSpPr>
+          <p:cNvPr id="12" name="Group 11">
+            <a:extLst>
+              <a:ext uri="{FF2B5EF4-FFF2-40B4-BE49-F238E27FC236}">
+                <a16:creationId xmlns:a16="http://schemas.microsoft.com/office/drawing/2014/main" id="{D21BA265-2689-4BB9-AAE2-8191D319AC76}"/>
+              </a:ext>
+            </a:extLst>
+          </p:cNvPr>
+          <p:cNvGrpSpPr/>
+          <p:nvPr/>
+        </p:nvGrpSpPr>
+        <p:grpSpPr>
+          <a:xfrm>
+            <a:off x="4076700" y="2026920"/>
+            <a:ext cx="1927860" cy="3345180"/>
+            <a:chOff x="4076700" y="2026920"/>
+            <a:chExt cx="1927860" cy="3345180"/>
+          </a:xfrm>
+        </p:grpSpPr>
+        <p:sp>
+          <p:nvSpPr>
+            <p:cNvPr id="2" name="Oval 1">
+              <a:extLst>
+                <a:ext uri="{FF2B5EF4-FFF2-40B4-BE49-F238E27FC236}">
+                  <a16:creationId xmlns:a16="http://schemas.microsoft.com/office/drawing/2014/main" id="{2D3B9919-FFEC-41BD-AADC-963B361266E8}"/>
+                </a:ext>
+              </a:extLst>
+            </p:cNvPr>
+            <p:cNvSpPr/>
+            <p:nvPr/>
+          </p:nvSpPr>
+          <p:spPr>
+            <a:xfrm>
+              <a:off x="4191000" y="2255520"/>
+              <a:ext cx="1714500" cy="1752600"/>
+            </a:xfrm>
+            <a:prstGeom prst="ellipse">
+              <a:avLst/>
+            </a:prstGeom>
+            <a:noFill/>
+            <a:ln w="38100">
+              <a:solidFill>
+                <a:schemeClr val="tx1">
+                  <a:lumMod val="95000"/>
+                  <a:lumOff val="5000"/>
+                </a:schemeClr>
+              </a:solidFill>
+            </a:ln>
+          </p:spPr>
+          <p:style>
+            <a:lnRef idx="2">
+              <a:schemeClr val="accent1">
+                <a:shade val="50000"/>
+              </a:schemeClr>
+            </a:lnRef>
+            <a:fillRef idx="1">
+              <a:schemeClr val="accent1"/>
+            </a:fillRef>
+            <a:effectRef idx="0">
+              <a:schemeClr val="accent1"/>
+            </a:effectRef>
+            <a:fontRef idx="minor">
+              <a:schemeClr val="lt1"/>
+            </a:fontRef>
+          </p:style>
+          <p:txBody>
+            <a:bodyPr rtlCol="0" anchor="ctr"/>
+            <a:lstStyle/>
+            <a:p>
+              <a:pPr algn="ctr"/>
+              <a:endParaRPr lang="en-US"/>
+            </a:p>
+          </p:txBody>
+        </p:sp>
+        <p:sp>
+          <p:nvSpPr>
+            <p:cNvPr id="4" name="Rectangle 3">
+              <a:extLst>
+                <a:ext uri="{FF2B5EF4-FFF2-40B4-BE49-F238E27FC236}">
+                  <a16:creationId xmlns:a16="http://schemas.microsoft.com/office/drawing/2014/main" id="{B4EDB9CA-21A2-44F4-9E65-659874AA2D3D}"/>
+                </a:ext>
+              </a:extLst>
+            </p:cNvPr>
+            <p:cNvSpPr/>
+            <p:nvPr/>
+          </p:nvSpPr>
+          <p:spPr>
+            <a:xfrm>
+              <a:off x="4076700" y="2026920"/>
+              <a:ext cx="1927860" cy="1104900"/>
+            </a:xfrm>
+            <a:prstGeom prst="rect">
+              <a:avLst/>
+            </a:prstGeom>
+            <a:solidFill>
+              <a:schemeClr val="bg1"/>
+            </a:solidFill>
+            <a:ln>
+              <a:solidFill>
+                <a:schemeClr val="bg1"/>
+              </a:solidFill>
+            </a:ln>
+          </p:spPr>
+          <p:style>
+            <a:lnRef idx="2">
+              <a:schemeClr val="accent1">
+                <a:shade val="50000"/>
+              </a:schemeClr>
+            </a:lnRef>
+            <a:fillRef idx="1">
+              <a:schemeClr val="accent1"/>
+            </a:fillRef>
+            <a:effectRef idx="0">
+              <a:schemeClr val="accent1"/>
+            </a:effectRef>
+            <a:fontRef idx="minor">
+              <a:schemeClr val="lt1"/>
+            </a:fontRef>
+          </p:style>
+          <p:txBody>
+            <a:bodyPr rtlCol="0" anchor="ctr"/>
+            <a:lstStyle/>
+            <a:p>
+              <a:pPr algn="ctr"/>
+              <a:endParaRPr lang="en-US"/>
+            </a:p>
+          </p:txBody>
+        </p:sp>
+        <p:sp>
+          <p:nvSpPr>
+            <p:cNvPr id="5" name="Oval 4">
+              <a:extLst>
+                <a:ext uri="{FF2B5EF4-FFF2-40B4-BE49-F238E27FC236}">
+                  <a16:creationId xmlns:a16="http://schemas.microsoft.com/office/drawing/2014/main" id="{FA0BB2A6-5AAF-40A7-AE48-4D0A67E8C2F5}"/>
+                </a:ext>
+              </a:extLst>
+            </p:cNvPr>
+            <p:cNvSpPr/>
+            <p:nvPr/>
+          </p:nvSpPr>
+          <p:spPr>
+            <a:xfrm>
+              <a:off x="4396740" y="2419350"/>
+              <a:ext cx="1303020" cy="1363980"/>
+            </a:xfrm>
+            <a:prstGeom prst="ellipse">
+              <a:avLst/>
+            </a:prstGeom>
+            <a:noFill/>
+            <a:ln w="38100">
+              <a:solidFill>
+                <a:schemeClr val="tx1">
+                  <a:lumMod val="95000"/>
+                  <a:lumOff val="5000"/>
+                </a:schemeClr>
+              </a:solidFill>
+            </a:ln>
+          </p:spPr>
+          <p:style>
+            <a:lnRef idx="2">
+              <a:schemeClr val="accent1">
+                <a:shade val="50000"/>
+              </a:schemeClr>
+            </a:lnRef>
+            <a:fillRef idx="1">
+              <a:schemeClr val="accent1"/>
+            </a:fillRef>
+            <a:effectRef idx="0">
+              <a:schemeClr val="accent1"/>
+            </a:effectRef>
+            <a:fontRef idx="minor">
+              <a:schemeClr val="lt1"/>
+            </a:fontRef>
+          </p:style>
+          <p:txBody>
+            <a:bodyPr rtlCol="0" anchor="ctr"/>
+            <a:lstStyle/>
+            <a:p>
+              <a:pPr algn="ctr"/>
+              <a:endParaRPr lang="en-US"/>
+            </a:p>
+          </p:txBody>
+        </p:sp>
+        <p:cxnSp>
+          <p:nvCxnSpPr>
+            <p:cNvPr id="7" name="Straight Connector 6">
+              <a:extLst>
+                <a:ext uri="{FF2B5EF4-FFF2-40B4-BE49-F238E27FC236}">
+                  <a16:creationId xmlns:a16="http://schemas.microsoft.com/office/drawing/2014/main" id="{56677CD6-6114-4BC4-90C9-1381581CD255}"/>
+                </a:ext>
+              </a:extLst>
+            </p:cNvPr>
+            <p:cNvCxnSpPr>
+              <a:cxnSpLocks/>
+            </p:cNvCxnSpPr>
+            <p:nvPr/>
+          </p:nvCxnSpPr>
+          <p:spPr>
+            <a:xfrm>
+              <a:off x="5048250" y="4008120"/>
+              <a:ext cx="0" cy="1363980"/>
+            </a:xfrm>
+            <a:prstGeom prst="line">
+              <a:avLst/>
+            </a:prstGeom>
+            <a:noFill/>
+            <a:ln w="38100">
+              <a:solidFill>
+                <a:schemeClr val="tx1">
+                  <a:lumMod val="95000"/>
+                  <a:lumOff val="5000"/>
+                </a:schemeClr>
+              </a:solidFill>
+            </a:ln>
+          </p:spPr>
+          <p:style>
+            <a:lnRef idx="2">
+              <a:schemeClr val="accent1">
+                <a:shade val="50000"/>
+              </a:schemeClr>
+            </a:lnRef>
+            <a:fillRef idx="1">
+              <a:schemeClr val="accent1"/>
+            </a:fillRef>
+            <a:effectRef idx="0">
+              <a:schemeClr val="accent1"/>
+            </a:effectRef>
+            <a:fontRef idx="minor">
+              <a:schemeClr val="lt1"/>
+            </a:fontRef>
+          </p:style>
+        </p:cxnSp>
+        <p:cxnSp>
+          <p:nvCxnSpPr>
+            <p:cNvPr id="9" name="Straight Connector 8">
+              <a:extLst>
+                <a:ext uri="{FF2B5EF4-FFF2-40B4-BE49-F238E27FC236}">
+                  <a16:creationId xmlns:a16="http://schemas.microsoft.com/office/drawing/2014/main" id="{B8993D50-EBF4-4B30-BF46-F3C3337705A7}"/>
+                </a:ext>
+              </a:extLst>
+            </p:cNvPr>
+            <p:cNvCxnSpPr>
+              <a:cxnSpLocks/>
+            </p:cNvCxnSpPr>
+            <p:nvPr/>
+          </p:nvCxnSpPr>
+          <p:spPr>
+            <a:xfrm>
+              <a:off x="4457700" y="4602480"/>
+              <a:ext cx="1303020" cy="0"/>
+            </a:xfrm>
+            <a:prstGeom prst="line">
+              <a:avLst/>
+            </a:prstGeom>
+            <a:noFill/>
+            <a:ln w="38100">
+              <a:solidFill>
+                <a:schemeClr val="tx1">
+                  <a:lumMod val="95000"/>
+                  <a:lumOff val="5000"/>
+                </a:schemeClr>
+              </a:solidFill>
+            </a:ln>
+          </p:spPr>
+          <p:style>
+            <a:lnRef idx="2">
+              <a:schemeClr val="accent1">
+                <a:shade val="50000"/>
+              </a:schemeClr>
+            </a:lnRef>
+            <a:fillRef idx="1">
+              <a:schemeClr val="accent1"/>
+            </a:fillRef>
+            <a:effectRef idx="0">
+              <a:schemeClr val="accent1"/>
+            </a:effectRef>
+            <a:fontRef idx="minor">
+              <a:schemeClr val="lt1"/>
+            </a:fontRef>
+          </p:style>
+        </p:cxnSp>
+      </p:grpSp>
+    </p:spTree>
+    <p:extLst>
+      <p:ext uri="{BB962C8B-B14F-4D97-AF65-F5344CB8AC3E}">
+        <p14:creationId xmlns:p14="http://schemas.microsoft.com/office/powerpoint/2010/main" val="3730469588"/>
+      </p:ext>
+    </p:extLst>
+  </p:cSld>
+  <p:clrMapOvr>
+    <a:masterClrMapping/>
+  </p:clrMapOvr>
+</p:sld>
+</file>
+
 <file path=ppt/slides/slide2.xml><?xml version="1.0" encoding="utf-8"?>
+<p:sld xmlns:a="http://schemas.openxmlformats.org/drawingml/2006/main" xmlns:r="http://schemas.openxmlformats.org/officeDocument/2006/relationships" xmlns:p="http://schemas.openxmlformats.org/presentationml/2006/main">
+  <p:cSld>
+    <p:spTree>
+      <p:nvGrpSpPr>
+        <p:cNvPr id="1" name=""/>
+        <p:cNvGrpSpPr/>
+        <p:nvPr/>
+      </p:nvGrpSpPr>
+      <p:grpSpPr>
+        <a:xfrm>
+          <a:off x="0" y="0"/>
+          <a:ext cx="0" cy="0"/>
+          <a:chOff x="0" y="0"/>
+          <a:chExt cx="0" cy="0"/>
+        </a:xfrm>
+      </p:grpSpPr>
+      <p:sp>
+        <p:nvSpPr>
+          <p:cNvPr id="2" name="TextBox 1">
+            <a:extLst>
+              <a:ext uri="{FF2B5EF4-FFF2-40B4-BE49-F238E27FC236}">
+                <a16:creationId xmlns:a16="http://schemas.microsoft.com/office/drawing/2014/main" id="{D97A878C-7FE5-47FD-AD9B-C982D618BC14}"/>
+              </a:ext>
+            </a:extLst>
+          </p:cNvPr>
+          <p:cNvSpPr txBox="1"/>
+          <p:nvPr/>
+        </p:nvSpPr>
+        <p:spPr>
+          <a:xfrm>
+            <a:off x="1450428" y="2459421"/>
+            <a:ext cx="1434662" cy="523220"/>
+          </a:xfrm>
+          <a:prstGeom prst="rect">
+            <a:avLst/>
+          </a:prstGeom>
+          <a:noFill/>
+        </p:spPr>
+        <p:txBody>
+          <a:bodyPr wrap="square" rtlCol="0">
+            <a:spAutoFit/>
+          </a:bodyPr>
+          <a:lstStyle/>
+          <a:p>
+            <a:r>
+              <a:rPr lang="en-US" sz="2800" b="1" dirty="0"/>
+              <a:t>H</a:t>
+            </a:r>
+            <a:r>
+              <a:rPr lang="en-US" sz="2800" b="1" baseline="-25000" dirty="0"/>
+              <a:t>2</a:t>
+            </a:r>
+            <a:r>
+              <a:rPr lang="en-US" sz="2800" b="1" dirty="0"/>
+              <a:t>0</a:t>
+            </a:r>
+          </a:p>
+        </p:txBody>
+      </p:sp>
+      <p:sp>
+        <p:nvSpPr>
+          <p:cNvPr id="3" name="TextBox 2">
+            <a:extLst>
+              <a:ext uri="{FF2B5EF4-FFF2-40B4-BE49-F238E27FC236}">
+                <a16:creationId xmlns:a16="http://schemas.microsoft.com/office/drawing/2014/main" id="{F4FF3CB2-1808-42A3-8282-D125B7149E15}"/>
+              </a:ext>
+            </a:extLst>
+          </p:cNvPr>
+          <p:cNvSpPr txBox="1"/>
+          <p:nvPr/>
+        </p:nvSpPr>
+        <p:spPr>
+          <a:xfrm>
+            <a:off x="3275162" y="2459421"/>
+            <a:ext cx="1564852" cy="523220"/>
+          </a:xfrm>
+          <a:prstGeom prst="rect">
+            <a:avLst/>
+          </a:prstGeom>
+          <a:noFill/>
+        </p:spPr>
+        <p:txBody>
+          <a:bodyPr wrap="none" rtlCol="0">
+            <a:spAutoFit/>
+          </a:bodyPr>
+          <a:lstStyle/>
+          <a:p>
+            <a:r>
+              <a:rPr lang="en-US" sz="2800" b="1" dirty="0"/>
+              <a:t>H – O – H</a:t>
+            </a:r>
+          </a:p>
+        </p:txBody>
+      </p:sp>
+      <p:pic>
+        <p:nvPicPr>
+          <p:cNvPr id="7" name="Picture 6">
+            <a:extLst>
+              <a:ext uri="{FF2B5EF4-FFF2-40B4-BE49-F238E27FC236}">
+                <a16:creationId xmlns:a16="http://schemas.microsoft.com/office/drawing/2014/main" id="{97ECF3E1-D166-40D5-97CF-1FA46C130FA6}"/>
+              </a:ext>
+            </a:extLst>
+          </p:cNvPr>
+          <p:cNvPicPr>
+            <a:picLocks noChangeAspect="1"/>
+          </p:cNvPicPr>
+          <p:nvPr/>
+        </p:nvPicPr>
+        <p:blipFill>
+          <a:blip r:embed="rId2"/>
+          <a:stretch>
+            <a:fillRect/>
+          </a:stretch>
+        </p:blipFill>
+        <p:spPr>
+          <a:xfrm>
+            <a:off x="5707078" y="2288032"/>
+            <a:ext cx="1564852" cy="980389"/>
+          </a:xfrm>
+          <a:prstGeom prst="rect">
+            <a:avLst/>
+          </a:prstGeom>
+        </p:spPr>
+      </p:pic>
+      <p:sp>
+        <p:nvSpPr>
+          <p:cNvPr id="8" name="Rectangle 7">
+            <a:extLst>
+              <a:ext uri="{FF2B5EF4-FFF2-40B4-BE49-F238E27FC236}">
+                <a16:creationId xmlns:a16="http://schemas.microsoft.com/office/drawing/2014/main" id="{52A9D34D-DEEA-4A03-9585-226AFD049D31}"/>
+              </a:ext>
+            </a:extLst>
+          </p:cNvPr>
+          <p:cNvSpPr/>
+          <p:nvPr/>
+        </p:nvSpPr>
+        <p:spPr>
+          <a:xfrm>
+            <a:off x="6276144" y="2721031"/>
+            <a:ext cx="426720" cy="523220"/>
+          </a:xfrm>
+          <a:prstGeom prst="rect">
+            <a:avLst/>
+          </a:prstGeom>
+        </p:spPr>
+        <p:txBody>
+          <a:bodyPr wrap="none">
+            <a:spAutoFit/>
+          </a:bodyPr>
+          <a:lstStyle/>
+          <a:p>
+            <a:r>
+              <a:rPr lang="en-US" sz="2800" b="1" dirty="0"/>
+              <a:t>O</a:t>
+            </a:r>
+          </a:p>
+        </p:txBody>
+      </p:sp>
+      <p:sp>
+        <p:nvSpPr>
+          <p:cNvPr id="10" name="Rectangle 9">
+            <a:extLst>
+              <a:ext uri="{FF2B5EF4-FFF2-40B4-BE49-F238E27FC236}">
+                <a16:creationId xmlns:a16="http://schemas.microsoft.com/office/drawing/2014/main" id="{2870578C-54F8-419A-9A1A-2E3F01C08043}"/>
+              </a:ext>
+            </a:extLst>
+          </p:cNvPr>
+          <p:cNvSpPr/>
+          <p:nvPr/>
+        </p:nvSpPr>
+        <p:spPr>
+          <a:xfrm>
+            <a:off x="5745178" y="2354117"/>
+            <a:ext cx="410690" cy="523220"/>
+          </a:xfrm>
+          <a:prstGeom prst="rect">
+            <a:avLst/>
+          </a:prstGeom>
+        </p:spPr>
+        <p:txBody>
+          <a:bodyPr wrap="none">
+            <a:spAutoFit/>
+          </a:bodyPr>
+          <a:lstStyle/>
+          <a:p>
+            <a:r>
+              <a:rPr lang="en-US" sz="2800" b="1" dirty="0">
+                <a:solidFill>
+                  <a:prstClr val="black"/>
+                </a:solidFill>
+              </a:rPr>
+              <a:t>H</a:t>
+            </a:r>
+            <a:endParaRPr lang="en-US" dirty="0"/>
+          </a:p>
+        </p:txBody>
+      </p:sp>
+      <p:sp>
+        <p:nvSpPr>
+          <p:cNvPr id="11" name="Rectangle 10">
+            <a:extLst>
+              <a:ext uri="{FF2B5EF4-FFF2-40B4-BE49-F238E27FC236}">
+                <a16:creationId xmlns:a16="http://schemas.microsoft.com/office/drawing/2014/main" id="{3750AA6E-E7D5-4986-8752-5719AF13F011}"/>
+              </a:ext>
+            </a:extLst>
+          </p:cNvPr>
+          <p:cNvSpPr/>
+          <p:nvPr/>
+        </p:nvSpPr>
+        <p:spPr>
+          <a:xfrm>
+            <a:off x="6801102" y="2288032"/>
+            <a:ext cx="410690" cy="523220"/>
+          </a:xfrm>
+          <a:prstGeom prst="rect">
+            <a:avLst/>
+          </a:prstGeom>
+        </p:spPr>
+        <p:txBody>
+          <a:bodyPr wrap="none">
+            <a:spAutoFit/>
+          </a:bodyPr>
+          <a:lstStyle/>
+          <a:p>
+            <a:r>
+              <a:rPr lang="en-US" sz="2800" b="1" dirty="0">
+                <a:solidFill>
+                  <a:prstClr val="black"/>
+                </a:solidFill>
+              </a:rPr>
+              <a:t>H</a:t>
+            </a:r>
+            <a:endParaRPr lang="en-US" dirty="0"/>
+          </a:p>
+        </p:txBody>
+      </p:sp>
+      <p:sp>
+        <p:nvSpPr>
+          <p:cNvPr id="12" name="TextBox 11">
+            <a:extLst>
+              <a:ext uri="{FF2B5EF4-FFF2-40B4-BE49-F238E27FC236}">
+                <a16:creationId xmlns:a16="http://schemas.microsoft.com/office/drawing/2014/main" id="{A29436E9-87E0-405A-B5CD-2345932F85C4}"/>
+              </a:ext>
+            </a:extLst>
+          </p:cNvPr>
+          <p:cNvSpPr txBox="1"/>
+          <p:nvPr/>
+        </p:nvSpPr>
+        <p:spPr>
+          <a:xfrm>
+            <a:off x="1450428" y="3690694"/>
+            <a:ext cx="436338" cy="369332"/>
+          </a:xfrm>
+          <a:prstGeom prst="rect">
+            <a:avLst/>
+          </a:prstGeom>
+          <a:noFill/>
+        </p:spPr>
+        <p:txBody>
+          <a:bodyPr wrap="none" rtlCol="0">
+            <a:spAutoFit/>
+          </a:bodyPr>
+          <a:lstStyle/>
+          <a:p>
+            <a:r>
+              <a:rPr lang="en-US" dirty="0"/>
+              <a:t>(a)</a:t>
+            </a:r>
+          </a:p>
+        </p:txBody>
+      </p:sp>
+      <p:sp>
+        <p:nvSpPr>
+          <p:cNvPr id="13" name="TextBox 12">
+            <a:extLst>
+              <a:ext uri="{FF2B5EF4-FFF2-40B4-BE49-F238E27FC236}">
+                <a16:creationId xmlns:a16="http://schemas.microsoft.com/office/drawing/2014/main" id="{2196FE50-4399-418C-8AB2-B077EEC78EA6}"/>
+              </a:ext>
+            </a:extLst>
+          </p:cNvPr>
+          <p:cNvSpPr txBox="1"/>
+          <p:nvPr/>
+        </p:nvSpPr>
+        <p:spPr>
+          <a:xfrm>
+            <a:off x="3833809" y="3690694"/>
+            <a:ext cx="447558" cy="369332"/>
+          </a:xfrm>
+          <a:prstGeom prst="rect">
+            <a:avLst/>
+          </a:prstGeom>
+          <a:noFill/>
+        </p:spPr>
+        <p:txBody>
+          <a:bodyPr wrap="none" rtlCol="0">
+            <a:spAutoFit/>
+          </a:bodyPr>
+          <a:lstStyle/>
+          <a:p>
+            <a:r>
+              <a:rPr lang="en-US" dirty="0"/>
+              <a:t>(b)</a:t>
+            </a:r>
+          </a:p>
+        </p:txBody>
+      </p:sp>
+      <p:sp>
+        <p:nvSpPr>
+          <p:cNvPr id="14" name="TextBox 13">
+            <a:extLst>
+              <a:ext uri="{FF2B5EF4-FFF2-40B4-BE49-F238E27FC236}">
+                <a16:creationId xmlns:a16="http://schemas.microsoft.com/office/drawing/2014/main" id="{AC2DD28B-C865-4ED9-BD9D-C59635BCDFB5}"/>
+              </a:ext>
+            </a:extLst>
+          </p:cNvPr>
+          <p:cNvSpPr txBox="1"/>
+          <p:nvPr/>
+        </p:nvSpPr>
+        <p:spPr>
+          <a:xfrm>
+            <a:off x="6279350" y="3690694"/>
+            <a:ext cx="423514" cy="369332"/>
+          </a:xfrm>
+          <a:prstGeom prst="rect">
+            <a:avLst/>
+          </a:prstGeom>
+          <a:noFill/>
+        </p:spPr>
+        <p:txBody>
+          <a:bodyPr wrap="none" rtlCol="0">
+            <a:spAutoFit/>
+          </a:bodyPr>
+          <a:lstStyle/>
+          <a:p>
+            <a:r>
+              <a:rPr lang="en-US" dirty="0"/>
+              <a:t>(c)</a:t>
+            </a:r>
+          </a:p>
+        </p:txBody>
+      </p:sp>
+    </p:spTree>
+    <p:extLst>
+      <p:ext uri="{BB962C8B-B14F-4D97-AF65-F5344CB8AC3E}">
+        <p14:creationId xmlns:p14="http://schemas.microsoft.com/office/powerpoint/2010/main" val="2954338411"/>
+      </p:ext>
+    </p:extLst>
+  </p:cSld>
+  <p:clrMapOvr>
+    <a:masterClrMapping/>
+  </p:clrMapOvr>
+</p:sld>
+</file>
+
+<file path=ppt/slides/slide3.xml><?xml version="1.0" encoding="utf-8"?>
 <p:sld xmlns:a="http://schemas.openxmlformats.org/drawingml/2006/main" xmlns:r="http://schemas.openxmlformats.org/officeDocument/2006/relationships" xmlns:p="http://schemas.openxmlformats.org/presentationml/2006/main">
   <p:cSld>
     <p:spTree>
@@ -5267,7 +9202,7 @@
 </p:sld>
 </file>
 
-<file path=ppt/slides/slide3.xml><?xml version="1.0" encoding="utf-8"?>
+<file path=ppt/slides/slide4.xml><?xml version="1.0" encoding="utf-8"?>
 <p:sld xmlns:a="http://schemas.openxmlformats.org/drawingml/2006/main" xmlns:r="http://schemas.openxmlformats.org/officeDocument/2006/relationships" xmlns:p="http://schemas.openxmlformats.org/presentationml/2006/main">
   <p:cSld>
     <p:bg>
@@ -7987,7 +11922,7 @@
 </p:sld>
 </file>
 
-<file path=ppt/slides/slide4.xml><?xml version="1.0" encoding="utf-8"?>
+<file path=ppt/slides/slide5.xml><?xml version="1.0" encoding="utf-8"?>
 <p:sld xmlns:a="http://schemas.openxmlformats.org/drawingml/2006/main" xmlns:r="http://schemas.openxmlformats.org/officeDocument/2006/relationships" xmlns:p="http://schemas.openxmlformats.org/presentationml/2006/main">
   <p:cSld>
     <p:spTree>
@@ -9566,6 +13501,508 @@
     <p:extLst>
       <p:ext uri="{BB962C8B-B14F-4D97-AF65-F5344CB8AC3E}">
         <p14:creationId xmlns:p14="http://schemas.microsoft.com/office/powerpoint/2010/main" val="3407709806"/>
+      </p:ext>
+    </p:extLst>
+  </p:cSld>
+  <p:clrMapOvr>
+    <a:masterClrMapping/>
+  </p:clrMapOvr>
+</p:sld>
+</file>
+
+<file path=ppt/slides/slide6.xml><?xml version="1.0" encoding="utf-8"?>
+<p:sld xmlns:a="http://schemas.openxmlformats.org/drawingml/2006/main" xmlns:r="http://schemas.openxmlformats.org/officeDocument/2006/relationships" xmlns:p="http://schemas.openxmlformats.org/presentationml/2006/main">
+  <p:cSld>
+    <p:spTree>
+      <p:nvGrpSpPr>
+        <p:cNvPr id="1" name=""/>
+        <p:cNvGrpSpPr/>
+        <p:nvPr/>
+      </p:nvGrpSpPr>
+      <p:grpSpPr>
+        <a:xfrm>
+          <a:off x="0" y="0"/>
+          <a:ext cx="0" cy="0"/>
+          <a:chOff x="0" y="0"/>
+          <a:chExt cx="0" cy="0"/>
+        </a:xfrm>
+      </p:grpSpPr>
+      <p:sp>
+        <p:nvSpPr>
+          <p:cNvPr id="2" name="TextBox 1">
+            <a:extLst>
+              <a:ext uri="{FF2B5EF4-FFF2-40B4-BE49-F238E27FC236}">
+                <a16:creationId xmlns:a16="http://schemas.microsoft.com/office/drawing/2014/main" id="{8B016C27-445B-4CC7-B1AB-810C82345570}"/>
+              </a:ext>
+            </a:extLst>
+          </p:cNvPr>
+          <p:cNvSpPr txBox="1"/>
+          <p:nvPr/>
+        </p:nvSpPr>
+        <p:spPr>
+          <a:xfrm>
+            <a:off x="1524000" y="1123950"/>
+            <a:ext cx="8554458" cy="1015663"/>
+          </a:xfrm>
+          <a:prstGeom prst="rect">
+            <a:avLst/>
+          </a:prstGeom>
+          <a:noFill/>
+        </p:spPr>
+        <p:txBody>
+          <a:bodyPr wrap="none" rtlCol="0">
+            <a:spAutoFit/>
+          </a:bodyPr>
+          <a:lstStyle/>
+          <a:p>
+            <a:r>
+              <a:rPr lang="en-US" sz="2400" b="1" dirty="0">
+                <a:solidFill>
+                  <a:schemeClr val="accent1">
+                    <a:lumMod val="75000"/>
+                  </a:schemeClr>
+                </a:solidFill>
+              </a:rPr>
+              <a:t>Blue tie made in USA</a:t>
+            </a:r>
+          </a:p>
+          <a:p>
+            <a:r>
+              <a:rPr lang="en-US" dirty="0">
+                <a:solidFill>
+                  <a:schemeClr val="accent6">
+                    <a:lumMod val="50000"/>
+                  </a:schemeClr>
+                </a:solidFill>
+              </a:rPr>
+              <a:t>http://www.example.com/products/solid_turquoise_tie</a:t>
+            </a:r>
+          </a:p>
+          <a:p>
+            <a:r>
+              <a:rPr lang="en-US" dirty="0"/>
+              <a:t>While I call this my solid turquoise tie, the fabric has a sheen to it  that makes the colors…</a:t>
+            </a:r>
+          </a:p>
+        </p:txBody>
+      </p:sp>
+      <p:sp>
+        <p:nvSpPr>
+          <p:cNvPr id="3" name="TextBox 2">
+            <a:extLst>
+              <a:ext uri="{FF2B5EF4-FFF2-40B4-BE49-F238E27FC236}">
+                <a16:creationId xmlns:a16="http://schemas.microsoft.com/office/drawing/2014/main" id="{1ED8832A-2E55-47B7-9523-9D376062C020}"/>
+              </a:ext>
+            </a:extLst>
+          </p:cNvPr>
+          <p:cNvSpPr txBox="1"/>
+          <p:nvPr/>
+        </p:nvSpPr>
+        <p:spPr>
+          <a:xfrm>
+            <a:off x="1524000" y="2781300"/>
+            <a:ext cx="8758936" cy="1292662"/>
+          </a:xfrm>
+          <a:prstGeom prst="rect">
+            <a:avLst/>
+          </a:prstGeom>
+          <a:noFill/>
+        </p:spPr>
+        <p:txBody>
+          <a:bodyPr wrap="none" rtlCol="0">
+            <a:spAutoFit/>
+          </a:bodyPr>
+          <a:lstStyle/>
+          <a:p>
+            <a:r>
+              <a:rPr lang="en-US" sz="2400" b="1" dirty="0">
+                <a:solidFill>
+                  <a:schemeClr val="accent1">
+                    <a:lumMod val="75000"/>
+                  </a:schemeClr>
+                </a:solidFill>
+              </a:rPr>
+              <a:t>Buffalo Wild Tie</a:t>
+            </a:r>
+          </a:p>
+          <a:p>
+            <a:r>
+              <a:rPr lang="en-US" dirty="0">
+                <a:solidFill>
+                  <a:schemeClr val="accent6">
+                    <a:lumMod val="50000"/>
+                  </a:schemeClr>
+                </a:solidFill>
+              </a:rPr>
+              <a:t>http://www.example.com/products/Buffalo_tie</a:t>
+            </a:r>
+          </a:p>
+          <a:p>
+            <a:r>
+              <a:rPr lang="en-US" dirty="0">
+                <a:solidFill>
+                  <a:schemeClr val="accent6">
+                    <a:lumMod val="50000"/>
+                  </a:schemeClr>
+                </a:solidFill>
+                <a:sym typeface="Wingdings" panose="05000000000000000000" pitchFamily="2" charset="2"/>
+              </a:rPr>
+              <a:t>      Rating: 5    $39.95    In Stock</a:t>
+            </a:r>
+            <a:endParaRPr lang="en-US" dirty="0">
+              <a:solidFill>
+                <a:schemeClr val="accent6">
+                  <a:lumMod val="50000"/>
+                </a:schemeClr>
+              </a:solidFill>
+            </a:endParaRPr>
+          </a:p>
+          <a:p>
+            <a:r>
+              <a:rPr lang="en-US" dirty="0"/>
+              <a:t>Four color plaid background in an extra skinny Buffalo style makes this tie stand out in a </a:t>
+            </a:r>
+            <a:r>
+              <a:rPr lang="en-US" dirty="0" err="1"/>
+              <a:t>cr</a:t>
+            </a:r>
+            <a:r>
+              <a:rPr lang="en-US" dirty="0"/>
+              <a:t>….</a:t>
+            </a:r>
+          </a:p>
+        </p:txBody>
+      </p:sp>
+    </p:spTree>
+    <p:extLst>
+      <p:ext uri="{BB962C8B-B14F-4D97-AF65-F5344CB8AC3E}">
+        <p14:creationId xmlns:p14="http://schemas.microsoft.com/office/powerpoint/2010/main" val="3055343437"/>
+      </p:ext>
+    </p:extLst>
+  </p:cSld>
+  <p:clrMapOvr>
+    <a:masterClrMapping/>
+  </p:clrMapOvr>
+</p:sld>
+</file>
+
+<file path=ppt/slides/slide7.xml><?xml version="1.0" encoding="utf-8"?>
+<p:sld xmlns:a="http://schemas.openxmlformats.org/drawingml/2006/main" xmlns:r="http://schemas.openxmlformats.org/officeDocument/2006/relationships" xmlns:p="http://schemas.openxmlformats.org/presentationml/2006/main">
+  <p:cSld>
+    <p:spTree>
+      <p:nvGrpSpPr>
+        <p:cNvPr id="1" name=""/>
+        <p:cNvGrpSpPr/>
+        <p:nvPr/>
+      </p:nvGrpSpPr>
+      <p:grpSpPr>
+        <a:xfrm>
+          <a:off x="0" y="0"/>
+          <a:ext cx="0" cy="0"/>
+          <a:chOff x="0" y="0"/>
+          <a:chExt cx="0" cy="0"/>
+        </a:xfrm>
+      </p:grpSpPr>
+      <p:sp>
+        <p:nvSpPr>
+          <p:cNvPr id="2" name="TextBox 1">
+            <a:extLst>
+              <a:ext uri="{FF2B5EF4-FFF2-40B4-BE49-F238E27FC236}">
+                <a16:creationId xmlns:a16="http://schemas.microsoft.com/office/drawing/2014/main" id="{8B016C27-445B-4CC7-B1AB-810C82345570}"/>
+              </a:ext>
+            </a:extLst>
+          </p:cNvPr>
+          <p:cNvSpPr txBox="1"/>
+          <p:nvPr/>
+        </p:nvSpPr>
+        <p:spPr>
+          <a:xfrm>
+            <a:off x="1524000" y="1123950"/>
+            <a:ext cx="8554458" cy="1015663"/>
+          </a:xfrm>
+          <a:prstGeom prst="rect">
+            <a:avLst/>
+          </a:prstGeom>
+          <a:noFill/>
+        </p:spPr>
+        <p:txBody>
+          <a:bodyPr wrap="none" rtlCol="0">
+            <a:spAutoFit/>
+          </a:bodyPr>
+          <a:lstStyle/>
+          <a:p>
+            <a:r>
+              <a:rPr lang="en-US" sz="2400" b="1" dirty="0">
+                <a:solidFill>
+                  <a:schemeClr val="accent1">
+                    <a:lumMod val="75000"/>
+                  </a:schemeClr>
+                </a:solidFill>
+              </a:rPr>
+              <a:t>Blue tie made in USA</a:t>
+            </a:r>
+          </a:p>
+          <a:p>
+            <a:r>
+              <a:rPr lang="en-US" dirty="0">
+                <a:solidFill>
+                  <a:schemeClr val="accent6">
+                    <a:lumMod val="50000"/>
+                  </a:schemeClr>
+                </a:solidFill>
+              </a:rPr>
+              <a:t>http://www.example.com/products/solid_turquoise_tie</a:t>
+            </a:r>
+          </a:p>
+          <a:p>
+            <a:r>
+              <a:rPr lang="en-US" dirty="0"/>
+              <a:t>While I call this my solid turquoise tie, the fabric has a sheen to it  that makes the colors…</a:t>
+            </a:r>
+          </a:p>
+        </p:txBody>
+      </p:sp>
+      <p:sp>
+        <p:nvSpPr>
+          <p:cNvPr id="3" name="TextBox 2">
+            <a:extLst>
+              <a:ext uri="{FF2B5EF4-FFF2-40B4-BE49-F238E27FC236}">
+                <a16:creationId xmlns:a16="http://schemas.microsoft.com/office/drawing/2014/main" id="{1ED8832A-2E55-47B7-9523-9D376062C020}"/>
+              </a:ext>
+            </a:extLst>
+          </p:cNvPr>
+          <p:cNvSpPr txBox="1"/>
+          <p:nvPr/>
+        </p:nvSpPr>
+        <p:spPr>
+          <a:xfrm>
+            <a:off x="1524000" y="2781300"/>
+            <a:ext cx="8758936" cy="1292662"/>
+          </a:xfrm>
+          <a:prstGeom prst="rect">
+            <a:avLst/>
+          </a:prstGeom>
+          <a:noFill/>
+        </p:spPr>
+        <p:txBody>
+          <a:bodyPr wrap="none" rtlCol="0">
+            <a:spAutoFit/>
+          </a:bodyPr>
+          <a:lstStyle/>
+          <a:p>
+            <a:r>
+              <a:rPr lang="en-US" sz="2400" b="1" dirty="0">
+                <a:solidFill>
+                  <a:schemeClr val="accent1">
+                    <a:lumMod val="75000"/>
+                  </a:schemeClr>
+                </a:solidFill>
+              </a:rPr>
+              <a:t>Buffalo Wild Tie</a:t>
+            </a:r>
+          </a:p>
+          <a:p>
+            <a:r>
+              <a:rPr lang="en-US" dirty="0">
+                <a:solidFill>
+                  <a:schemeClr val="accent6">
+                    <a:lumMod val="50000"/>
+                  </a:schemeClr>
+                </a:solidFill>
+              </a:rPr>
+              <a:t>http://www.example.com/products/Buffalo_tie</a:t>
+            </a:r>
+          </a:p>
+          <a:p>
+            <a:r>
+              <a:rPr lang="en-US" dirty="0">
+                <a:solidFill>
+                  <a:schemeClr val="accent6">
+                    <a:lumMod val="50000"/>
+                  </a:schemeClr>
+                </a:solidFill>
+                <a:sym typeface="Wingdings" panose="05000000000000000000" pitchFamily="2" charset="2"/>
+              </a:rPr>
+              <a:t>      Rating: 5    $39.95    In Stock</a:t>
+            </a:r>
+            <a:endParaRPr lang="en-US" dirty="0">
+              <a:solidFill>
+                <a:schemeClr val="accent6">
+                  <a:lumMod val="50000"/>
+                </a:schemeClr>
+              </a:solidFill>
+            </a:endParaRPr>
+          </a:p>
+          <a:p>
+            <a:r>
+              <a:rPr lang="en-US" dirty="0"/>
+              <a:t>Four color plaid background in an extra skinny Buffalo style makes this tie stand out in a </a:t>
+            </a:r>
+            <a:r>
+              <a:rPr lang="en-US" dirty="0" err="1"/>
+              <a:t>cr</a:t>
+            </a:r>
+            <a:r>
+              <a:rPr lang="en-US" dirty="0"/>
+              <a:t>….</a:t>
+            </a:r>
+          </a:p>
+        </p:txBody>
+      </p:sp>
+    </p:spTree>
+    <p:extLst>
+      <p:ext uri="{BB962C8B-B14F-4D97-AF65-F5344CB8AC3E}">
+        <p14:creationId xmlns:p14="http://schemas.microsoft.com/office/powerpoint/2010/main" val="3062389731"/>
+      </p:ext>
+    </p:extLst>
+  </p:cSld>
+  <p:clrMapOvr>
+    <a:masterClrMapping/>
+  </p:clrMapOvr>
+</p:sld>
+</file>
+
+<file path=ppt/slides/slide8.xml><?xml version="1.0" encoding="utf-8"?>
+<p:sld xmlns:a="http://schemas.openxmlformats.org/drawingml/2006/main" xmlns:r="http://schemas.openxmlformats.org/officeDocument/2006/relationships" xmlns:p="http://schemas.openxmlformats.org/presentationml/2006/main">
+  <p:cSld>
+    <p:spTree>
+      <p:nvGrpSpPr>
+        <p:cNvPr id="1" name=""/>
+        <p:cNvGrpSpPr/>
+        <p:nvPr/>
+      </p:nvGrpSpPr>
+      <p:grpSpPr>
+        <a:xfrm>
+          <a:off x="0" y="0"/>
+          <a:ext cx="0" cy="0"/>
+          <a:chOff x="0" y="0"/>
+          <a:chExt cx="0" cy="0"/>
+        </a:xfrm>
+      </p:grpSpPr>
+      <p:pic>
+        <p:nvPicPr>
+          <p:cNvPr id="4" name="Picture 3">
+            <a:extLst>
+              <a:ext uri="{FF2B5EF4-FFF2-40B4-BE49-F238E27FC236}">
+                <a16:creationId xmlns:a16="http://schemas.microsoft.com/office/drawing/2014/main" id="{4CDBCE91-A279-4644-A09D-271D9BA95AC2}"/>
+              </a:ext>
+            </a:extLst>
+          </p:cNvPr>
+          <p:cNvPicPr>
+            <a:picLocks noChangeAspect="1"/>
+          </p:cNvPicPr>
+          <p:nvPr/>
+        </p:nvPicPr>
+        <p:blipFill>
+          <a:blip r:embed="rId2"/>
+          <a:stretch>
+            <a:fillRect/>
+          </a:stretch>
+        </p:blipFill>
+        <p:spPr>
+          <a:xfrm>
+            <a:off x="609600" y="0"/>
+            <a:ext cx="10972800" cy="6858000"/>
+          </a:xfrm>
+          <a:prstGeom prst="rect">
+            <a:avLst/>
+          </a:prstGeom>
+        </p:spPr>
+      </p:pic>
+    </p:spTree>
+    <p:extLst>
+      <p:ext uri="{BB962C8B-B14F-4D97-AF65-F5344CB8AC3E}">
+        <p14:creationId xmlns:p14="http://schemas.microsoft.com/office/powerpoint/2010/main" val="136136530"/>
+      </p:ext>
+    </p:extLst>
+  </p:cSld>
+  <p:clrMapOvr>
+    <a:masterClrMapping/>
+  </p:clrMapOvr>
+</p:sld>
+</file>
+
+<file path=ppt/slides/slide9.xml><?xml version="1.0" encoding="utf-8"?>
+<p:sld xmlns:a="http://schemas.openxmlformats.org/drawingml/2006/main" xmlns:r="http://schemas.openxmlformats.org/officeDocument/2006/relationships" xmlns:p="http://schemas.openxmlformats.org/presentationml/2006/main">
+  <p:cSld>
+    <p:spTree>
+      <p:nvGrpSpPr>
+        <p:cNvPr id="1" name=""/>
+        <p:cNvGrpSpPr/>
+        <p:nvPr/>
+      </p:nvGrpSpPr>
+      <p:grpSpPr>
+        <a:xfrm>
+          <a:off x="0" y="0"/>
+          <a:ext cx="0" cy="0"/>
+          <a:chOff x="0" y="0"/>
+          <a:chExt cx="0" cy="0"/>
+        </a:xfrm>
+      </p:grpSpPr>
+      <p:pic>
+        <p:nvPicPr>
+          <p:cNvPr id="2" name="Picture 1">
+            <a:extLst>
+              <a:ext uri="{FF2B5EF4-FFF2-40B4-BE49-F238E27FC236}">
+                <a16:creationId xmlns:a16="http://schemas.microsoft.com/office/drawing/2014/main" id="{39C25ACB-4771-4888-BC87-170B31ADF5E6}"/>
+              </a:ext>
+            </a:extLst>
+          </p:cNvPr>
+          <p:cNvPicPr>
+            <a:picLocks noChangeAspect="1"/>
+          </p:cNvPicPr>
+          <p:nvPr/>
+        </p:nvPicPr>
+        <p:blipFill>
+          <a:blip r:embed="rId2"/>
+          <a:stretch>
+            <a:fillRect/>
+          </a:stretch>
+        </p:blipFill>
+        <p:spPr>
+          <a:xfrm>
+            <a:off x="0" y="1236364"/>
+            <a:ext cx="12192000" cy="2365972"/>
+          </a:xfrm>
+          <a:prstGeom prst="rect">
+            <a:avLst/>
+          </a:prstGeom>
+        </p:spPr>
+      </p:pic>
+      <p:pic>
+        <p:nvPicPr>
+          <p:cNvPr id="3" name="Picture 2">
+            <a:extLst>
+              <a:ext uri="{FF2B5EF4-FFF2-40B4-BE49-F238E27FC236}">
+                <a16:creationId xmlns:a16="http://schemas.microsoft.com/office/drawing/2014/main" id="{F5A21D2D-DF00-49EB-87D2-59205A00FFE0}"/>
+              </a:ext>
+            </a:extLst>
+          </p:cNvPr>
+          <p:cNvPicPr>
+            <a:picLocks noChangeAspect="1"/>
+          </p:cNvPicPr>
+          <p:nvPr/>
+        </p:nvPicPr>
+        <p:blipFill>
+          <a:blip r:embed="rId3"/>
+          <a:stretch>
+            <a:fillRect/>
+          </a:stretch>
+        </p:blipFill>
+        <p:spPr>
+          <a:xfrm>
+            <a:off x="-133350" y="3771068"/>
+            <a:ext cx="12192000" cy="2706763"/>
+          </a:xfrm>
+          <a:prstGeom prst="rect">
+            <a:avLst/>
+          </a:prstGeom>
+        </p:spPr>
+      </p:pic>
+    </p:spTree>
+    <p:extLst>
+      <p:ext uri="{BB962C8B-B14F-4D97-AF65-F5344CB8AC3E}">
+        <p14:creationId xmlns:p14="http://schemas.microsoft.com/office/powerpoint/2010/main" val="4023971822"/>
       </p:ext>
     </p:extLst>
   </p:cSld>

</xml_diff>

<commit_message>
Make images have bolder boxes
</commit_message>
<xml_diff>
--- a/SWWOv3/media/ch3/Figures.pptx
+++ b/SWWOv3/media/ch3/Figures.pptx
@@ -17,6 +17,8 @@
     <p:sldId id="265" r:id="rId11"/>
     <p:sldId id="266" r:id="rId12"/>
     <p:sldId id="267" r:id="rId13"/>
+    <p:sldId id="268" r:id="rId14"/>
+    <p:sldId id="269" r:id="rId15"/>
   </p:sldIdLst>
   <p:sldSz cx="12192000" cy="6858000"/>
   <p:notesSz cx="6858000" cy="9144000"/>
@@ -6958,6 +6960,1366 @@
     <p:extLst>
       <p:ext uri="{BB962C8B-B14F-4D97-AF65-F5344CB8AC3E}">
         <p14:creationId xmlns:p14="http://schemas.microsoft.com/office/powerpoint/2010/main" val="3730469588"/>
+      </p:ext>
+    </p:extLst>
+  </p:cSld>
+  <p:clrMapOvr>
+    <a:masterClrMapping/>
+  </p:clrMapOvr>
+</p:sld>
+</file>
+
+<file path=ppt/slides/slide13.xml><?xml version="1.0" encoding="utf-8"?>
+<p:sld xmlns:a="http://schemas.openxmlformats.org/drawingml/2006/main" xmlns:r="http://schemas.openxmlformats.org/officeDocument/2006/relationships" xmlns:p="http://schemas.openxmlformats.org/presentationml/2006/main">
+  <p:cSld>
+    <p:spTree>
+      <p:nvGrpSpPr>
+        <p:cNvPr id="1" name=""/>
+        <p:cNvGrpSpPr/>
+        <p:nvPr/>
+      </p:nvGrpSpPr>
+      <p:grpSpPr>
+        <a:xfrm>
+          <a:off x="0" y="0"/>
+          <a:ext cx="0" cy="0"/>
+          <a:chOff x="0" y="0"/>
+          <a:chExt cx="0" cy="0"/>
+        </a:xfrm>
+      </p:grpSpPr>
+      <p:sp>
+        <p:nvSpPr>
+          <p:cNvPr id="2" name="Flowchart: Magnetic Disk 1">
+            <a:extLst>
+              <a:ext uri="{FF2B5EF4-FFF2-40B4-BE49-F238E27FC236}">
+                <a16:creationId xmlns:a16="http://schemas.microsoft.com/office/drawing/2014/main" id="{A0E81E3D-26EF-4E88-A5B6-B73AF5082126}"/>
+              </a:ext>
+            </a:extLst>
+          </p:cNvPr>
+          <p:cNvSpPr/>
+          <p:nvPr/>
+        </p:nvSpPr>
+        <p:spPr>
+          <a:xfrm>
+            <a:off x="2190750" y="3181350"/>
+            <a:ext cx="3276600" cy="1543050"/>
+          </a:xfrm>
+          <a:prstGeom prst="flowChartMagneticDisk">
+            <a:avLst/>
+          </a:prstGeom>
+          <a:solidFill>
+            <a:schemeClr val="bg1">
+              <a:lumMod val="85000"/>
+            </a:schemeClr>
+          </a:solidFill>
+          <a:ln>
+            <a:solidFill>
+              <a:schemeClr val="tx1">
+                <a:lumMod val="95000"/>
+                <a:lumOff val="5000"/>
+              </a:schemeClr>
+            </a:solidFill>
+          </a:ln>
+        </p:spPr>
+        <p:style>
+          <a:lnRef idx="2">
+            <a:schemeClr val="accent1">
+              <a:shade val="50000"/>
+            </a:schemeClr>
+          </a:lnRef>
+          <a:fillRef idx="1">
+            <a:schemeClr val="accent1"/>
+          </a:fillRef>
+          <a:effectRef idx="0">
+            <a:schemeClr val="accent1"/>
+          </a:effectRef>
+          <a:fontRef idx="minor">
+            <a:schemeClr val="lt1"/>
+          </a:fontRef>
+        </p:style>
+        <p:txBody>
+          <a:bodyPr rtlCol="0" anchor="ctr"/>
+          <a:lstStyle/>
+          <a:p>
+            <a:pPr algn="ctr"/>
+            <a:r>
+              <a:rPr lang="en-US" sz="3200" dirty="0">
+                <a:solidFill>
+                  <a:schemeClr val="tx1"/>
+                </a:solidFill>
+              </a:rPr>
+              <a:t>Database</a:t>
+            </a:r>
+          </a:p>
+        </p:txBody>
+      </p:sp>
+      <p:sp>
+        <p:nvSpPr>
+          <p:cNvPr id="3" name="Flowchart: Magnetic Disk 2">
+            <a:extLst>
+              <a:ext uri="{FF2B5EF4-FFF2-40B4-BE49-F238E27FC236}">
+                <a16:creationId xmlns:a16="http://schemas.microsoft.com/office/drawing/2014/main" id="{862A6629-963C-46DF-B937-ED689D69A4D1}"/>
+              </a:ext>
+            </a:extLst>
+          </p:cNvPr>
+          <p:cNvSpPr/>
+          <p:nvPr/>
+        </p:nvSpPr>
+        <p:spPr>
+          <a:xfrm>
+            <a:off x="2190750" y="2257425"/>
+            <a:ext cx="3276600" cy="1543050"/>
+          </a:xfrm>
+          <a:prstGeom prst="flowChartMagneticDisk">
+            <a:avLst/>
+          </a:prstGeom>
+          <a:solidFill>
+            <a:schemeClr val="bg1">
+              <a:lumMod val="95000"/>
+            </a:schemeClr>
+          </a:solidFill>
+          <a:ln>
+            <a:solidFill>
+              <a:schemeClr val="tx1">
+                <a:lumMod val="95000"/>
+                <a:lumOff val="5000"/>
+              </a:schemeClr>
+            </a:solidFill>
+          </a:ln>
+        </p:spPr>
+        <p:style>
+          <a:lnRef idx="2">
+            <a:schemeClr val="accent1">
+              <a:shade val="50000"/>
+            </a:schemeClr>
+          </a:lnRef>
+          <a:fillRef idx="1">
+            <a:schemeClr val="accent1"/>
+          </a:fillRef>
+          <a:effectRef idx="0">
+            <a:schemeClr val="accent1"/>
+          </a:effectRef>
+          <a:fontRef idx="minor">
+            <a:schemeClr val="lt1"/>
+          </a:fontRef>
+        </p:style>
+        <p:txBody>
+          <a:bodyPr rtlCol="0" anchor="ctr"/>
+          <a:lstStyle/>
+          <a:p>
+            <a:pPr algn="ctr"/>
+            <a:r>
+              <a:rPr lang="en-US" sz="3200" dirty="0">
+                <a:solidFill>
+                  <a:schemeClr val="tx1"/>
+                </a:solidFill>
+              </a:rPr>
+              <a:t>Query Engine</a:t>
+            </a:r>
+          </a:p>
+        </p:txBody>
+      </p:sp>
+      <p:sp>
+        <p:nvSpPr>
+          <p:cNvPr id="4" name="Flowchart: Alternate Process 3">
+            <a:extLst>
+              <a:ext uri="{FF2B5EF4-FFF2-40B4-BE49-F238E27FC236}">
+                <a16:creationId xmlns:a16="http://schemas.microsoft.com/office/drawing/2014/main" id="{881347E5-35FA-490A-B394-EDE8259C4A38}"/>
+              </a:ext>
+            </a:extLst>
+          </p:cNvPr>
+          <p:cNvSpPr/>
+          <p:nvPr/>
+        </p:nvSpPr>
+        <p:spPr>
+          <a:xfrm>
+            <a:off x="2190750" y="1027176"/>
+            <a:ext cx="3276600" cy="612648"/>
+          </a:xfrm>
+          <a:prstGeom prst="flowChartAlternateProcess">
+            <a:avLst/>
+          </a:prstGeom>
+          <a:solidFill>
+            <a:schemeClr val="bg1">
+              <a:lumMod val="85000"/>
+            </a:schemeClr>
+          </a:solidFill>
+          <a:ln>
+            <a:solidFill>
+              <a:schemeClr val="tx1">
+                <a:lumMod val="95000"/>
+                <a:lumOff val="5000"/>
+              </a:schemeClr>
+            </a:solidFill>
+          </a:ln>
+        </p:spPr>
+        <p:style>
+          <a:lnRef idx="2">
+            <a:schemeClr val="accent1">
+              <a:shade val="50000"/>
+            </a:schemeClr>
+          </a:lnRef>
+          <a:fillRef idx="1">
+            <a:schemeClr val="accent1"/>
+          </a:fillRef>
+          <a:effectRef idx="0">
+            <a:schemeClr val="accent1"/>
+          </a:effectRef>
+          <a:fontRef idx="minor">
+            <a:schemeClr val="lt1"/>
+          </a:fontRef>
+        </p:style>
+        <p:txBody>
+          <a:bodyPr rot="0" spcFirstLastPara="0" vertOverflow="overflow" horzOverflow="overflow" vert="horz" wrap="square" lIns="91440" tIns="45720" rIns="91440" bIns="45720" numCol="1" spcCol="0" rtlCol="0" fromWordArt="0" anchor="ctr" anchorCtr="0" forceAA="0" compatLnSpc="1">
+            <a:prstTxWarp prst="textNoShape">
+              <a:avLst/>
+            </a:prstTxWarp>
+            <a:noAutofit/>
+          </a:bodyPr>
+          <a:lstStyle/>
+          <a:p>
+            <a:pPr algn="ctr"/>
+            <a:r>
+              <a:rPr lang="en-US" sz="3200" dirty="0">
+                <a:solidFill>
+                  <a:schemeClr val="tx1"/>
+                </a:solidFill>
+              </a:rPr>
+              <a:t>Application</a:t>
+            </a:r>
+          </a:p>
+        </p:txBody>
+      </p:sp>
+      <p:cxnSp>
+        <p:nvCxnSpPr>
+          <p:cNvPr id="6" name="Straight Arrow Connector 5">
+            <a:extLst>
+              <a:ext uri="{FF2B5EF4-FFF2-40B4-BE49-F238E27FC236}">
+                <a16:creationId xmlns:a16="http://schemas.microsoft.com/office/drawing/2014/main" id="{763153FF-FC1C-40D5-A53D-8A54060E6A13}"/>
+              </a:ext>
+            </a:extLst>
+          </p:cNvPr>
+          <p:cNvCxnSpPr>
+            <a:cxnSpLocks/>
+            <a:stCxn id="4" idx="2"/>
+          </p:cNvCxnSpPr>
+          <p:nvPr/>
+        </p:nvCxnSpPr>
+        <p:spPr>
+          <a:xfrm>
+            <a:off x="3829050" y="1639824"/>
+            <a:ext cx="0" cy="874776"/>
+          </a:xfrm>
+          <a:prstGeom prst="straightConnector1">
+            <a:avLst/>
+          </a:prstGeom>
+          <a:ln w="38100">
+            <a:solidFill>
+              <a:schemeClr val="tx1"/>
+            </a:solidFill>
+            <a:tailEnd type="triangle"/>
+          </a:ln>
+        </p:spPr>
+        <p:style>
+          <a:lnRef idx="1">
+            <a:schemeClr val="accent1"/>
+          </a:lnRef>
+          <a:fillRef idx="0">
+            <a:schemeClr val="accent1"/>
+          </a:fillRef>
+          <a:effectRef idx="0">
+            <a:schemeClr val="accent1"/>
+          </a:effectRef>
+          <a:fontRef idx="minor">
+            <a:schemeClr val="tx1"/>
+          </a:fontRef>
+        </p:style>
+      </p:cxnSp>
+      <p:cxnSp>
+        <p:nvCxnSpPr>
+          <p:cNvPr id="8" name="Straight Arrow Connector 7">
+            <a:extLst>
+              <a:ext uri="{FF2B5EF4-FFF2-40B4-BE49-F238E27FC236}">
+                <a16:creationId xmlns:a16="http://schemas.microsoft.com/office/drawing/2014/main" id="{10218C58-B37F-4145-A70F-F2047074D572}"/>
+              </a:ext>
+            </a:extLst>
+          </p:cNvPr>
+          <p:cNvCxnSpPr>
+            <a:cxnSpLocks/>
+          </p:cNvCxnSpPr>
+          <p:nvPr/>
+        </p:nvCxnSpPr>
+        <p:spPr>
+          <a:xfrm>
+            <a:off x="5467350" y="1181100"/>
+            <a:ext cx="1257302" cy="0"/>
+          </a:xfrm>
+          <a:prstGeom prst="straightConnector1">
+            <a:avLst/>
+          </a:prstGeom>
+          <a:ln w="38100">
+            <a:solidFill>
+              <a:schemeClr val="tx1"/>
+            </a:solidFill>
+            <a:tailEnd type="triangle"/>
+          </a:ln>
+        </p:spPr>
+        <p:style>
+          <a:lnRef idx="1">
+            <a:schemeClr val="accent1"/>
+          </a:lnRef>
+          <a:fillRef idx="0">
+            <a:schemeClr val="accent1"/>
+          </a:fillRef>
+          <a:effectRef idx="0">
+            <a:schemeClr val="accent1"/>
+          </a:effectRef>
+          <a:fontRef idx="minor">
+            <a:schemeClr val="tx1"/>
+          </a:fontRef>
+        </p:style>
+      </p:cxnSp>
+      <p:cxnSp>
+        <p:nvCxnSpPr>
+          <p:cNvPr id="11" name="Straight Arrow Connector 10">
+            <a:extLst>
+              <a:ext uri="{FF2B5EF4-FFF2-40B4-BE49-F238E27FC236}">
+                <a16:creationId xmlns:a16="http://schemas.microsoft.com/office/drawing/2014/main" id="{D8B6D4D9-4F3E-43F5-962D-9EEC56DF2FEC}"/>
+              </a:ext>
+            </a:extLst>
+          </p:cNvPr>
+          <p:cNvCxnSpPr>
+            <a:cxnSpLocks/>
+          </p:cNvCxnSpPr>
+          <p:nvPr/>
+        </p:nvCxnSpPr>
+        <p:spPr>
+          <a:xfrm>
+            <a:off x="5467349" y="1449614"/>
+            <a:ext cx="1257302" cy="0"/>
+          </a:xfrm>
+          <a:prstGeom prst="straightConnector1">
+            <a:avLst/>
+          </a:prstGeom>
+          <a:ln w="38100">
+            <a:solidFill>
+              <a:schemeClr val="tx1"/>
+            </a:solidFill>
+            <a:tailEnd type="triangle"/>
+          </a:ln>
+        </p:spPr>
+        <p:style>
+          <a:lnRef idx="1">
+            <a:schemeClr val="accent1"/>
+          </a:lnRef>
+          <a:fillRef idx="0">
+            <a:schemeClr val="accent1"/>
+          </a:fillRef>
+          <a:effectRef idx="0">
+            <a:schemeClr val="accent1"/>
+          </a:effectRef>
+          <a:fontRef idx="minor">
+            <a:schemeClr val="tx1"/>
+          </a:fontRef>
+        </p:style>
+      </p:cxnSp>
+      <p:sp>
+        <p:nvSpPr>
+          <p:cNvPr id="12" name="TextBox 11">
+            <a:extLst>
+              <a:ext uri="{FF2B5EF4-FFF2-40B4-BE49-F238E27FC236}">
+                <a16:creationId xmlns:a16="http://schemas.microsoft.com/office/drawing/2014/main" id="{DCBD7F31-2B51-437C-874E-8CAD05A735BF}"/>
+              </a:ext>
+            </a:extLst>
+          </p:cNvPr>
+          <p:cNvSpPr txBox="1"/>
+          <p:nvPr/>
+        </p:nvSpPr>
+        <p:spPr>
+          <a:xfrm>
+            <a:off x="6724651" y="920626"/>
+            <a:ext cx="1345112" cy="461665"/>
+          </a:xfrm>
+          <a:prstGeom prst="rect">
+            <a:avLst/>
+          </a:prstGeom>
+          <a:noFill/>
+        </p:spPr>
+        <p:txBody>
+          <a:bodyPr wrap="none" rtlCol="0">
+            <a:spAutoFit/>
+          </a:bodyPr>
+          <a:lstStyle/>
+          <a:p>
+            <a:r>
+              <a:rPr lang="en-US" sz="2400" b="1" dirty="0"/>
+              <a:t>Analytics</a:t>
+            </a:r>
+          </a:p>
+        </p:txBody>
+      </p:sp>
+      <p:sp>
+        <p:nvSpPr>
+          <p:cNvPr id="13" name="TextBox 12">
+            <a:extLst>
+              <a:ext uri="{FF2B5EF4-FFF2-40B4-BE49-F238E27FC236}">
+                <a16:creationId xmlns:a16="http://schemas.microsoft.com/office/drawing/2014/main" id="{07BA3BC4-5ACF-4352-B14B-A2C360682BDD}"/>
+              </a:ext>
+            </a:extLst>
+          </p:cNvPr>
+          <p:cNvSpPr txBox="1"/>
+          <p:nvPr/>
+        </p:nvSpPr>
+        <p:spPr>
+          <a:xfrm>
+            <a:off x="6724651" y="1225034"/>
+            <a:ext cx="1982851" cy="461665"/>
+          </a:xfrm>
+          <a:prstGeom prst="rect">
+            <a:avLst/>
+          </a:prstGeom>
+          <a:noFill/>
+        </p:spPr>
+        <p:txBody>
+          <a:bodyPr wrap="none" rtlCol="0">
+            <a:spAutoFit/>
+          </a:bodyPr>
+          <a:lstStyle/>
+          <a:p>
+            <a:r>
+              <a:rPr lang="en-US" sz="2400" b="1" dirty="0"/>
+              <a:t>User Interface</a:t>
+            </a:r>
+          </a:p>
+        </p:txBody>
+      </p:sp>
+      <p:sp>
+        <p:nvSpPr>
+          <p:cNvPr id="14" name="TextBox 13">
+            <a:extLst>
+              <a:ext uri="{FF2B5EF4-FFF2-40B4-BE49-F238E27FC236}">
+                <a16:creationId xmlns:a16="http://schemas.microsoft.com/office/drawing/2014/main" id="{03B06F43-C72C-4A13-939F-485E4A9879AA}"/>
+              </a:ext>
+            </a:extLst>
+          </p:cNvPr>
+          <p:cNvSpPr txBox="1"/>
+          <p:nvPr/>
+        </p:nvSpPr>
+        <p:spPr>
+          <a:xfrm>
+            <a:off x="6724650" y="1492970"/>
+            <a:ext cx="636713" cy="461665"/>
+          </a:xfrm>
+          <a:prstGeom prst="rect">
+            <a:avLst/>
+          </a:prstGeom>
+          <a:noFill/>
+        </p:spPr>
+        <p:txBody>
+          <a:bodyPr wrap="none" rtlCol="0">
+            <a:spAutoFit/>
+          </a:bodyPr>
+          <a:lstStyle/>
+          <a:p>
+            <a:r>
+              <a:rPr lang="en-US" sz="2400" b="1" dirty="0"/>
+              <a:t>. . . </a:t>
+            </a:r>
+          </a:p>
+        </p:txBody>
+      </p:sp>
+    </p:spTree>
+    <p:extLst>
+      <p:ext uri="{BB962C8B-B14F-4D97-AF65-F5344CB8AC3E}">
+        <p14:creationId xmlns:p14="http://schemas.microsoft.com/office/powerpoint/2010/main" val="2757840500"/>
+      </p:ext>
+    </p:extLst>
+  </p:cSld>
+  <p:clrMapOvr>
+    <a:masterClrMapping/>
+  </p:clrMapOvr>
+</p:sld>
+</file>
+
+<file path=ppt/slides/slide14.xml><?xml version="1.0" encoding="utf-8"?>
+<p:sld xmlns:a="http://schemas.openxmlformats.org/drawingml/2006/main" xmlns:r="http://schemas.openxmlformats.org/officeDocument/2006/relationships" xmlns:p="http://schemas.openxmlformats.org/presentationml/2006/main">
+  <p:cSld>
+    <p:spTree>
+      <p:nvGrpSpPr>
+        <p:cNvPr id="1" name=""/>
+        <p:cNvGrpSpPr/>
+        <p:nvPr/>
+      </p:nvGrpSpPr>
+      <p:grpSpPr>
+        <a:xfrm>
+          <a:off x="0" y="0"/>
+          <a:ext cx="0" cy="0"/>
+          <a:chOff x="0" y="0"/>
+          <a:chExt cx="0" cy="0"/>
+        </a:xfrm>
+      </p:grpSpPr>
+      <p:sp>
+        <p:nvSpPr>
+          <p:cNvPr id="2" name="Flowchart: Magnetic Disk 1">
+            <a:extLst>
+              <a:ext uri="{FF2B5EF4-FFF2-40B4-BE49-F238E27FC236}">
+                <a16:creationId xmlns:a16="http://schemas.microsoft.com/office/drawing/2014/main" id="{A0E81E3D-26EF-4E88-A5B6-B73AF5082126}"/>
+              </a:ext>
+            </a:extLst>
+          </p:cNvPr>
+          <p:cNvSpPr/>
+          <p:nvPr/>
+        </p:nvSpPr>
+        <p:spPr>
+          <a:xfrm>
+            <a:off x="4164693" y="3181350"/>
+            <a:ext cx="3276600" cy="1543050"/>
+          </a:xfrm>
+          <a:prstGeom prst="flowChartMagneticDisk">
+            <a:avLst/>
+          </a:prstGeom>
+          <a:solidFill>
+            <a:schemeClr val="bg1">
+              <a:lumMod val="85000"/>
+            </a:schemeClr>
+          </a:solidFill>
+          <a:ln>
+            <a:solidFill>
+              <a:schemeClr val="tx1">
+                <a:lumMod val="95000"/>
+                <a:lumOff val="5000"/>
+              </a:schemeClr>
+            </a:solidFill>
+          </a:ln>
+        </p:spPr>
+        <p:style>
+          <a:lnRef idx="2">
+            <a:schemeClr val="accent1">
+              <a:shade val="50000"/>
+            </a:schemeClr>
+          </a:lnRef>
+          <a:fillRef idx="1">
+            <a:schemeClr val="accent1"/>
+          </a:fillRef>
+          <a:effectRef idx="0">
+            <a:schemeClr val="accent1"/>
+          </a:effectRef>
+          <a:fontRef idx="minor">
+            <a:schemeClr val="lt1"/>
+          </a:fontRef>
+        </p:style>
+        <p:txBody>
+          <a:bodyPr rtlCol="0" anchor="ctr"/>
+          <a:lstStyle/>
+          <a:p>
+            <a:pPr algn="ctr"/>
+            <a:r>
+              <a:rPr lang="en-US" sz="3200" dirty="0">
+                <a:solidFill>
+                  <a:schemeClr val="tx1"/>
+                </a:solidFill>
+              </a:rPr>
+              <a:t>Database</a:t>
+            </a:r>
+          </a:p>
+        </p:txBody>
+      </p:sp>
+      <p:sp>
+        <p:nvSpPr>
+          <p:cNvPr id="3" name="Flowchart: Magnetic Disk 2">
+            <a:extLst>
+              <a:ext uri="{FF2B5EF4-FFF2-40B4-BE49-F238E27FC236}">
+                <a16:creationId xmlns:a16="http://schemas.microsoft.com/office/drawing/2014/main" id="{862A6629-963C-46DF-B937-ED689D69A4D1}"/>
+              </a:ext>
+            </a:extLst>
+          </p:cNvPr>
+          <p:cNvSpPr/>
+          <p:nvPr/>
+        </p:nvSpPr>
+        <p:spPr>
+          <a:xfrm>
+            <a:off x="4164693" y="2257425"/>
+            <a:ext cx="3276600" cy="1543050"/>
+          </a:xfrm>
+          <a:prstGeom prst="flowChartMagneticDisk">
+            <a:avLst/>
+          </a:prstGeom>
+          <a:solidFill>
+            <a:schemeClr val="bg1">
+              <a:lumMod val="95000"/>
+            </a:schemeClr>
+          </a:solidFill>
+          <a:ln>
+            <a:solidFill>
+              <a:schemeClr val="tx1">
+                <a:lumMod val="95000"/>
+                <a:lumOff val="5000"/>
+              </a:schemeClr>
+            </a:solidFill>
+          </a:ln>
+        </p:spPr>
+        <p:style>
+          <a:lnRef idx="2">
+            <a:schemeClr val="accent1">
+              <a:shade val="50000"/>
+            </a:schemeClr>
+          </a:lnRef>
+          <a:fillRef idx="1">
+            <a:schemeClr val="accent1"/>
+          </a:fillRef>
+          <a:effectRef idx="0">
+            <a:schemeClr val="accent1"/>
+          </a:effectRef>
+          <a:fontRef idx="minor">
+            <a:schemeClr val="lt1"/>
+          </a:fontRef>
+        </p:style>
+        <p:txBody>
+          <a:bodyPr rtlCol="0" anchor="ctr"/>
+          <a:lstStyle/>
+          <a:p>
+            <a:pPr algn="ctr"/>
+            <a:r>
+              <a:rPr lang="en-US" sz="3200" dirty="0">
+                <a:solidFill>
+                  <a:schemeClr val="tx1"/>
+                </a:solidFill>
+              </a:rPr>
+              <a:t>Query Engine</a:t>
+            </a:r>
+          </a:p>
+        </p:txBody>
+      </p:sp>
+      <p:sp>
+        <p:nvSpPr>
+          <p:cNvPr id="4" name="Flowchart: Alternate Process 3">
+            <a:extLst>
+              <a:ext uri="{FF2B5EF4-FFF2-40B4-BE49-F238E27FC236}">
+                <a16:creationId xmlns:a16="http://schemas.microsoft.com/office/drawing/2014/main" id="{881347E5-35FA-490A-B394-EDE8259C4A38}"/>
+              </a:ext>
+            </a:extLst>
+          </p:cNvPr>
+          <p:cNvSpPr/>
+          <p:nvPr/>
+        </p:nvSpPr>
+        <p:spPr>
+          <a:xfrm>
+            <a:off x="4164693" y="1027176"/>
+            <a:ext cx="3276600" cy="612648"/>
+          </a:xfrm>
+          <a:prstGeom prst="flowChartAlternateProcess">
+            <a:avLst/>
+          </a:prstGeom>
+          <a:solidFill>
+            <a:schemeClr val="bg1">
+              <a:lumMod val="85000"/>
+            </a:schemeClr>
+          </a:solidFill>
+          <a:ln>
+            <a:solidFill>
+              <a:schemeClr val="tx1">
+                <a:lumMod val="95000"/>
+                <a:lumOff val="5000"/>
+              </a:schemeClr>
+            </a:solidFill>
+          </a:ln>
+        </p:spPr>
+        <p:style>
+          <a:lnRef idx="2">
+            <a:schemeClr val="accent1">
+              <a:shade val="50000"/>
+            </a:schemeClr>
+          </a:lnRef>
+          <a:fillRef idx="1">
+            <a:schemeClr val="accent1"/>
+          </a:fillRef>
+          <a:effectRef idx="0">
+            <a:schemeClr val="accent1"/>
+          </a:effectRef>
+          <a:fontRef idx="minor">
+            <a:schemeClr val="lt1"/>
+          </a:fontRef>
+        </p:style>
+        <p:txBody>
+          <a:bodyPr rot="0" spcFirstLastPara="0" vertOverflow="overflow" horzOverflow="overflow" vert="horz" wrap="square" lIns="91440" tIns="45720" rIns="91440" bIns="45720" numCol="1" spcCol="0" rtlCol="0" fromWordArt="0" anchor="ctr" anchorCtr="0" forceAA="0" compatLnSpc="1">
+            <a:prstTxWarp prst="textNoShape">
+              <a:avLst/>
+            </a:prstTxWarp>
+            <a:noAutofit/>
+          </a:bodyPr>
+          <a:lstStyle/>
+          <a:p>
+            <a:pPr algn="ctr"/>
+            <a:r>
+              <a:rPr lang="en-US" sz="3200" dirty="0">
+                <a:solidFill>
+                  <a:schemeClr val="tx1"/>
+                </a:solidFill>
+              </a:rPr>
+              <a:t>Application</a:t>
+            </a:r>
+          </a:p>
+        </p:txBody>
+      </p:sp>
+      <p:cxnSp>
+        <p:nvCxnSpPr>
+          <p:cNvPr id="6" name="Straight Arrow Connector 5">
+            <a:extLst>
+              <a:ext uri="{FF2B5EF4-FFF2-40B4-BE49-F238E27FC236}">
+                <a16:creationId xmlns:a16="http://schemas.microsoft.com/office/drawing/2014/main" id="{763153FF-FC1C-40D5-A53D-8A54060E6A13}"/>
+              </a:ext>
+            </a:extLst>
+          </p:cNvPr>
+          <p:cNvCxnSpPr>
+            <a:cxnSpLocks/>
+            <a:stCxn id="4" idx="2"/>
+          </p:cNvCxnSpPr>
+          <p:nvPr/>
+        </p:nvCxnSpPr>
+        <p:spPr>
+          <a:xfrm>
+            <a:off x="5802993" y="1639824"/>
+            <a:ext cx="0" cy="874776"/>
+          </a:xfrm>
+          <a:prstGeom prst="straightConnector1">
+            <a:avLst/>
+          </a:prstGeom>
+          <a:ln w="38100">
+            <a:solidFill>
+              <a:schemeClr val="tx1"/>
+            </a:solidFill>
+            <a:tailEnd type="triangle"/>
+          </a:ln>
+        </p:spPr>
+        <p:style>
+          <a:lnRef idx="1">
+            <a:schemeClr val="accent1"/>
+          </a:lnRef>
+          <a:fillRef idx="0">
+            <a:schemeClr val="accent1"/>
+          </a:fillRef>
+          <a:effectRef idx="0">
+            <a:schemeClr val="accent1"/>
+          </a:effectRef>
+          <a:fontRef idx="minor">
+            <a:schemeClr val="tx1"/>
+          </a:fontRef>
+        </p:style>
+      </p:cxnSp>
+      <p:cxnSp>
+        <p:nvCxnSpPr>
+          <p:cNvPr id="8" name="Straight Arrow Connector 7">
+            <a:extLst>
+              <a:ext uri="{FF2B5EF4-FFF2-40B4-BE49-F238E27FC236}">
+                <a16:creationId xmlns:a16="http://schemas.microsoft.com/office/drawing/2014/main" id="{10218C58-B37F-4145-A70F-F2047074D572}"/>
+              </a:ext>
+            </a:extLst>
+          </p:cNvPr>
+          <p:cNvCxnSpPr>
+            <a:cxnSpLocks/>
+          </p:cNvCxnSpPr>
+          <p:nvPr/>
+        </p:nvCxnSpPr>
+        <p:spPr>
+          <a:xfrm>
+            <a:off x="7441293" y="1181100"/>
+            <a:ext cx="1257302" cy="0"/>
+          </a:xfrm>
+          <a:prstGeom prst="straightConnector1">
+            <a:avLst/>
+          </a:prstGeom>
+          <a:ln w="38100">
+            <a:solidFill>
+              <a:schemeClr val="tx1"/>
+            </a:solidFill>
+            <a:tailEnd type="triangle"/>
+          </a:ln>
+        </p:spPr>
+        <p:style>
+          <a:lnRef idx="1">
+            <a:schemeClr val="accent1"/>
+          </a:lnRef>
+          <a:fillRef idx="0">
+            <a:schemeClr val="accent1"/>
+          </a:fillRef>
+          <a:effectRef idx="0">
+            <a:schemeClr val="accent1"/>
+          </a:effectRef>
+          <a:fontRef idx="minor">
+            <a:schemeClr val="tx1"/>
+          </a:fontRef>
+        </p:style>
+      </p:cxnSp>
+      <p:cxnSp>
+        <p:nvCxnSpPr>
+          <p:cNvPr id="11" name="Straight Arrow Connector 10">
+            <a:extLst>
+              <a:ext uri="{FF2B5EF4-FFF2-40B4-BE49-F238E27FC236}">
+                <a16:creationId xmlns:a16="http://schemas.microsoft.com/office/drawing/2014/main" id="{D8B6D4D9-4F3E-43F5-962D-9EEC56DF2FEC}"/>
+              </a:ext>
+            </a:extLst>
+          </p:cNvPr>
+          <p:cNvCxnSpPr>
+            <a:cxnSpLocks/>
+          </p:cNvCxnSpPr>
+          <p:nvPr/>
+        </p:nvCxnSpPr>
+        <p:spPr>
+          <a:xfrm>
+            <a:off x="7441292" y="1449614"/>
+            <a:ext cx="1257302" cy="0"/>
+          </a:xfrm>
+          <a:prstGeom prst="straightConnector1">
+            <a:avLst/>
+          </a:prstGeom>
+          <a:ln w="38100">
+            <a:solidFill>
+              <a:schemeClr val="tx1"/>
+            </a:solidFill>
+            <a:tailEnd type="triangle"/>
+          </a:ln>
+        </p:spPr>
+        <p:style>
+          <a:lnRef idx="1">
+            <a:schemeClr val="accent1"/>
+          </a:lnRef>
+          <a:fillRef idx="0">
+            <a:schemeClr val="accent1"/>
+          </a:fillRef>
+          <a:effectRef idx="0">
+            <a:schemeClr val="accent1"/>
+          </a:effectRef>
+          <a:fontRef idx="minor">
+            <a:schemeClr val="tx1"/>
+          </a:fontRef>
+        </p:style>
+      </p:cxnSp>
+      <p:sp>
+        <p:nvSpPr>
+          <p:cNvPr id="12" name="TextBox 11">
+            <a:extLst>
+              <a:ext uri="{FF2B5EF4-FFF2-40B4-BE49-F238E27FC236}">
+                <a16:creationId xmlns:a16="http://schemas.microsoft.com/office/drawing/2014/main" id="{DCBD7F31-2B51-437C-874E-8CAD05A735BF}"/>
+              </a:ext>
+            </a:extLst>
+          </p:cNvPr>
+          <p:cNvSpPr txBox="1"/>
+          <p:nvPr/>
+        </p:nvSpPr>
+        <p:spPr>
+          <a:xfrm>
+            <a:off x="8698594" y="920626"/>
+            <a:ext cx="1345112" cy="461665"/>
+          </a:xfrm>
+          <a:prstGeom prst="rect">
+            <a:avLst/>
+          </a:prstGeom>
+          <a:noFill/>
+        </p:spPr>
+        <p:txBody>
+          <a:bodyPr wrap="none" rtlCol="0">
+            <a:spAutoFit/>
+          </a:bodyPr>
+          <a:lstStyle/>
+          <a:p>
+            <a:r>
+              <a:rPr lang="en-US" sz="2400" b="1" dirty="0"/>
+              <a:t>Analytics</a:t>
+            </a:r>
+          </a:p>
+        </p:txBody>
+      </p:sp>
+      <p:sp>
+        <p:nvSpPr>
+          <p:cNvPr id="13" name="TextBox 12">
+            <a:extLst>
+              <a:ext uri="{FF2B5EF4-FFF2-40B4-BE49-F238E27FC236}">
+                <a16:creationId xmlns:a16="http://schemas.microsoft.com/office/drawing/2014/main" id="{07BA3BC4-5ACF-4352-B14B-A2C360682BDD}"/>
+              </a:ext>
+            </a:extLst>
+          </p:cNvPr>
+          <p:cNvSpPr txBox="1"/>
+          <p:nvPr/>
+        </p:nvSpPr>
+        <p:spPr>
+          <a:xfrm>
+            <a:off x="8698594" y="1225034"/>
+            <a:ext cx="1982851" cy="461665"/>
+          </a:xfrm>
+          <a:prstGeom prst="rect">
+            <a:avLst/>
+          </a:prstGeom>
+          <a:noFill/>
+        </p:spPr>
+        <p:txBody>
+          <a:bodyPr wrap="none" rtlCol="0">
+            <a:spAutoFit/>
+          </a:bodyPr>
+          <a:lstStyle/>
+          <a:p>
+            <a:r>
+              <a:rPr lang="en-US" sz="2400" b="1" dirty="0"/>
+              <a:t>User Interface</a:t>
+            </a:r>
+          </a:p>
+        </p:txBody>
+      </p:sp>
+      <p:sp>
+        <p:nvSpPr>
+          <p:cNvPr id="14" name="TextBox 13">
+            <a:extLst>
+              <a:ext uri="{FF2B5EF4-FFF2-40B4-BE49-F238E27FC236}">
+                <a16:creationId xmlns:a16="http://schemas.microsoft.com/office/drawing/2014/main" id="{03B06F43-C72C-4A13-939F-485E4A9879AA}"/>
+              </a:ext>
+            </a:extLst>
+          </p:cNvPr>
+          <p:cNvSpPr txBox="1"/>
+          <p:nvPr/>
+        </p:nvSpPr>
+        <p:spPr>
+          <a:xfrm>
+            <a:off x="8698593" y="1492970"/>
+            <a:ext cx="636713" cy="461665"/>
+          </a:xfrm>
+          <a:prstGeom prst="rect">
+            <a:avLst/>
+          </a:prstGeom>
+          <a:noFill/>
+        </p:spPr>
+        <p:txBody>
+          <a:bodyPr wrap="none" rtlCol="0">
+            <a:spAutoFit/>
+          </a:bodyPr>
+          <a:lstStyle/>
+          <a:p>
+            <a:r>
+              <a:rPr lang="en-US" sz="2400" b="1" dirty="0"/>
+              <a:t>. . . </a:t>
+            </a:r>
+          </a:p>
+        </p:txBody>
+      </p:sp>
+      <p:sp>
+        <p:nvSpPr>
+          <p:cNvPr id="5" name="Flowchart: Magnetic Disk 4">
+            <a:extLst>
+              <a:ext uri="{FF2B5EF4-FFF2-40B4-BE49-F238E27FC236}">
+                <a16:creationId xmlns:a16="http://schemas.microsoft.com/office/drawing/2014/main" id="{51E07BF6-F63F-4FCD-88CA-80C48A831CAB}"/>
+              </a:ext>
+            </a:extLst>
+          </p:cNvPr>
+          <p:cNvSpPr/>
+          <p:nvPr/>
+        </p:nvSpPr>
+        <p:spPr>
+          <a:xfrm>
+            <a:off x="1901372" y="3800475"/>
+            <a:ext cx="798286" cy="1156934"/>
+          </a:xfrm>
+          <a:prstGeom prst="flowChartMagneticDisk">
+            <a:avLst/>
+          </a:prstGeom>
+          <a:solidFill>
+            <a:schemeClr val="bg1">
+              <a:lumMod val="85000"/>
+            </a:schemeClr>
+          </a:solidFill>
+          <a:ln>
+            <a:solidFill>
+              <a:schemeClr val="tx1">
+                <a:lumMod val="95000"/>
+                <a:lumOff val="5000"/>
+              </a:schemeClr>
+            </a:solidFill>
+          </a:ln>
+        </p:spPr>
+        <p:style>
+          <a:lnRef idx="2">
+            <a:schemeClr val="accent1">
+              <a:shade val="50000"/>
+            </a:schemeClr>
+          </a:lnRef>
+          <a:fillRef idx="1">
+            <a:schemeClr val="accent1"/>
+          </a:fillRef>
+          <a:effectRef idx="0">
+            <a:schemeClr val="accent1"/>
+          </a:effectRef>
+          <a:fontRef idx="minor">
+            <a:schemeClr val="lt1"/>
+          </a:fontRef>
+        </p:style>
+        <p:txBody>
+          <a:bodyPr rot="0" spcFirstLastPara="0" vertOverflow="overflow" horzOverflow="overflow" vert="horz" wrap="square" lIns="91440" tIns="45720" rIns="91440" bIns="45720" numCol="1" spcCol="0" rtlCol="0" fromWordArt="0" anchor="ctr" anchorCtr="0" forceAA="0" compatLnSpc="1">
+            <a:prstTxWarp prst="textNoShape">
+              <a:avLst/>
+            </a:prstTxWarp>
+            <a:noAutofit/>
+          </a:bodyPr>
+          <a:lstStyle/>
+          <a:p>
+            <a:pPr algn="ctr"/>
+            <a:endParaRPr lang="en-US" sz="3200">
+              <a:solidFill>
+                <a:schemeClr val="tx1"/>
+              </a:solidFill>
+            </a:endParaRPr>
+          </a:p>
+        </p:txBody>
+      </p:sp>
+      <p:sp>
+        <p:nvSpPr>
+          <p:cNvPr id="15" name="Flowchart: Magnetic Disk 14">
+            <a:extLst>
+              <a:ext uri="{FF2B5EF4-FFF2-40B4-BE49-F238E27FC236}">
+                <a16:creationId xmlns:a16="http://schemas.microsoft.com/office/drawing/2014/main" id="{1981E880-8C1F-4F4D-9285-B06745AFB871}"/>
+              </a:ext>
+            </a:extLst>
+          </p:cNvPr>
+          <p:cNvSpPr/>
+          <p:nvPr/>
+        </p:nvSpPr>
+        <p:spPr>
+          <a:xfrm>
+            <a:off x="2300515" y="4185103"/>
+            <a:ext cx="798286" cy="1156934"/>
+          </a:xfrm>
+          <a:prstGeom prst="flowChartMagneticDisk">
+            <a:avLst/>
+          </a:prstGeom>
+          <a:solidFill>
+            <a:schemeClr val="bg1">
+              <a:lumMod val="85000"/>
+            </a:schemeClr>
+          </a:solidFill>
+          <a:ln>
+            <a:solidFill>
+              <a:schemeClr val="tx1">
+                <a:lumMod val="95000"/>
+                <a:lumOff val="5000"/>
+              </a:schemeClr>
+            </a:solidFill>
+          </a:ln>
+        </p:spPr>
+        <p:style>
+          <a:lnRef idx="2">
+            <a:schemeClr val="accent1">
+              <a:shade val="50000"/>
+            </a:schemeClr>
+          </a:lnRef>
+          <a:fillRef idx="1">
+            <a:schemeClr val="accent1"/>
+          </a:fillRef>
+          <a:effectRef idx="0">
+            <a:schemeClr val="accent1"/>
+          </a:effectRef>
+          <a:fontRef idx="minor">
+            <a:schemeClr val="lt1"/>
+          </a:fontRef>
+        </p:style>
+        <p:txBody>
+          <a:bodyPr rot="0" spcFirstLastPara="0" vertOverflow="overflow" horzOverflow="overflow" vert="horz" wrap="square" lIns="91440" tIns="45720" rIns="91440" bIns="45720" numCol="1" spcCol="0" rtlCol="0" fromWordArt="0" anchor="ctr" anchorCtr="0" forceAA="0" compatLnSpc="1">
+            <a:prstTxWarp prst="textNoShape">
+              <a:avLst/>
+            </a:prstTxWarp>
+            <a:noAutofit/>
+          </a:bodyPr>
+          <a:lstStyle/>
+          <a:p>
+            <a:pPr algn="ctr"/>
+            <a:endParaRPr lang="en-US" sz="3200">
+              <a:solidFill>
+                <a:schemeClr val="tx1"/>
+              </a:solidFill>
+            </a:endParaRPr>
+          </a:p>
+        </p:txBody>
+      </p:sp>
+      <p:cxnSp>
+        <p:nvCxnSpPr>
+          <p:cNvPr id="16" name="Straight Arrow Connector 15">
+            <a:extLst>
+              <a:ext uri="{FF2B5EF4-FFF2-40B4-BE49-F238E27FC236}">
+                <a16:creationId xmlns:a16="http://schemas.microsoft.com/office/drawing/2014/main" id="{4320CBB9-AD4C-4B9B-846B-1986EEBDC167}"/>
+              </a:ext>
+            </a:extLst>
+          </p:cNvPr>
+          <p:cNvCxnSpPr>
+            <a:cxnSpLocks/>
+          </p:cNvCxnSpPr>
+          <p:nvPr/>
+        </p:nvCxnSpPr>
+        <p:spPr>
+          <a:xfrm flipV="1">
+            <a:off x="2699658" y="3672114"/>
+            <a:ext cx="1465035" cy="624116"/>
+          </a:xfrm>
+          <a:prstGeom prst="straightConnector1">
+            <a:avLst/>
+          </a:prstGeom>
+          <a:ln w="38100">
+            <a:solidFill>
+              <a:schemeClr val="tx1"/>
+            </a:solidFill>
+            <a:tailEnd type="triangle"/>
+          </a:ln>
+        </p:spPr>
+        <p:style>
+          <a:lnRef idx="1">
+            <a:schemeClr val="accent1"/>
+          </a:lnRef>
+          <a:fillRef idx="0">
+            <a:schemeClr val="accent1"/>
+          </a:fillRef>
+          <a:effectRef idx="0">
+            <a:schemeClr val="accent1"/>
+          </a:effectRef>
+          <a:fontRef idx="minor">
+            <a:schemeClr val="tx1"/>
+          </a:fontRef>
+        </p:style>
+      </p:cxnSp>
+      <p:sp>
+        <p:nvSpPr>
+          <p:cNvPr id="10" name="TextBox 9">
+            <a:extLst>
+              <a:ext uri="{FF2B5EF4-FFF2-40B4-BE49-F238E27FC236}">
+                <a16:creationId xmlns:a16="http://schemas.microsoft.com/office/drawing/2014/main" id="{C44D9087-0A4F-4A93-9F5B-0CF4B1E4BCDE}"/>
+              </a:ext>
+            </a:extLst>
+          </p:cNvPr>
+          <p:cNvSpPr txBox="1"/>
+          <p:nvPr/>
+        </p:nvSpPr>
+        <p:spPr>
+          <a:xfrm>
+            <a:off x="2558070" y="3243944"/>
+            <a:ext cx="1407052" cy="646331"/>
+          </a:xfrm>
+          <a:prstGeom prst="rect">
+            <a:avLst/>
+          </a:prstGeom>
+          <a:noFill/>
+        </p:spPr>
+        <p:txBody>
+          <a:bodyPr wrap="none" rtlCol="0">
+            <a:spAutoFit/>
+          </a:bodyPr>
+          <a:lstStyle/>
+          <a:p>
+            <a:r>
+              <a:rPr lang="en-US" dirty="0"/>
+              <a:t>Converters</a:t>
+            </a:r>
+          </a:p>
+          <a:p>
+            <a:r>
+              <a:rPr lang="en-US" dirty="0"/>
+              <a:t>And Scrapers</a:t>
+            </a:r>
+          </a:p>
+        </p:txBody>
+      </p:sp>
+      <p:sp>
+        <p:nvSpPr>
+          <p:cNvPr id="17" name="Flowchart: Document 16">
+            <a:extLst>
+              <a:ext uri="{FF2B5EF4-FFF2-40B4-BE49-F238E27FC236}">
+                <a16:creationId xmlns:a16="http://schemas.microsoft.com/office/drawing/2014/main" id="{9D0D1EFD-40BA-4E0C-96A9-632F32B15C65}"/>
+              </a:ext>
+            </a:extLst>
+          </p:cNvPr>
+          <p:cNvSpPr/>
+          <p:nvPr/>
+        </p:nvSpPr>
+        <p:spPr>
+          <a:xfrm>
+            <a:off x="8837951" y="4162397"/>
+            <a:ext cx="1843494" cy="666691"/>
+          </a:xfrm>
+          <a:prstGeom prst="flowChartDocument">
+            <a:avLst/>
+          </a:prstGeom>
+          <a:solidFill>
+            <a:schemeClr val="bg1">
+              <a:lumMod val="85000"/>
+            </a:schemeClr>
+          </a:solidFill>
+          <a:ln>
+            <a:solidFill>
+              <a:schemeClr val="tx1">
+                <a:lumMod val="95000"/>
+                <a:lumOff val="5000"/>
+              </a:schemeClr>
+            </a:solidFill>
+          </a:ln>
+        </p:spPr>
+        <p:style>
+          <a:lnRef idx="2">
+            <a:schemeClr val="accent1">
+              <a:shade val="50000"/>
+            </a:schemeClr>
+          </a:lnRef>
+          <a:fillRef idx="1">
+            <a:schemeClr val="accent1"/>
+          </a:fillRef>
+          <a:effectRef idx="0">
+            <a:schemeClr val="accent1"/>
+          </a:effectRef>
+          <a:fontRef idx="minor">
+            <a:schemeClr val="lt1"/>
+          </a:fontRef>
+        </p:style>
+        <p:txBody>
+          <a:bodyPr rot="0" spcFirstLastPara="0" vertOverflow="overflow" horzOverflow="overflow" vert="horz" wrap="square" lIns="91440" tIns="45720" rIns="91440" bIns="45720" numCol="1" spcCol="0" rtlCol="0" fromWordArt="0" anchor="ctr" anchorCtr="0" forceAA="0" compatLnSpc="1">
+            <a:prstTxWarp prst="textNoShape">
+              <a:avLst/>
+            </a:prstTxWarp>
+            <a:noAutofit/>
+          </a:bodyPr>
+          <a:lstStyle/>
+          <a:p>
+            <a:pPr algn="ctr"/>
+            <a:r>
+              <a:rPr lang="en-US" sz="3200" dirty="0">
+                <a:solidFill>
+                  <a:schemeClr val="tx1"/>
+                </a:solidFill>
+              </a:rPr>
+              <a:t>RDF Files</a:t>
+            </a:r>
+          </a:p>
+        </p:txBody>
+      </p:sp>
+      <p:sp>
+        <p:nvSpPr>
+          <p:cNvPr id="18" name="TextBox 17">
+            <a:extLst>
+              <a:ext uri="{FF2B5EF4-FFF2-40B4-BE49-F238E27FC236}">
+                <a16:creationId xmlns:a16="http://schemas.microsoft.com/office/drawing/2014/main" id="{C62AD77D-10B5-4F7C-AA41-8F9CE676F8C4}"/>
+              </a:ext>
+            </a:extLst>
+          </p:cNvPr>
+          <p:cNvSpPr txBox="1"/>
+          <p:nvPr/>
+        </p:nvSpPr>
+        <p:spPr>
+          <a:xfrm>
+            <a:off x="1389745" y="5342037"/>
+            <a:ext cx="2908426" cy="646331"/>
+          </a:xfrm>
+          <a:prstGeom prst="rect">
+            <a:avLst/>
+          </a:prstGeom>
+          <a:noFill/>
+        </p:spPr>
+        <p:txBody>
+          <a:bodyPr wrap="square" rtlCol="0">
+            <a:spAutoFit/>
+          </a:bodyPr>
+          <a:lstStyle/>
+          <a:p>
+            <a:pPr algn="ctr"/>
+            <a:r>
+              <a:rPr lang="en-US" dirty="0"/>
+              <a:t>Web pages, Spreadsheets, Databases, etc. </a:t>
+            </a:r>
+          </a:p>
+        </p:txBody>
+      </p:sp>
+      <p:cxnSp>
+        <p:nvCxnSpPr>
+          <p:cNvPr id="19" name="Straight Arrow Connector 18">
+            <a:extLst>
+              <a:ext uri="{FF2B5EF4-FFF2-40B4-BE49-F238E27FC236}">
+                <a16:creationId xmlns:a16="http://schemas.microsoft.com/office/drawing/2014/main" id="{23F6C6DB-9CDE-4A12-94C2-BC57E850939C}"/>
+              </a:ext>
+            </a:extLst>
+          </p:cNvPr>
+          <p:cNvCxnSpPr>
+            <a:cxnSpLocks/>
+            <a:stCxn id="2" idx="4"/>
+            <a:endCxn id="17" idx="1"/>
+          </p:cNvCxnSpPr>
+          <p:nvPr/>
+        </p:nvCxnSpPr>
+        <p:spPr>
+          <a:xfrm>
+            <a:off x="7441293" y="3952875"/>
+            <a:ext cx="1396658" cy="542868"/>
+          </a:xfrm>
+          <a:prstGeom prst="straightConnector1">
+            <a:avLst/>
+          </a:prstGeom>
+          <a:ln w="38100">
+            <a:solidFill>
+              <a:schemeClr val="tx1"/>
+            </a:solidFill>
+            <a:headEnd type="triangle"/>
+            <a:tailEnd type="triangle"/>
+          </a:ln>
+        </p:spPr>
+        <p:style>
+          <a:lnRef idx="1">
+            <a:schemeClr val="accent1"/>
+          </a:lnRef>
+          <a:fillRef idx="0">
+            <a:schemeClr val="accent1"/>
+          </a:fillRef>
+          <a:effectRef idx="0">
+            <a:schemeClr val="accent1"/>
+          </a:effectRef>
+          <a:fontRef idx="minor">
+            <a:schemeClr val="tx1"/>
+          </a:fontRef>
+        </p:style>
+      </p:cxnSp>
+      <p:sp>
+        <p:nvSpPr>
+          <p:cNvPr id="22" name="TextBox 21">
+            <a:extLst>
+              <a:ext uri="{FF2B5EF4-FFF2-40B4-BE49-F238E27FC236}">
+                <a16:creationId xmlns:a16="http://schemas.microsoft.com/office/drawing/2014/main" id="{1F16BDD8-0D12-472E-BB90-AE1006AB02D2}"/>
+              </a:ext>
+            </a:extLst>
+          </p:cNvPr>
+          <p:cNvSpPr txBox="1"/>
+          <p:nvPr/>
+        </p:nvSpPr>
+        <p:spPr>
+          <a:xfrm>
+            <a:off x="7661514" y="3361195"/>
+            <a:ext cx="1037079" cy="646331"/>
+          </a:xfrm>
+          <a:prstGeom prst="rect">
+            <a:avLst/>
+          </a:prstGeom>
+          <a:noFill/>
+        </p:spPr>
+        <p:txBody>
+          <a:bodyPr wrap="none" rtlCol="0">
+            <a:spAutoFit/>
+          </a:bodyPr>
+          <a:lstStyle/>
+          <a:p>
+            <a:pPr algn="ctr"/>
+            <a:r>
+              <a:rPr lang="en-US" dirty="0"/>
+              <a:t>Parser / </a:t>
+            </a:r>
+          </a:p>
+          <a:p>
+            <a:pPr algn="ctr"/>
+            <a:r>
+              <a:rPr lang="en-US" dirty="0"/>
+              <a:t>Serializer</a:t>
+            </a:r>
+          </a:p>
+        </p:txBody>
+      </p:sp>
+    </p:spTree>
+    <p:extLst>
+      <p:ext uri="{BB962C8B-B14F-4D97-AF65-F5344CB8AC3E}">
+        <p14:creationId xmlns:p14="http://schemas.microsoft.com/office/powerpoint/2010/main" val="2376837784"/>
       </p:ext>
     </p:extLst>
   </p:cSld>

</xml_diff>

<commit_message>
Make figure 5-17 use free clip art
</commit_message>
<xml_diff>
--- a/SWWOv3/media/ch3/Figures.pptx
+++ b/SWWOv3/media/ch3/Figures.pptx
@@ -20,6 +20,7 @@
     <p:sldId id="268" r:id="rId14"/>
     <p:sldId id="269" r:id="rId15"/>
     <p:sldId id="270" r:id="rId16"/>
+    <p:sldId id="271" r:id="rId17"/>
   </p:sldIdLst>
   <p:sldSz cx="12192000" cy="6858000"/>
   <p:notesSz cx="6858000" cy="9144000"/>
@@ -11039,7 +11040,7 @@
           <a:lstStyle/>
           <a:p>
             <a:pPr algn="ctr"/>
-            <a:endParaRPr lang="en-US"/>
+            <a:endParaRPr lang="en-US" dirty="0"/>
           </a:p>
         </p:txBody>
       </p:sp>
@@ -13851,6 +13852,1071 @@
 </p:sld>
 </file>
 
+<file path=ppt/slides/slide16.xml><?xml version="1.0" encoding="utf-8"?>
+<p:sld xmlns:a="http://schemas.openxmlformats.org/drawingml/2006/main" xmlns:r="http://schemas.openxmlformats.org/officeDocument/2006/relationships" xmlns:p="http://schemas.openxmlformats.org/presentationml/2006/main">
+  <p:cSld>
+    <p:spTree>
+      <p:nvGrpSpPr>
+        <p:cNvPr id="1" name=""/>
+        <p:cNvGrpSpPr/>
+        <p:nvPr/>
+      </p:nvGrpSpPr>
+      <p:grpSpPr>
+        <a:xfrm>
+          <a:off x="0" y="0"/>
+          <a:ext cx="0" cy="0"/>
+          <a:chOff x="0" y="0"/>
+          <a:chExt cx="0" cy="0"/>
+        </a:xfrm>
+      </p:grpSpPr>
+      <p:pic>
+        <p:nvPicPr>
+          <p:cNvPr id="2" name="Picture 1" descr="A picture containing light&#10;&#10;Description automatically generated">
+            <a:extLst>
+              <a:ext uri="{FF2B5EF4-FFF2-40B4-BE49-F238E27FC236}">
+                <a16:creationId xmlns:a16="http://schemas.microsoft.com/office/drawing/2014/main" id="{6E99DD30-9103-45D0-8FF6-3806F98117E2}"/>
+              </a:ext>
+            </a:extLst>
+          </p:cNvPr>
+          <p:cNvPicPr>
+            <a:picLocks noChangeAspect="1"/>
+          </p:cNvPicPr>
+          <p:nvPr/>
+        </p:nvPicPr>
+        <p:blipFill>
+          <a:blip r:embed="rId2">
+            <a:extLst>
+              <a:ext uri="{28A0092B-C50C-407E-A947-70E740481C1C}">
+                <a14:useLocalDpi xmlns:a14="http://schemas.microsoft.com/office/drawing/2010/main" val="0"/>
+              </a:ext>
+            </a:extLst>
+          </a:blip>
+          <a:stretch>
+            <a:fillRect/>
+          </a:stretch>
+        </p:blipFill>
+        <p:spPr>
+          <a:xfrm>
+            <a:off x="594956" y="3013355"/>
+            <a:ext cx="950045" cy="831289"/>
+          </a:xfrm>
+          <a:prstGeom prst="rect">
+            <a:avLst/>
+          </a:prstGeom>
+        </p:spPr>
+      </p:pic>
+      <p:grpSp>
+        <p:nvGrpSpPr>
+          <p:cNvPr id="3" name="Group 2">
+            <a:extLst>
+              <a:ext uri="{FF2B5EF4-FFF2-40B4-BE49-F238E27FC236}">
+                <a16:creationId xmlns:a16="http://schemas.microsoft.com/office/drawing/2014/main" id="{38FF7CB6-8F54-4EF5-B6D6-6427FB5BB7EC}"/>
+              </a:ext>
+            </a:extLst>
+          </p:cNvPr>
+          <p:cNvGrpSpPr/>
+          <p:nvPr/>
+        </p:nvGrpSpPr>
+        <p:grpSpPr>
+          <a:xfrm>
+            <a:off x="6229303" y="3013355"/>
+            <a:ext cx="713945" cy="1158240"/>
+            <a:chOff x="2989375" y="1463040"/>
+            <a:chExt cx="713945" cy="1158240"/>
+          </a:xfrm>
+        </p:grpSpPr>
+        <p:sp>
+          <p:nvSpPr>
+            <p:cNvPr id="4" name="Rectangle 3">
+              <a:extLst>
+                <a:ext uri="{FF2B5EF4-FFF2-40B4-BE49-F238E27FC236}">
+                  <a16:creationId xmlns:a16="http://schemas.microsoft.com/office/drawing/2014/main" id="{6C6915E0-6E84-42A1-8794-734AC1764BC6}"/>
+                </a:ext>
+              </a:extLst>
+            </p:cNvPr>
+            <p:cNvSpPr/>
+            <p:nvPr/>
+          </p:nvSpPr>
+          <p:spPr>
+            <a:xfrm>
+              <a:off x="3038168" y="1463040"/>
+              <a:ext cx="611812" cy="424754"/>
+            </a:xfrm>
+            <a:prstGeom prst="rect">
+              <a:avLst/>
+            </a:prstGeom>
+            <a:solidFill>
+              <a:schemeClr val="bg1"/>
+            </a:solidFill>
+            <a:ln w="28575">
+              <a:solidFill>
+                <a:schemeClr val="tx1">
+                  <a:lumMod val="95000"/>
+                  <a:lumOff val="5000"/>
+                </a:schemeClr>
+              </a:solidFill>
+            </a:ln>
+          </p:spPr>
+          <p:style>
+            <a:lnRef idx="2">
+              <a:schemeClr val="accent1">
+                <a:shade val="50000"/>
+              </a:schemeClr>
+            </a:lnRef>
+            <a:fillRef idx="1">
+              <a:schemeClr val="accent1"/>
+            </a:fillRef>
+            <a:effectRef idx="0">
+              <a:schemeClr val="accent1"/>
+            </a:effectRef>
+            <a:fontRef idx="minor">
+              <a:schemeClr val="lt1"/>
+            </a:fontRef>
+          </p:style>
+          <p:txBody>
+            <a:bodyPr rtlCol="0" anchor="ctr"/>
+            <a:lstStyle/>
+            <a:p>
+              <a:pPr algn="ctr"/>
+              <a:endParaRPr lang="en-US"/>
+            </a:p>
+          </p:txBody>
+        </p:sp>
+        <p:grpSp>
+          <p:nvGrpSpPr>
+            <p:cNvPr id="5" name="Group 4">
+              <a:extLst>
+                <a:ext uri="{FF2B5EF4-FFF2-40B4-BE49-F238E27FC236}">
+                  <a16:creationId xmlns:a16="http://schemas.microsoft.com/office/drawing/2014/main" id="{21219DBE-B807-45C3-9105-58147A7BC8DF}"/>
+                </a:ext>
+              </a:extLst>
+            </p:cNvPr>
+            <p:cNvGrpSpPr/>
+            <p:nvPr/>
+          </p:nvGrpSpPr>
+          <p:grpSpPr>
+            <a:xfrm>
+              <a:off x="3147921" y="1536948"/>
+              <a:ext cx="392306" cy="138960"/>
+              <a:chOff x="3163529" y="1537440"/>
+              <a:chExt cx="392306" cy="138960"/>
+            </a:xfrm>
+          </p:grpSpPr>
+          <p:sp>
+            <p:nvSpPr>
+              <p:cNvPr id="14" name="Oval 13">
+                <a:extLst>
+                  <a:ext uri="{FF2B5EF4-FFF2-40B4-BE49-F238E27FC236}">
+                    <a16:creationId xmlns:a16="http://schemas.microsoft.com/office/drawing/2014/main" id="{1B46755F-E50A-43FD-AAAD-EA3E3834B8E0}"/>
+                  </a:ext>
+                </a:extLst>
+              </p:cNvPr>
+              <p:cNvSpPr/>
+              <p:nvPr/>
+            </p:nvSpPr>
+            <p:spPr>
+              <a:xfrm>
+                <a:off x="3163529" y="1537441"/>
+                <a:ext cx="128311" cy="138959"/>
+              </a:xfrm>
+              <a:prstGeom prst="ellipse">
+                <a:avLst/>
+              </a:prstGeom>
+              <a:solidFill>
+                <a:schemeClr val="bg1"/>
+              </a:solidFill>
+              <a:ln w="28575">
+                <a:solidFill>
+                  <a:schemeClr val="tx1">
+                    <a:lumMod val="95000"/>
+                    <a:lumOff val="5000"/>
+                  </a:schemeClr>
+                </a:solidFill>
+              </a:ln>
+            </p:spPr>
+            <p:style>
+              <a:lnRef idx="2">
+                <a:schemeClr val="accent1">
+                  <a:shade val="50000"/>
+                </a:schemeClr>
+              </a:lnRef>
+              <a:fillRef idx="1">
+                <a:schemeClr val="accent1"/>
+              </a:fillRef>
+              <a:effectRef idx="0">
+                <a:schemeClr val="accent1"/>
+              </a:effectRef>
+              <a:fontRef idx="minor">
+                <a:schemeClr val="lt1"/>
+              </a:fontRef>
+            </p:style>
+            <p:txBody>
+              <a:bodyPr rot="0" spcFirstLastPara="0" vertOverflow="overflow" horzOverflow="overflow" vert="horz" wrap="square" lIns="91440" tIns="45720" rIns="91440" bIns="45720" numCol="1" spcCol="0" rtlCol="0" fromWordArt="0" anchor="ctr" anchorCtr="0" forceAA="0" compatLnSpc="1">
+                <a:prstTxWarp prst="textNoShape">
+                  <a:avLst/>
+                </a:prstTxWarp>
+                <a:noAutofit/>
+              </a:bodyPr>
+              <a:lstStyle/>
+              <a:p>
+                <a:pPr algn="ctr"/>
+                <a:endParaRPr lang="en-US"/>
+              </a:p>
+            </p:txBody>
+          </p:sp>
+          <p:sp>
+            <p:nvSpPr>
+              <p:cNvPr id="15" name="Oval 14">
+                <a:extLst>
+                  <a:ext uri="{FF2B5EF4-FFF2-40B4-BE49-F238E27FC236}">
+                    <a16:creationId xmlns:a16="http://schemas.microsoft.com/office/drawing/2014/main" id="{D96A4824-0261-4966-A34D-C696589939C4}"/>
+                  </a:ext>
+                </a:extLst>
+              </p:cNvPr>
+              <p:cNvSpPr/>
+              <p:nvPr/>
+            </p:nvSpPr>
+            <p:spPr>
+              <a:xfrm>
+                <a:off x="3427524" y="1537440"/>
+                <a:ext cx="128311" cy="138959"/>
+              </a:xfrm>
+              <a:prstGeom prst="ellipse">
+                <a:avLst/>
+              </a:prstGeom>
+              <a:solidFill>
+                <a:schemeClr val="bg1"/>
+              </a:solidFill>
+              <a:ln w="28575">
+                <a:solidFill>
+                  <a:schemeClr val="tx1">
+                    <a:lumMod val="95000"/>
+                    <a:lumOff val="5000"/>
+                  </a:schemeClr>
+                </a:solidFill>
+              </a:ln>
+            </p:spPr>
+            <p:style>
+              <a:lnRef idx="2">
+                <a:schemeClr val="accent1">
+                  <a:shade val="50000"/>
+                </a:schemeClr>
+              </a:lnRef>
+              <a:fillRef idx="1">
+                <a:schemeClr val="accent1"/>
+              </a:fillRef>
+              <a:effectRef idx="0">
+                <a:schemeClr val="accent1"/>
+              </a:effectRef>
+              <a:fontRef idx="minor">
+                <a:schemeClr val="lt1"/>
+              </a:fontRef>
+            </p:style>
+            <p:txBody>
+              <a:bodyPr rot="0" spcFirstLastPara="0" vertOverflow="overflow" horzOverflow="overflow" vert="horz" wrap="square" lIns="91440" tIns="45720" rIns="91440" bIns="45720" numCol="1" spcCol="0" rtlCol="0" fromWordArt="0" anchor="ctr" anchorCtr="0" forceAA="0" compatLnSpc="1">
+                <a:prstTxWarp prst="textNoShape">
+                  <a:avLst/>
+                </a:prstTxWarp>
+                <a:noAutofit/>
+              </a:bodyPr>
+              <a:lstStyle/>
+              <a:p>
+                <a:pPr algn="ctr"/>
+                <a:endParaRPr lang="en-US"/>
+              </a:p>
+            </p:txBody>
+          </p:sp>
+        </p:grpSp>
+        <p:cxnSp>
+          <p:nvCxnSpPr>
+            <p:cNvPr id="6" name="Straight Connector 5">
+              <a:extLst>
+                <a:ext uri="{FF2B5EF4-FFF2-40B4-BE49-F238E27FC236}">
+                  <a16:creationId xmlns:a16="http://schemas.microsoft.com/office/drawing/2014/main" id="{3882C31C-6A91-46DC-8EC4-AE32633661DB}"/>
+                </a:ext>
+              </a:extLst>
+            </p:cNvPr>
+            <p:cNvCxnSpPr/>
+            <p:nvPr/>
+          </p:nvCxnSpPr>
+          <p:spPr>
+            <a:xfrm>
+              <a:off x="3212077" y="1771902"/>
+              <a:ext cx="263995" cy="0"/>
+            </a:xfrm>
+            <a:prstGeom prst="line">
+              <a:avLst/>
+            </a:prstGeom>
+            <a:solidFill>
+              <a:schemeClr val="bg1"/>
+            </a:solidFill>
+            <a:ln w="28575">
+              <a:solidFill>
+                <a:schemeClr val="tx1">
+                  <a:lumMod val="95000"/>
+                  <a:lumOff val="5000"/>
+                </a:schemeClr>
+              </a:solidFill>
+            </a:ln>
+          </p:spPr>
+          <p:style>
+            <a:lnRef idx="2">
+              <a:schemeClr val="accent1">
+                <a:shade val="50000"/>
+              </a:schemeClr>
+            </a:lnRef>
+            <a:fillRef idx="1">
+              <a:schemeClr val="accent1"/>
+            </a:fillRef>
+            <a:effectRef idx="0">
+              <a:schemeClr val="accent1"/>
+            </a:effectRef>
+            <a:fontRef idx="minor">
+              <a:schemeClr val="lt1"/>
+            </a:fontRef>
+          </p:style>
+        </p:cxnSp>
+        <p:sp>
+          <p:nvSpPr>
+            <p:cNvPr id="7" name="Rectangle 6">
+              <a:extLst>
+                <a:ext uri="{FF2B5EF4-FFF2-40B4-BE49-F238E27FC236}">
+                  <a16:creationId xmlns:a16="http://schemas.microsoft.com/office/drawing/2014/main" id="{DAD968EC-3D37-4640-9ED6-4C5629F05C01}"/>
+                </a:ext>
+              </a:extLst>
+            </p:cNvPr>
+            <p:cNvSpPr/>
+            <p:nvPr/>
+          </p:nvSpPr>
+          <p:spPr>
+            <a:xfrm>
+              <a:off x="3654527" y="1536949"/>
+              <a:ext cx="48793" cy="138959"/>
+            </a:xfrm>
+            <a:prstGeom prst="rect">
+              <a:avLst/>
+            </a:prstGeom>
+            <a:solidFill>
+              <a:schemeClr val="bg1"/>
+            </a:solidFill>
+            <a:ln w="28575">
+              <a:solidFill>
+                <a:schemeClr val="tx1">
+                  <a:lumMod val="95000"/>
+                  <a:lumOff val="5000"/>
+                </a:schemeClr>
+              </a:solidFill>
+            </a:ln>
+          </p:spPr>
+          <p:style>
+            <a:lnRef idx="2">
+              <a:schemeClr val="accent1">
+                <a:shade val="50000"/>
+              </a:schemeClr>
+            </a:lnRef>
+            <a:fillRef idx="1">
+              <a:schemeClr val="accent1"/>
+            </a:fillRef>
+            <a:effectRef idx="0">
+              <a:schemeClr val="accent1"/>
+            </a:effectRef>
+            <a:fontRef idx="minor">
+              <a:schemeClr val="lt1"/>
+            </a:fontRef>
+          </p:style>
+          <p:txBody>
+            <a:bodyPr rot="0" spcFirstLastPara="0" vertOverflow="overflow" horzOverflow="overflow" vert="horz" wrap="square" lIns="91440" tIns="45720" rIns="91440" bIns="45720" numCol="1" spcCol="0" rtlCol="0" fromWordArt="0" anchor="ctr" anchorCtr="0" forceAA="0" compatLnSpc="1">
+              <a:prstTxWarp prst="textNoShape">
+                <a:avLst/>
+              </a:prstTxWarp>
+              <a:noAutofit/>
+            </a:bodyPr>
+            <a:lstStyle/>
+            <a:p>
+              <a:pPr algn="ctr"/>
+              <a:endParaRPr lang="en-US"/>
+            </a:p>
+          </p:txBody>
+        </p:sp>
+        <p:sp>
+          <p:nvSpPr>
+            <p:cNvPr id="8" name="Rectangle 7">
+              <a:extLst>
+                <a:ext uri="{FF2B5EF4-FFF2-40B4-BE49-F238E27FC236}">
+                  <a16:creationId xmlns:a16="http://schemas.microsoft.com/office/drawing/2014/main" id="{B2D01043-7B73-4DD3-A49F-B434B0BE67F9}"/>
+                </a:ext>
+              </a:extLst>
+            </p:cNvPr>
+            <p:cNvSpPr/>
+            <p:nvPr/>
+          </p:nvSpPr>
+          <p:spPr>
+            <a:xfrm>
+              <a:off x="2989375" y="1536949"/>
+              <a:ext cx="48793" cy="138959"/>
+            </a:xfrm>
+            <a:prstGeom prst="rect">
+              <a:avLst/>
+            </a:prstGeom>
+            <a:solidFill>
+              <a:schemeClr val="bg1"/>
+            </a:solidFill>
+            <a:ln w="28575">
+              <a:solidFill>
+                <a:schemeClr val="tx1">
+                  <a:lumMod val="95000"/>
+                  <a:lumOff val="5000"/>
+                </a:schemeClr>
+              </a:solidFill>
+            </a:ln>
+          </p:spPr>
+          <p:style>
+            <a:lnRef idx="2">
+              <a:schemeClr val="accent1">
+                <a:shade val="50000"/>
+              </a:schemeClr>
+            </a:lnRef>
+            <a:fillRef idx="1">
+              <a:schemeClr val="accent1"/>
+            </a:fillRef>
+            <a:effectRef idx="0">
+              <a:schemeClr val="accent1"/>
+            </a:effectRef>
+            <a:fontRef idx="minor">
+              <a:schemeClr val="lt1"/>
+            </a:fontRef>
+          </p:style>
+          <p:txBody>
+            <a:bodyPr rot="0" spcFirstLastPara="0" vertOverflow="overflow" horzOverflow="overflow" vert="horz" wrap="square" lIns="91440" tIns="45720" rIns="91440" bIns="45720" numCol="1" spcCol="0" rtlCol="0" fromWordArt="0" anchor="ctr" anchorCtr="0" forceAA="0" compatLnSpc="1">
+              <a:prstTxWarp prst="textNoShape">
+                <a:avLst/>
+              </a:prstTxWarp>
+              <a:noAutofit/>
+            </a:bodyPr>
+            <a:lstStyle/>
+            <a:p>
+              <a:pPr algn="ctr"/>
+              <a:endParaRPr lang="en-US"/>
+            </a:p>
+          </p:txBody>
+        </p:sp>
+        <p:sp>
+          <p:nvSpPr>
+            <p:cNvPr id="9" name="Rectangle 8">
+              <a:extLst>
+                <a:ext uri="{FF2B5EF4-FFF2-40B4-BE49-F238E27FC236}">
+                  <a16:creationId xmlns:a16="http://schemas.microsoft.com/office/drawing/2014/main" id="{E1D5879E-53B7-4BC9-9C50-46AD1B83EFDF}"/>
+                </a:ext>
+              </a:extLst>
+            </p:cNvPr>
+            <p:cNvSpPr/>
+            <p:nvPr/>
+          </p:nvSpPr>
+          <p:spPr>
+            <a:xfrm>
+              <a:off x="2989375" y="1936951"/>
+              <a:ext cx="713945" cy="424754"/>
+            </a:xfrm>
+            <a:prstGeom prst="rect">
+              <a:avLst/>
+            </a:prstGeom>
+            <a:solidFill>
+              <a:schemeClr val="bg1"/>
+            </a:solidFill>
+            <a:ln w="28575">
+              <a:solidFill>
+                <a:schemeClr val="tx1">
+                  <a:lumMod val="95000"/>
+                  <a:lumOff val="5000"/>
+                </a:schemeClr>
+              </a:solidFill>
+            </a:ln>
+          </p:spPr>
+          <p:style>
+            <a:lnRef idx="2">
+              <a:schemeClr val="accent1">
+                <a:shade val="50000"/>
+              </a:schemeClr>
+            </a:lnRef>
+            <a:fillRef idx="1">
+              <a:schemeClr val="accent1"/>
+            </a:fillRef>
+            <a:effectRef idx="0">
+              <a:schemeClr val="accent1"/>
+            </a:effectRef>
+            <a:fontRef idx="minor">
+              <a:schemeClr val="lt1"/>
+            </a:fontRef>
+          </p:style>
+          <p:txBody>
+            <a:bodyPr rot="0" spcFirstLastPara="0" vertOverflow="overflow" horzOverflow="overflow" vert="horz" wrap="square" lIns="91440" tIns="45720" rIns="91440" bIns="45720" numCol="1" spcCol="0" rtlCol="0" fromWordArt="0" anchor="ctr" anchorCtr="0" forceAA="0" compatLnSpc="1">
+              <a:prstTxWarp prst="textNoShape">
+                <a:avLst/>
+              </a:prstTxWarp>
+              <a:noAutofit/>
+            </a:bodyPr>
+            <a:lstStyle/>
+            <a:p>
+              <a:pPr algn="ctr"/>
+              <a:endParaRPr lang="en-US"/>
+            </a:p>
+          </p:txBody>
+        </p:sp>
+        <p:sp>
+          <p:nvSpPr>
+            <p:cNvPr id="10" name="Rectangle 9">
+              <a:extLst>
+                <a:ext uri="{FF2B5EF4-FFF2-40B4-BE49-F238E27FC236}">
+                  <a16:creationId xmlns:a16="http://schemas.microsoft.com/office/drawing/2014/main" id="{C60B1414-05A6-478B-B82B-DF1B9405AAFC}"/>
+                </a:ext>
+              </a:extLst>
+            </p:cNvPr>
+            <p:cNvSpPr/>
+            <p:nvPr/>
+          </p:nvSpPr>
+          <p:spPr>
+            <a:xfrm>
+              <a:off x="3007519" y="2193576"/>
+              <a:ext cx="673893" cy="427704"/>
+            </a:xfrm>
+            <a:prstGeom prst="rect">
+              <a:avLst/>
+            </a:prstGeom>
+            <a:solidFill>
+              <a:schemeClr val="bg1"/>
+            </a:solidFill>
+            <a:ln>
+              <a:solidFill>
+                <a:schemeClr val="bg1"/>
+              </a:solidFill>
+            </a:ln>
+          </p:spPr>
+          <p:style>
+            <a:lnRef idx="2">
+              <a:schemeClr val="accent1">
+                <a:shade val="50000"/>
+              </a:schemeClr>
+            </a:lnRef>
+            <a:fillRef idx="1">
+              <a:schemeClr val="accent1"/>
+            </a:fillRef>
+            <a:effectRef idx="0">
+              <a:schemeClr val="accent1"/>
+            </a:effectRef>
+            <a:fontRef idx="minor">
+              <a:schemeClr val="lt1"/>
+            </a:fontRef>
+          </p:style>
+          <p:txBody>
+            <a:bodyPr rtlCol="0" anchor="ctr"/>
+            <a:lstStyle/>
+            <a:p>
+              <a:pPr algn="ctr"/>
+              <a:endParaRPr lang="en-US"/>
+            </a:p>
+          </p:txBody>
+        </p:sp>
+        <p:cxnSp>
+          <p:nvCxnSpPr>
+            <p:cNvPr id="11" name="Straight Connector 10">
+              <a:extLst>
+                <a:ext uri="{FF2B5EF4-FFF2-40B4-BE49-F238E27FC236}">
+                  <a16:creationId xmlns:a16="http://schemas.microsoft.com/office/drawing/2014/main" id="{97B9C70C-25C7-4149-A347-440BFCADD09D}"/>
+                </a:ext>
+              </a:extLst>
+            </p:cNvPr>
+            <p:cNvCxnSpPr/>
+            <p:nvPr/>
+          </p:nvCxnSpPr>
+          <p:spPr>
+            <a:xfrm>
+              <a:off x="3212077" y="2051251"/>
+              <a:ext cx="0" cy="183657"/>
+            </a:xfrm>
+            <a:prstGeom prst="line">
+              <a:avLst/>
+            </a:prstGeom>
+            <a:ln>
+              <a:solidFill>
+                <a:schemeClr val="tx1">
+                  <a:lumMod val="95000"/>
+                  <a:lumOff val="5000"/>
+                </a:schemeClr>
+              </a:solidFill>
+            </a:ln>
+          </p:spPr>
+          <p:style>
+            <a:lnRef idx="1">
+              <a:schemeClr val="accent1"/>
+            </a:lnRef>
+            <a:fillRef idx="0">
+              <a:schemeClr val="accent1"/>
+            </a:fillRef>
+            <a:effectRef idx="0">
+              <a:schemeClr val="accent1"/>
+            </a:effectRef>
+            <a:fontRef idx="minor">
+              <a:schemeClr val="tx1"/>
+            </a:fontRef>
+          </p:style>
+        </p:cxnSp>
+        <p:cxnSp>
+          <p:nvCxnSpPr>
+            <p:cNvPr id="12" name="Straight Connector 11">
+              <a:extLst>
+                <a:ext uri="{FF2B5EF4-FFF2-40B4-BE49-F238E27FC236}">
+                  <a16:creationId xmlns:a16="http://schemas.microsoft.com/office/drawing/2014/main" id="{8C7108A7-3502-4A1E-B8EE-784CBBBD8D19}"/>
+                </a:ext>
+              </a:extLst>
+            </p:cNvPr>
+            <p:cNvCxnSpPr/>
+            <p:nvPr/>
+          </p:nvCxnSpPr>
+          <p:spPr>
+            <a:xfrm>
+              <a:off x="3339077" y="2051251"/>
+              <a:ext cx="0" cy="183657"/>
+            </a:xfrm>
+            <a:prstGeom prst="line">
+              <a:avLst/>
+            </a:prstGeom>
+            <a:ln>
+              <a:solidFill>
+                <a:schemeClr val="tx1">
+                  <a:lumMod val="95000"/>
+                  <a:lumOff val="5000"/>
+                </a:schemeClr>
+              </a:solidFill>
+            </a:ln>
+          </p:spPr>
+          <p:style>
+            <a:lnRef idx="1">
+              <a:schemeClr val="accent1"/>
+            </a:lnRef>
+            <a:fillRef idx="0">
+              <a:schemeClr val="accent1"/>
+            </a:fillRef>
+            <a:effectRef idx="0">
+              <a:schemeClr val="accent1"/>
+            </a:effectRef>
+            <a:fontRef idx="minor">
+              <a:schemeClr val="tx1"/>
+            </a:fontRef>
+          </p:style>
+        </p:cxnSp>
+        <p:cxnSp>
+          <p:nvCxnSpPr>
+            <p:cNvPr id="13" name="Straight Connector 12">
+              <a:extLst>
+                <a:ext uri="{FF2B5EF4-FFF2-40B4-BE49-F238E27FC236}">
+                  <a16:creationId xmlns:a16="http://schemas.microsoft.com/office/drawing/2014/main" id="{609FD3F4-74B2-420B-A091-CA0971213C28}"/>
+                </a:ext>
+              </a:extLst>
+            </p:cNvPr>
+            <p:cNvCxnSpPr/>
+            <p:nvPr/>
+          </p:nvCxnSpPr>
+          <p:spPr>
+            <a:xfrm>
+              <a:off x="3462349" y="2051251"/>
+              <a:ext cx="0" cy="183657"/>
+            </a:xfrm>
+            <a:prstGeom prst="line">
+              <a:avLst/>
+            </a:prstGeom>
+            <a:ln>
+              <a:solidFill>
+                <a:schemeClr val="tx1">
+                  <a:lumMod val="95000"/>
+                  <a:lumOff val="5000"/>
+                </a:schemeClr>
+              </a:solidFill>
+            </a:ln>
+          </p:spPr>
+          <p:style>
+            <a:lnRef idx="1">
+              <a:schemeClr val="accent1"/>
+            </a:lnRef>
+            <a:fillRef idx="0">
+              <a:schemeClr val="accent1"/>
+            </a:fillRef>
+            <a:effectRef idx="0">
+              <a:schemeClr val="accent1"/>
+            </a:effectRef>
+            <a:fontRef idx="minor">
+              <a:schemeClr val="tx1"/>
+            </a:fontRef>
+          </p:style>
+        </p:cxnSp>
+      </p:grpSp>
+      <p:sp>
+        <p:nvSpPr>
+          <p:cNvPr id="16" name="Arrow: Down 15">
+            <a:extLst>
+              <a:ext uri="{FF2B5EF4-FFF2-40B4-BE49-F238E27FC236}">
+                <a16:creationId xmlns:a16="http://schemas.microsoft.com/office/drawing/2014/main" id="{E87DAEA1-0CE1-4999-B886-792AC781945A}"/>
+              </a:ext>
+            </a:extLst>
+          </p:cNvPr>
+          <p:cNvSpPr/>
+          <p:nvPr/>
+        </p:nvSpPr>
+        <p:spPr>
+          <a:xfrm rot="16200000">
+            <a:off x="2358756" y="2464516"/>
+            <a:ext cx="241789" cy="1541893"/>
+          </a:xfrm>
+          <a:prstGeom prst="downArrow">
+            <a:avLst/>
+          </a:prstGeom>
+          <a:solidFill>
+            <a:schemeClr val="tx1">
+              <a:lumMod val="95000"/>
+              <a:lumOff val="5000"/>
+            </a:schemeClr>
+          </a:solidFill>
+          <a:ln>
+            <a:solidFill>
+              <a:schemeClr val="tx1">
+                <a:lumMod val="95000"/>
+                <a:lumOff val="5000"/>
+              </a:schemeClr>
+            </a:solidFill>
+          </a:ln>
+        </p:spPr>
+        <p:style>
+          <a:lnRef idx="2">
+            <a:schemeClr val="accent1">
+              <a:shade val="50000"/>
+            </a:schemeClr>
+          </a:lnRef>
+          <a:fillRef idx="1">
+            <a:schemeClr val="accent1"/>
+          </a:fillRef>
+          <a:effectRef idx="0">
+            <a:schemeClr val="accent1"/>
+          </a:effectRef>
+          <a:fontRef idx="minor">
+            <a:schemeClr val="lt1"/>
+          </a:fontRef>
+        </p:style>
+        <p:txBody>
+          <a:bodyPr rtlCol="0" anchor="ctr"/>
+          <a:lstStyle/>
+          <a:p>
+            <a:pPr algn="ctr"/>
+            <a:endParaRPr lang="en-US"/>
+          </a:p>
+        </p:txBody>
+      </p:sp>
+      <p:pic>
+        <p:nvPicPr>
+          <p:cNvPr id="18" name="Picture 17" descr="A close up of a logo&#10;&#10;Description automatically generated">
+            <a:extLst>
+              <a:ext uri="{FF2B5EF4-FFF2-40B4-BE49-F238E27FC236}">
+                <a16:creationId xmlns:a16="http://schemas.microsoft.com/office/drawing/2014/main" id="{C28D1C4A-2579-4D79-83D2-05C4192DDBA9}"/>
+              </a:ext>
+            </a:extLst>
+          </p:cNvPr>
+          <p:cNvPicPr>
+            <a:picLocks noChangeAspect="1"/>
+          </p:cNvPicPr>
+          <p:nvPr/>
+        </p:nvPicPr>
+        <p:blipFill>
+          <a:blip r:embed="rId3">
+            <a:extLst>
+              <a:ext uri="{28A0092B-C50C-407E-A947-70E740481C1C}">
+                <a14:useLocalDpi xmlns:a14="http://schemas.microsoft.com/office/drawing/2010/main" val="0"/>
+              </a:ext>
+            </a:extLst>
+          </a:blip>
+          <a:stretch>
+            <a:fillRect/>
+          </a:stretch>
+        </p:blipFill>
+        <p:spPr>
+          <a:xfrm>
+            <a:off x="3386279" y="2974867"/>
+            <a:ext cx="854180" cy="854180"/>
+          </a:xfrm>
+          <a:prstGeom prst="rect">
+            <a:avLst/>
+          </a:prstGeom>
+        </p:spPr>
+      </p:pic>
+      <p:sp>
+        <p:nvSpPr>
+          <p:cNvPr id="19" name="Arrow: Down 18">
+            <a:extLst>
+              <a:ext uri="{FF2B5EF4-FFF2-40B4-BE49-F238E27FC236}">
+                <a16:creationId xmlns:a16="http://schemas.microsoft.com/office/drawing/2014/main" id="{A6E80C99-C10C-4C52-BF09-DD965D2E3370}"/>
+              </a:ext>
+            </a:extLst>
+          </p:cNvPr>
+          <p:cNvSpPr/>
+          <p:nvPr/>
+        </p:nvSpPr>
+        <p:spPr>
+          <a:xfrm rot="5400000">
+            <a:off x="2344745" y="2806862"/>
+            <a:ext cx="241789" cy="1541893"/>
+          </a:xfrm>
+          <a:prstGeom prst="downArrow">
+            <a:avLst/>
+          </a:prstGeom>
+          <a:solidFill>
+            <a:schemeClr val="tx1">
+              <a:lumMod val="95000"/>
+              <a:lumOff val="5000"/>
+            </a:schemeClr>
+          </a:solidFill>
+          <a:ln>
+            <a:solidFill>
+              <a:schemeClr val="tx1">
+                <a:lumMod val="95000"/>
+                <a:lumOff val="5000"/>
+              </a:schemeClr>
+            </a:solidFill>
+          </a:ln>
+        </p:spPr>
+        <p:style>
+          <a:lnRef idx="2">
+            <a:schemeClr val="accent1">
+              <a:shade val="50000"/>
+            </a:schemeClr>
+          </a:lnRef>
+          <a:fillRef idx="1">
+            <a:schemeClr val="accent1"/>
+          </a:fillRef>
+          <a:effectRef idx="0">
+            <a:schemeClr val="accent1"/>
+          </a:effectRef>
+          <a:fontRef idx="minor">
+            <a:schemeClr val="lt1"/>
+          </a:fontRef>
+        </p:style>
+        <p:txBody>
+          <a:bodyPr rtlCol="0" anchor="ctr"/>
+          <a:lstStyle/>
+          <a:p>
+            <a:pPr algn="ctr"/>
+            <a:endParaRPr lang="en-US"/>
+          </a:p>
+        </p:txBody>
+      </p:sp>
+      <p:sp>
+        <p:nvSpPr>
+          <p:cNvPr id="20" name="Arrow: Down 19">
+            <a:extLst>
+              <a:ext uri="{FF2B5EF4-FFF2-40B4-BE49-F238E27FC236}">
+                <a16:creationId xmlns:a16="http://schemas.microsoft.com/office/drawing/2014/main" id="{A13DFD56-78DC-4F80-9E38-096DAAE1A881}"/>
+              </a:ext>
+            </a:extLst>
+          </p:cNvPr>
+          <p:cNvSpPr/>
+          <p:nvPr/>
+        </p:nvSpPr>
+        <p:spPr>
+          <a:xfrm rot="16200000">
+            <a:off x="5054215" y="2468979"/>
+            <a:ext cx="241789" cy="1541893"/>
+          </a:xfrm>
+          <a:prstGeom prst="downArrow">
+            <a:avLst/>
+          </a:prstGeom>
+          <a:solidFill>
+            <a:schemeClr val="tx1">
+              <a:lumMod val="95000"/>
+              <a:lumOff val="5000"/>
+            </a:schemeClr>
+          </a:solidFill>
+          <a:ln>
+            <a:solidFill>
+              <a:schemeClr val="tx1">
+                <a:lumMod val="95000"/>
+                <a:lumOff val="5000"/>
+              </a:schemeClr>
+            </a:solidFill>
+          </a:ln>
+        </p:spPr>
+        <p:style>
+          <a:lnRef idx="2">
+            <a:schemeClr val="accent1">
+              <a:shade val="50000"/>
+            </a:schemeClr>
+          </a:lnRef>
+          <a:fillRef idx="1">
+            <a:schemeClr val="accent1"/>
+          </a:fillRef>
+          <a:effectRef idx="0">
+            <a:schemeClr val="accent1"/>
+          </a:effectRef>
+          <a:fontRef idx="minor">
+            <a:schemeClr val="lt1"/>
+          </a:fontRef>
+        </p:style>
+        <p:txBody>
+          <a:bodyPr rtlCol="0" anchor="ctr"/>
+          <a:lstStyle/>
+          <a:p>
+            <a:pPr algn="ctr"/>
+            <a:endParaRPr lang="en-US"/>
+          </a:p>
+        </p:txBody>
+      </p:sp>
+      <p:sp>
+        <p:nvSpPr>
+          <p:cNvPr id="21" name="Arrow: Down 20">
+            <a:extLst>
+              <a:ext uri="{FF2B5EF4-FFF2-40B4-BE49-F238E27FC236}">
+                <a16:creationId xmlns:a16="http://schemas.microsoft.com/office/drawing/2014/main" id="{2F16405C-207B-4854-88F6-DFCE7CADAD72}"/>
+              </a:ext>
+            </a:extLst>
+          </p:cNvPr>
+          <p:cNvSpPr/>
+          <p:nvPr/>
+        </p:nvSpPr>
+        <p:spPr>
+          <a:xfrm rot="5400000">
+            <a:off x="5040204" y="2811325"/>
+            <a:ext cx="241789" cy="1541893"/>
+          </a:xfrm>
+          <a:prstGeom prst="downArrow">
+            <a:avLst/>
+          </a:prstGeom>
+          <a:solidFill>
+            <a:schemeClr val="tx1">
+              <a:lumMod val="95000"/>
+              <a:lumOff val="5000"/>
+            </a:schemeClr>
+          </a:solidFill>
+          <a:ln>
+            <a:solidFill>
+              <a:schemeClr val="tx1">
+                <a:lumMod val="95000"/>
+                <a:lumOff val="5000"/>
+              </a:schemeClr>
+            </a:solidFill>
+          </a:ln>
+        </p:spPr>
+        <p:style>
+          <a:lnRef idx="2">
+            <a:schemeClr val="accent1">
+              <a:shade val="50000"/>
+            </a:schemeClr>
+          </a:lnRef>
+          <a:fillRef idx="1">
+            <a:schemeClr val="accent1"/>
+          </a:fillRef>
+          <a:effectRef idx="0">
+            <a:schemeClr val="accent1"/>
+          </a:effectRef>
+          <a:fontRef idx="minor">
+            <a:schemeClr val="lt1"/>
+          </a:fontRef>
+        </p:style>
+        <p:txBody>
+          <a:bodyPr rtlCol="0" anchor="ctr"/>
+          <a:lstStyle/>
+          <a:p>
+            <a:pPr algn="ctr"/>
+            <a:endParaRPr lang="en-US"/>
+          </a:p>
+        </p:txBody>
+      </p:sp>
+      <p:sp>
+        <p:nvSpPr>
+          <p:cNvPr id="22" name="TextBox 21">
+            <a:extLst>
+              <a:ext uri="{FF2B5EF4-FFF2-40B4-BE49-F238E27FC236}">
+                <a16:creationId xmlns:a16="http://schemas.microsoft.com/office/drawing/2014/main" id="{94CC9E6E-5E8D-45A3-B5D4-67F5C4758498}"/>
+              </a:ext>
+            </a:extLst>
+          </p:cNvPr>
+          <p:cNvSpPr txBox="1"/>
+          <p:nvPr/>
+        </p:nvSpPr>
+        <p:spPr>
+          <a:xfrm>
+            <a:off x="1168400" y="2540000"/>
+            <a:ext cx="5411418" cy="307777"/>
+          </a:xfrm>
+          <a:prstGeom prst="rect">
+            <a:avLst/>
+          </a:prstGeom>
+          <a:noFill/>
+        </p:spPr>
+        <p:txBody>
+          <a:bodyPr wrap="none" rtlCol="0">
+            <a:spAutoFit/>
+          </a:bodyPr>
+          <a:lstStyle/>
+          <a:p>
+            <a:r>
+              <a:rPr lang="en-US" sz="1400" dirty="0"/>
+              <a:t>GET,POST,PUT, PATCH, DELETE, GET, PUT, PATCH, DELETE,OPTIONS,HEAD</a:t>
+            </a:r>
+          </a:p>
+        </p:txBody>
+      </p:sp>
+      <p:cxnSp>
+        <p:nvCxnSpPr>
+          <p:cNvPr id="24" name="Straight Connector 23">
+            <a:extLst>
+              <a:ext uri="{FF2B5EF4-FFF2-40B4-BE49-F238E27FC236}">
+                <a16:creationId xmlns:a16="http://schemas.microsoft.com/office/drawing/2014/main" id="{E2ECEC4B-586F-415F-96C8-B784CBAF042E}"/>
+              </a:ext>
+            </a:extLst>
+          </p:cNvPr>
+          <p:cNvCxnSpPr/>
+          <p:nvPr/>
+        </p:nvCxnSpPr>
+        <p:spPr>
+          <a:xfrm flipH="1">
+            <a:off x="2336800" y="2847777"/>
+            <a:ext cx="330200" cy="378445"/>
+          </a:xfrm>
+          <a:prstGeom prst="line">
+            <a:avLst/>
+          </a:prstGeom>
+          <a:ln>
+            <a:solidFill>
+              <a:schemeClr val="tx1">
+                <a:lumMod val="95000"/>
+                <a:lumOff val="5000"/>
+              </a:schemeClr>
+            </a:solidFill>
+          </a:ln>
+        </p:spPr>
+        <p:style>
+          <a:lnRef idx="1">
+            <a:schemeClr val="accent1"/>
+          </a:lnRef>
+          <a:fillRef idx="0">
+            <a:schemeClr val="accent1"/>
+          </a:fillRef>
+          <a:effectRef idx="0">
+            <a:schemeClr val="accent1"/>
+          </a:effectRef>
+          <a:fontRef idx="minor">
+            <a:schemeClr val="tx1"/>
+          </a:fontRef>
+        </p:style>
+      </p:cxnSp>
+    </p:spTree>
+    <p:extLst>
+      <p:ext uri="{BB962C8B-B14F-4D97-AF65-F5344CB8AC3E}">
+        <p14:creationId xmlns:p14="http://schemas.microsoft.com/office/powerpoint/2010/main" val="287815276"/>
+      </p:ext>
+    </p:extLst>
+  </p:cSld>
+  <p:clrMapOvr>
+    <a:masterClrMapping/>
+  </p:clrMapOvr>
+</p:sld>
+</file>
+
 <file path=ppt/slides/slide2.xml><?xml version="1.0" encoding="utf-8"?>
 <p:sld xmlns:a="http://schemas.openxmlformats.org/drawingml/2006/main" xmlns:r="http://schemas.openxmlformats.org/officeDocument/2006/relationships" xmlns:p="http://schemas.openxmlformats.org/presentationml/2006/main">
   <p:cSld>

</xml_diff>

<commit_message>
Update fig 10-6 to use open image for the map
</commit_message>
<xml_diff>
--- a/SWWOv3/media/ch3/Figures.pptx
+++ b/SWWOv3/media/ch3/Figures.pptx
@@ -19,8 +19,9 @@
     <p:sldId id="267" r:id="rId13"/>
     <p:sldId id="268" r:id="rId14"/>
     <p:sldId id="269" r:id="rId15"/>
-    <p:sldId id="270" r:id="rId16"/>
-    <p:sldId id="271" r:id="rId17"/>
+    <p:sldId id="272" r:id="rId16"/>
+    <p:sldId id="270" r:id="rId17"/>
+    <p:sldId id="271" r:id="rId18"/>
   </p:sldIdLst>
   <p:sldSz cx="12192000" cy="6858000"/>
   <p:notesSz cx="6858000" cy="9144000"/>
@@ -8332,6 +8333,895 @@
 </file>
 
 <file path=ppt/slides/slide15.xml><?xml version="1.0" encoding="utf-8"?>
+<p:sld xmlns:a="http://schemas.openxmlformats.org/drawingml/2006/main" xmlns:r="http://schemas.openxmlformats.org/officeDocument/2006/relationships" xmlns:p="http://schemas.openxmlformats.org/presentationml/2006/main">
+  <p:cSld>
+    <p:spTree>
+      <p:nvGrpSpPr>
+        <p:cNvPr id="1" name=""/>
+        <p:cNvGrpSpPr/>
+        <p:nvPr/>
+      </p:nvGrpSpPr>
+      <p:grpSpPr>
+        <a:xfrm>
+          <a:off x="0" y="0"/>
+          <a:ext cx="0" cy="0"/>
+          <a:chOff x="0" y="0"/>
+          <a:chExt cx="0" cy="0"/>
+        </a:xfrm>
+      </p:grpSpPr>
+      <p:sp>
+        <p:nvSpPr>
+          <p:cNvPr id="2" name="Flowchart: Magnetic Disk 1">
+            <a:extLst>
+              <a:ext uri="{FF2B5EF4-FFF2-40B4-BE49-F238E27FC236}">
+                <a16:creationId xmlns:a16="http://schemas.microsoft.com/office/drawing/2014/main" id="{A0E81E3D-26EF-4E88-A5B6-B73AF5082126}"/>
+              </a:ext>
+            </a:extLst>
+          </p:cNvPr>
+          <p:cNvSpPr/>
+          <p:nvPr/>
+        </p:nvSpPr>
+        <p:spPr>
+          <a:xfrm>
+            <a:off x="4164693" y="3181350"/>
+            <a:ext cx="3276600" cy="1543050"/>
+          </a:xfrm>
+          <a:prstGeom prst="flowChartMagneticDisk">
+            <a:avLst/>
+          </a:prstGeom>
+          <a:solidFill>
+            <a:schemeClr val="bg1">
+              <a:lumMod val="85000"/>
+            </a:schemeClr>
+          </a:solidFill>
+          <a:ln>
+            <a:solidFill>
+              <a:schemeClr val="tx1">
+                <a:lumMod val="95000"/>
+                <a:lumOff val="5000"/>
+              </a:schemeClr>
+            </a:solidFill>
+          </a:ln>
+        </p:spPr>
+        <p:style>
+          <a:lnRef idx="2">
+            <a:schemeClr val="accent1">
+              <a:shade val="50000"/>
+            </a:schemeClr>
+          </a:lnRef>
+          <a:fillRef idx="1">
+            <a:schemeClr val="accent1"/>
+          </a:fillRef>
+          <a:effectRef idx="0">
+            <a:schemeClr val="accent1"/>
+          </a:effectRef>
+          <a:fontRef idx="minor">
+            <a:schemeClr val="lt1"/>
+          </a:fontRef>
+        </p:style>
+        <p:txBody>
+          <a:bodyPr rtlCol="0" anchor="ctr"/>
+          <a:lstStyle/>
+          <a:p>
+            <a:pPr algn="ctr"/>
+            <a:r>
+              <a:rPr lang="en-US" sz="3200" dirty="0">
+                <a:solidFill>
+                  <a:schemeClr val="tx1"/>
+                </a:solidFill>
+              </a:rPr>
+              <a:t>Database</a:t>
+            </a:r>
+          </a:p>
+        </p:txBody>
+      </p:sp>
+      <p:sp>
+        <p:nvSpPr>
+          <p:cNvPr id="3" name="Flowchart: Magnetic Disk 2">
+            <a:extLst>
+              <a:ext uri="{FF2B5EF4-FFF2-40B4-BE49-F238E27FC236}">
+                <a16:creationId xmlns:a16="http://schemas.microsoft.com/office/drawing/2014/main" id="{862A6629-963C-46DF-B937-ED689D69A4D1}"/>
+              </a:ext>
+            </a:extLst>
+          </p:cNvPr>
+          <p:cNvSpPr/>
+          <p:nvPr/>
+        </p:nvSpPr>
+        <p:spPr>
+          <a:xfrm>
+            <a:off x="4164693" y="2257425"/>
+            <a:ext cx="3276600" cy="1543050"/>
+          </a:xfrm>
+          <a:prstGeom prst="flowChartMagneticDisk">
+            <a:avLst/>
+          </a:prstGeom>
+          <a:solidFill>
+            <a:schemeClr val="bg1">
+              <a:lumMod val="95000"/>
+            </a:schemeClr>
+          </a:solidFill>
+          <a:ln>
+            <a:solidFill>
+              <a:schemeClr val="tx1">
+                <a:lumMod val="95000"/>
+                <a:lumOff val="5000"/>
+              </a:schemeClr>
+            </a:solidFill>
+          </a:ln>
+        </p:spPr>
+        <p:style>
+          <a:lnRef idx="2">
+            <a:schemeClr val="accent1">
+              <a:shade val="50000"/>
+            </a:schemeClr>
+          </a:lnRef>
+          <a:fillRef idx="1">
+            <a:schemeClr val="accent1"/>
+          </a:fillRef>
+          <a:effectRef idx="0">
+            <a:schemeClr val="accent1"/>
+          </a:effectRef>
+          <a:fontRef idx="minor">
+            <a:schemeClr val="lt1"/>
+          </a:fontRef>
+        </p:style>
+        <p:txBody>
+          <a:bodyPr rtlCol="0" anchor="ctr"/>
+          <a:lstStyle/>
+          <a:p>
+            <a:pPr algn="ctr"/>
+            <a:r>
+              <a:rPr lang="en-US" sz="3200" dirty="0">
+                <a:solidFill>
+                  <a:schemeClr val="tx1"/>
+                </a:solidFill>
+              </a:rPr>
+              <a:t>Inference and Query Engine</a:t>
+            </a:r>
+          </a:p>
+        </p:txBody>
+      </p:sp>
+      <p:sp>
+        <p:nvSpPr>
+          <p:cNvPr id="4" name="Flowchart: Alternate Process 3">
+            <a:extLst>
+              <a:ext uri="{FF2B5EF4-FFF2-40B4-BE49-F238E27FC236}">
+                <a16:creationId xmlns:a16="http://schemas.microsoft.com/office/drawing/2014/main" id="{881347E5-35FA-490A-B394-EDE8259C4A38}"/>
+              </a:ext>
+            </a:extLst>
+          </p:cNvPr>
+          <p:cNvSpPr/>
+          <p:nvPr/>
+        </p:nvSpPr>
+        <p:spPr>
+          <a:xfrm>
+            <a:off x="4164693" y="1027176"/>
+            <a:ext cx="3276600" cy="612648"/>
+          </a:xfrm>
+          <a:prstGeom prst="flowChartAlternateProcess">
+            <a:avLst/>
+          </a:prstGeom>
+          <a:solidFill>
+            <a:schemeClr val="bg1">
+              <a:lumMod val="85000"/>
+            </a:schemeClr>
+          </a:solidFill>
+          <a:ln>
+            <a:solidFill>
+              <a:schemeClr val="tx1">
+                <a:lumMod val="95000"/>
+                <a:lumOff val="5000"/>
+              </a:schemeClr>
+            </a:solidFill>
+          </a:ln>
+        </p:spPr>
+        <p:style>
+          <a:lnRef idx="2">
+            <a:schemeClr val="accent1">
+              <a:shade val="50000"/>
+            </a:schemeClr>
+          </a:lnRef>
+          <a:fillRef idx="1">
+            <a:schemeClr val="accent1"/>
+          </a:fillRef>
+          <a:effectRef idx="0">
+            <a:schemeClr val="accent1"/>
+          </a:effectRef>
+          <a:fontRef idx="minor">
+            <a:schemeClr val="lt1"/>
+          </a:fontRef>
+        </p:style>
+        <p:txBody>
+          <a:bodyPr rot="0" spcFirstLastPara="0" vertOverflow="overflow" horzOverflow="overflow" vert="horz" wrap="square" lIns="91440" tIns="45720" rIns="91440" bIns="45720" numCol="1" spcCol="0" rtlCol="0" fromWordArt="0" anchor="ctr" anchorCtr="0" forceAA="0" compatLnSpc="1">
+            <a:prstTxWarp prst="textNoShape">
+              <a:avLst/>
+            </a:prstTxWarp>
+            <a:noAutofit/>
+          </a:bodyPr>
+          <a:lstStyle/>
+          <a:p>
+            <a:pPr algn="ctr"/>
+            <a:r>
+              <a:rPr lang="en-US" sz="3200" dirty="0">
+                <a:solidFill>
+                  <a:schemeClr val="tx1"/>
+                </a:solidFill>
+              </a:rPr>
+              <a:t>Application</a:t>
+            </a:r>
+          </a:p>
+        </p:txBody>
+      </p:sp>
+      <p:cxnSp>
+        <p:nvCxnSpPr>
+          <p:cNvPr id="6" name="Straight Arrow Connector 5">
+            <a:extLst>
+              <a:ext uri="{FF2B5EF4-FFF2-40B4-BE49-F238E27FC236}">
+                <a16:creationId xmlns:a16="http://schemas.microsoft.com/office/drawing/2014/main" id="{763153FF-FC1C-40D5-A53D-8A54060E6A13}"/>
+              </a:ext>
+            </a:extLst>
+          </p:cNvPr>
+          <p:cNvCxnSpPr>
+            <a:cxnSpLocks/>
+            <a:stCxn id="4" idx="2"/>
+          </p:cNvCxnSpPr>
+          <p:nvPr/>
+        </p:nvCxnSpPr>
+        <p:spPr>
+          <a:xfrm>
+            <a:off x="5802993" y="1639824"/>
+            <a:ext cx="0" cy="874776"/>
+          </a:xfrm>
+          <a:prstGeom prst="straightConnector1">
+            <a:avLst/>
+          </a:prstGeom>
+          <a:ln w="38100">
+            <a:solidFill>
+              <a:schemeClr val="tx1"/>
+            </a:solidFill>
+            <a:tailEnd type="triangle"/>
+          </a:ln>
+        </p:spPr>
+        <p:style>
+          <a:lnRef idx="1">
+            <a:schemeClr val="accent1"/>
+          </a:lnRef>
+          <a:fillRef idx="0">
+            <a:schemeClr val="accent1"/>
+          </a:fillRef>
+          <a:effectRef idx="0">
+            <a:schemeClr val="accent1"/>
+          </a:effectRef>
+          <a:fontRef idx="minor">
+            <a:schemeClr val="tx1"/>
+          </a:fontRef>
+        </p:style>
+      </p:cxnSp>
+      <p:cxnSp>
+        <p:nvCxnSpPr>
+          <p:cNvPr id="8" name="Straight Arrow Connector 7">
+            <a:extLst>
+              <a:ext uri="{FF2B5EF4-FFF2-40B4-BE49-F238E27FC236}">
+                <a16:creationId xmlns:a16="http://schemas.microsoft.com/office/drawing/2014/main" id="{10218C58-B37F-4145-A70F-F2047074D572}"/>
+              </a:ext>
+            </a:extLst>
+          </p:cNvPr>
+          <p:cNvCxnSpPr>
+            <a:cxnSpLocks/>
+          </p:cNvCxnSpPr>
+          <p:nvPr/>
+        </p:nvCxnSpPr>
+        <p:spPr>
+          <a:xfrm>
+            <a:off x="7441293" y="1181100"/>
+            <a:ext cx="1257302" cy="0"/>
+          </a:xfrm>
+          <a:prstGeom prst="straightConnector1">
+            <a:avLst/>
+          </a:prstGeom>
+          <a:ln w="38100">
+            <a:solidFill>
+              <a:schemeClr val="tx1"/>
+            </a:solidFill>
+            <a:tailEnd type="triangle"/>
+          </a:ln>
+        </p:spPr>
+        <p:style>
+          <a:lnRef idx="1">
+            <a:schemeClr val="accent1"/>
+          </a:lnRef>
+          <a:fillRef idx="0">
+            <a:schemeClr val="accent1"/>
+          </a:fillRef>
+          <a:effectRef idx="0">
+            <a:schemeClr val="accent1"/>
+          </a:effectRef>
+          <a:fontRef idx="minor">
+            <a:schemeClr val="tx1"/>
+          </a:fontRef>
+        </p:style>
+      </p:cxnSp>
+      <p:cxnSp>
+        <p:nvCxnSpPr>
+          <p:cNvPr id="11" name="Straight Arrow Connector 10">
+            <a:extLst>
+              <a:ext uri="{FF2B5EF4-FFF2-40B4-BE49-F238E27FC236}">
+                <a16:creationId xmlns:a16="http://schemas.microsoft.com/office/drawing/2014/main" id="{D8B6D4D9-4F3E-43F5-962D-9EEC56DF2FEC}"/>
+              </a:ext>
+            </a:extLst>
+          </p:cNvPr>
+          <p:cNvCxnSpPr>
+            <a:cxnSpLocks/>
+          </p:cNvCxnSpPr>
+          <p:nvPr/>
+        </p:nvCxnSpPr>
+        <p:spPr>
+          <a:xfrm>
+            <a:off x="7441292" y="1449614"/>
+            <a:ext cx="1257302" cy="0"/>
+          </a:xfrm>
+          <a:prstGeom prst="straightConnector1">
+            <a:avLst/>
+          </a:prstGeom>
+          <a:ln w="38100">
+            <a:solidFill>
+              <a:schemeClr val="tx1"/>
+            </a:solidFill>
+            <a:tailEnd type="triangle"/>
+          </a:ln>
+        </p:spPr>
+        <p:style>
+          <a:lnRef idx="1">
+            <a:schemeClr val="accent1"/>
+          </a:lnRef>
+          <a:fillRef idx="0">
+            <a:schemeClr val="accent1"/>
+          </a:fillRef>
+          <a:effectRef idx="0">
+            <a:schemeClr val="accent1"/>
+          </a:effectRef>
+          <a:fontRef idx="minor">
+            <a:schemeClr val="tx1"/>
+          </a:fontRef>
+        </p:style>
+      </p:cxnSp>
+      <p:sp>
+        <p:nvSpPr>
+          <p:cNvPr id="12" name="TextBox 11">
+            <a:extLst>
+              <a:ext uri="{FF2B5EF4-FFF2-40B4-BE49-F238E27FC236}">
+                <a16:creationId xmlns:a16="http://schemas.microsoft.com/office/drawing/2014/main" id="{DCBD7F31-2B51-437C-874E-8CAD05A735BF}"/>
+              </a:ext>
+            </a:extLst>
+          </p:cNvPr>
+          <p:cNvSpPr txBox="1"/>
+          <p:nvPr/>
+        </p:nvSpPr>
+        <p:spPr>
+          <a:xfrm>
+            <a:off x="8698594" y="920626"/>
+            <a:ext cx="1345112" cy="461665"/>
+          </a:xfrm>
+          <a:prstGeom prst="rect">
+            <a:avLst/>
+          </a:prstGeom>
+          <a:noFill/>
+        </p:spPr>
+        <p:txBody>
+          <a:bodyPr wrap="none" rtlCol="0">
+            <a:spAutoFit/>
+          </a:bodyPr>
+          <a:lstStyle/>
+          <a:p>
+            <a:r>
+              <a:rPr lang="en-US" sz="2400" b="1" dirty="0"/>
+              <a:t>Analytics</a:t>
+            </a:r>
+          </a:p>
+        </p:txBody>
+      </p:sp>
+      <p:sp>
+        <p:nvSpPr>
+          <p:cNvPr id="13" name="TextBox 12">
+            <a:extLst>
+              <a:ext uri="{FF2B5EF4-FFF2-40B4-BE49-F238E27FC236}">
+                <a16:creationId xmlns:a16="http://schemas.microsoft.com/office/drawing/2014/main" id="{07BA3BC4-5ACF-4352-B14B-A2C360682BDD}"/>
+              </a:ext>
+            </a:extLst>
+          </p:cNvPr>
+          <p:cNvSpPr txBox="1"/>
+          <p:nvPr/>
+        </p:nvSpPr>
+        <p:spPr>
+          <a:xfrm>
+            <a:off x="8698594" y="1225034"/>
+            <a:ext cx="1982851" cy="461665"/>
+          </a:xfrm>
+          <a:prstGeom prst="rect">
+            <a:avLst/>
+          </a:prstGeom>
+          <a:noFill/>
+        </p:spPr>
+        <p:txBody>
+          <a:bodyPr wrap="none" rtlCol="0">
+            <a:spAutoFit/>
+          </a:bodyPr>
+          <a:lstStyle/>
+          <a:p>
+            <a:r>
+              <a:rPr lang="en-US" sz="2400" b="1" dirty="0"/>
+              <a:t>User Interface</a:t>
+            </a:r>
+          </a:p>
+        </p:txBody>
+      </p:sp>
+      <p:sp>
+        <p:nvSpPr>
+          <p:cNvPr id="14" name="TextBox 13">
+            <a:extLst>
+              <a:ext uri="{FF2B5EF4-FFF2-40B4-BE49-F238E27FC236}">
+                <a16:creationId xmlns:a16="http://schemas.microsoft.com/office/drawing/2014/main" id="{03B06F43-C72C-4A13-939F-485E4A9879AA}"/>
+              </a:ext>
+            </a:extLst>
+          </p:cNvPr>
+          <p:cNvSpPr txBox="1"/>
+          <p:nvPr/>
+        </p:nvSpPr>
+        <p:spPr>
+          <a:xfrm>
+            <a:off x="8698593" y="1492970"/>
+            <a:ext cx="636713" cy="461665"/>
+          </a:xfrm>
+          <a:prstGeom prst="rect">
+            <a:avLst/>
+          </a:prstGeom>
+          <a:noFill/>
+        </p:spPr>
+        <p:txBody>
+          <a:bodyPr wrap="none" rtlCol="0">
+            <a:spAutoFit/>
+          </a:bodyPr>
+          <a:lstStyle/>
+          <a:p>
+            <a:r>
+              <a:rPr lang="en-US" sz="2400" b="1" dirty="0"/>
+              <a:t>. . . </a:t>
+            </a:r>
+          </a:p>
+        </p:txBody>
+      </p:sp>
+      <p:sp>
+        <p:nvSpPr>
+          <p:cNvPr id="5" name="Flowchart: Magnetic Disk 4">
+            <a:extLst>
+              <a:ext uri="{FF2B5EF4-FFF2-40B4-BE49-F238E27FC236}">
+                <a16:creationId xmlns:a16="http://schemas.microsoft.com/office/drawing/2014/main" id="{51E07BF6-F63F-4FCD-88CA-80C48A831CAB}"/>
+              </a:ext>
+            </a:extLst>
+          </p:cNvPr>
+          <p:cNvSpPr/>
+          <p:nvPr/>
+        </p:nvSpPr>
+        <p:spPr>
+          <a:xfrm>
+            <a:off x="1901372" y="3800475"/>
+            <a:ext cx="798286" cy="1156934"/>
+          </a:xfrm>
+          <a:prstGeom prst="flowChartMagneticDisk">
+            <a:avLst/>
+          </a:prstGeom>
+          <a:solidFill>
+            <a:schemeClr val="bg1">
+              <a:lumMod val="85000"/>
+            </a:schemeClr>
+          </a:solidFill>
+          <a:ln>
+            <a:solidFill>
+              <a:schemeClr val="tx1">
+                <a:lumMod val="95000"/>
+                <a:lumOff val="5000"/>
+              </a:schemeClr>
+            </a:solidFill>
+          </a:ln>
+        </p:spPr>
+        <p:style>
+          <a:lnRef idx="2">
+            <a:schemeClr val="accent1">
+              <a:shade val="50000"/>
+            </a:schemeClr>
+          </a:lnRef>
+          <a:fillRef idx="1">
+            <a:schemeClr val="accent1"/>
+          </a:fillRef>
+          <a:effectRef idx="0">
+            <a:schemeClr val="accent1"/>
+          </a:effectRef>
+          <a:fontRef idx="minor">
+            <a:schemeClr val="lt1"/>
+          </a:fontRef>
+        </p:style>
+        <p:txBody>
+          <a:bodyPr rot="0" spcFirstLastPara="0" vertOverflow="overflow" horzOverflow="overflow" vert="horz" wrap="square" lIns="91440" tIns="45720" rIns="91440" bIns="45720" numCol="1" spcCol="0" rtlCol="0" fromWordArt="0" anchor="ctr" anchorCtr="0" forceAA="0" compatLnSpc="1">
+            <a:prstTxWarp prst="textNoShape">
+              <a:avLst/>
+            </a:prstTxWarp>
+            <a:noAutofit/>
+          </a:bodyPr>
+          <a:lstStyle/>
+          <a:p>
+            <a:pPr algn="ctr"/>
+            <a:endParaRPr lang="en-US" sz="3200">
+              <a:solidFill>
+                <a:schemeClr val="tx1"/>
+              </a:solidFill>
+            </a:endParaRPr>
+          </a:p>
+        </p:txBody>
+      </p:sp>
+      <p:sp>
+        <p:nvSpPr>
+          <p:cNvPr id="15" name="Flowchart: Magnetic Disk 14">
+            <a:extLst>
+              <a:ext uri="{FF2B5EF4-FFF2-40B4-BE49-F238E27FC236}">
+                <a16:creationId xmlns:a16="http://schemas.microsoft.com/office/drawing/2014/main" id="{1981E880-8C1F-4F4D-9285-B06745AFB871}"/>
+              </a:ext>
+            </a:extLst>
+          </p:cNvPr>
+          <p:cNvSpPr/>
+          <p:nvPr/>
+        </p:nvSpPr>
+        <p:spPr>
+          <a:xfrm>
+            <a:off x="2300515" y="4185103"/>
+            <a:ext cx="798286" cy="1156934"/>
+          </a:xfrm>
+          <a:prstGeom prst="flowChartMagneticDisk">
+            <a:avLst/>
+          </a:prstGeom>
+          <a:solidFill>
+            <a:schemeClr val="bg1">
+              <a:lumMod val="85000"/>
+            </a:schemeClr>
+          </a:solidFill>
+          <a:ln>
+            <a:solidFill>
+              <a:schemeClr val="tx1">
+                <a:lumMod val="95000"/>
+                <a:lumOff val="5000"/>
+              </a:schemeClr>
+            </a:solidFill>
+          </a:ln>
+        </p:spPr>
+        <p:style>
+          <a:lnRef idx="2">
+            <a:schemeClr val="accent1">
+              <a:shade val="50000"/>
+            </a:schemeClr>
+          </a:lnRef>
+          <a:fillRef idx="1">
+            <a:schemeClr val="accent1"/>
+          </a:fillRef>
+          <a:effectRef idx="0">
+            <a:schemeClr val="accent1"/>
+          </a:effectRef>
+          <a:fontRef idx="minor">
+            <a:schemeClr val="lt1"/>
+          </a:fontRef>
+        </p:style>
+        <p:txBody>
+          <a:bodyPr rot="0" spcFirstLastPara="0" vertOverflow="overflow" horzOverflow="overflow" vert="horz" wrap="square" lIns="91440" tIns="45720" rIns="91440" bIns="45720" numCol="1" spcCol="0" rtlCol="0" fromWordArt="0" anchor="ctr" anchorCtr="0" forceAA="0" compatLnSpc="1">
+            <a:prstTxWarp prst="textNoShape">
+              <a:avLst/>
+            </a:prstTxWarp>
+            <a:noAutofit/>
+          </a:bodyPr>
+          <a:lstStyle/>
+          <a:p>
+            <a:pPr algn="ctr"/>
+            <a:endParaRPr lang="en-US" sz="3200">
+              <a:solidFill>
+                <a:schemeClr val="tx1"/>
+              </a:solidFill>
+            </a:endParaRPr>
+          </a:p>
+        </p:txBody>
+      </p:sp>
+      <p:cxnSp>
+        <p:nvCxnSpPr>
+          <p:cNvPr id="16" name="Straight Arrow Connector 15">
+            <a:extLst>
+              <a:ext uri="{FF2B5EF4-FFF2-40B4-BE49-F238E27FC236}">
+                <a16:creationId xmlns:a16="http://schemas.microsoft.com/office/drawing/2014/main" id="{4320CBB9-AD4C-4B9B-846B-1986EEBDC167}"/>
+              </a:ext>
+            </a:extLst>
+          </p:cNvPr>
+          <p:cNvCxnSpPr>
+            <a:cxnSpLocks/>
+          </p:cNvCxnSpPr>
+          <p:nvPr/>
+        </p:nvCxnSpPr>
+        <p:spPr>
+          <a:xfrm flipV="1">
+            <a:off x="2699658" y="3672114"/>
+            <a:ext cx="1465035" cy="624116"/>
+          </a:xfrm>
+          <a:prstGeom prst="straightConnector1">
+            <a:avLst/>
+          </a:prstGeom>
+          <a:ln w="38100">
+            <a:solidFill>
+              <a:schemeClr val="tx1"/>
+            </a:solidFill>
+            <a:tailEnd type="triangle"/>
+          </a:ln>
+        </p:spPr>
+        <p:style>
+          <a:lnRef idx="1">
+            <a:schemeClr val="accent1"/>
+          </a:lnRef>
+          <a:fillRef idx="0">
+            <a:schemeClr val="accent1"/>
+          </a:fillRef>
+          <a:effectRef idx="0">
+            <a:schemeClr val="accent1"/>
+          </a:effectRef>
+          <a:fontRef idx="minor">
+            <a:schemeClr val="tx1"/>
+          </a:fontRef>
+        </p:style>
+      </p:cxnSp>
+      <p:sp>
+        <p:nvSpPr>
+          <p:cNvPr id="10" name="TextBox 9">
+            <a:extLst>
+              <a:ext uri="{FF2B5EF4-FFF2-40B4-BE49-F238E27FC236}">
+                <a16:creationId xmlns:a16="http://schemas.microsoft.com/office/drawing/2014/main" id="{C44D9087-0A4F-4A93-9F5B-0CF4B1E4BCDE}"/>
+              </a:ext>
+            </a:extLst>
+          </p:cNvPr>
+          <p:cNvSpPr txBox="1"/>
+          <p:nvPr/>
+        </p:nvSpPr>
+        <p:spPr>
+          <a:xfrm>
+            <a:off x="2558070" y="3243944"/>
+            <a:ext cx="1407052" cy="646331"/>
+          </a:xfrm>
+          <a:prstGeom prst="rect">
+            <a:avLst/>
+          </a:prstGeom>
+          <a:noFill/>
+        </p:spPr>
+        <p:txBody>
+          <a:bodyPr wrap="none" rtlCol="0">
+            <a:spAutoFit/>
+          </a:bodyPr>
+          <a:lstStyle/>
+          <a:p>
+            <a:r>
+              <a:rPr lang="en-US" dirty="0"/>
+              <a:t>Converters</a:t>
+            </a:r>
+          </a:p>
+          <a:p>
+            <a:r>
+              <a:rPr lang="en-US" dirty="0"/>
+              <a:t>And Scrapers</a:t>
+            </a:r>
+          </a:p>
+        </p:txBody>
+      </p:sp>
+      <p:sp>
+        <p:nvSpPr>
+          <p:cNvPr id="17" name="Flowchart: Document 16">
+            <a:extLst>
+              <a:ext uri="{FF2B5EF4-FFF2-40B4-BE49-F238E27FC236}">
+                <a16:creationId xmlns:a16="http://schemas.microsoft.com/office/drawing/2014/main" id="{9D0D1EFD-40BA-4E0C-96A9-632F32B15C65}"/>
+              </a:ext>
+            </a:extLst>
+          </p:cNvPr>
+          <p:cNvSpPr/>
+          <p:nvPr/>
+        </p:nvSpPr>
+        <p:spPr>
+          <a:xfrm>
+            <a:off x="8837951" y="4162397"/>
+            <a:ext cx="1843494" cy="666691"/>
+          </a:xfrm>
+          <a:prstGeom prst="flowChartDocument">
+            <a:avLst/>
+          </a:prstGeom>
+          <a:solidFill>
+            <a:schemeClr val="bg1">
+              <a:lumMod val="85000"/>
+            </a:schemeClr>
+          </a:solidFill>
+          <a:ln>
+            <a:solidFill>
+              <a:schemeClr val="tx1">
+                <a:lumMod val="95000"/>
+                <a:lumOff val="5000"/>
+              </a:schemeClr>
+            </a:solidFill>
+          </a:ln>
+        </p:spPr>
+        <p:style>
+          <a:lnRef idx="2">
+            <a:schemeClr val="accent1">
+              <a:shade val="50000"/>
+            </a:schemeClr>
+          </a:lnRef>
+          <a:fillRef idx="1">
+            <a:schemeClr val="accent1"/>
+          </a:fillRef>
+          <a:effectRef idx="0">
+            <a:schemeClr val="accent1"/>
+          </a:effectRef>
+          <a:fontRef idx="minor">
+            <a:schemeClr val="lt1"/>
+          </a:fontRef>
+        </p:style>
+        <p:txBody>
+          <a:bodyPr rot="0" spcFirstLastPara="0" vertOverflow="overflow" horzOverflow="overflow" vert="horz" wrap="square" lIns="91440" tIns="45720" rIns="91440" bIns="45720" numCol="1" spcCol="0" rtlCol="0" fromWordArt="0" anchor="ctr" anchorCtr="0" forceAA="0" compatLnSpc="1">
+            <a:prstTxWarp prst="textNoShape">
+              <a:avLst/>
+            </a:prstTxWarp>
+            <a:noAutofit/>
+          </a:bodyPr>
+          <a:lstStyle/>
+          <a:p>
+            <a:pPr algn="ctr"/>
+            <a:r>
+              <a:rPr lang="en-US" sz="3200" dirty="0">
+                <a:solidFill>
+                  <a:schemeClr val="tx1"/>
+                </a:solidFill>
+              </a:rPr>
+              <a:t>RDF Files</a:t>
+            </a:r>
+          </a:p>
+        </p:txBody>
+      </p:sp>
+      <p:sp>
+        <p:nvSpPr>
+          <p:cNvPr id="18" name="TextBox 17">
+            <a:extLst>
+              <a:ext uri="{FF2B5EF4-FFF2-40B4-BE49-F238E27FC236}">
+                <a16:creationId xmlns:a16="http://schemas.microsoft.com/office/drawing/2014/main" id="{C62AD77D-10B5-4F7C-AA41-8F9CE676F8C4}"/>
+              </a:ext>
+            </a:extLst>
+          </p:cNvPr>
+          <p:cNvSpPr txBox="1"/>
+          <p:nvPr/>
+        </p:nvSpPr>
+        <p:spPr>
+          <a:xfrm>
+            <a:off x="1389745" y="5342037"/>
+            <a:ext cx="2908426" cy="646331"/>
+          </a:xfrm>
+          <a:prstGeom prst="rect">
+            <a:avLst/>
+          </a:prstGeom>
+          <a:noFill/>
+        </p:spPr>
+        <p:txBody>
+          <a:bodyPr wrap="square" rtlCol="0">
+            <a:spAutoFit/>
+          </a:bodyPr>
+          <a:lstStyle/>
+          <a:p>
+            <a:pPr algn="ctr"/>
+            <a:r>
+              <a:rPr lang="en-US" dirty="0"/>
+              <a:t>Web pages, Spreadsheets, Databases, etc. </a:t>
+            </a:r>
+          </a:p>
+        </p:txBody>
+      </p:sp>
+      <p:cxnSp>
+        <p:nvCxnSpPr>
+          <p:cNvPr id="19" name="Straight Arrow Connector 18">
+            <a:extLst>
+              <a:ext uri="{FF2B5EF4-FFF2-40B4-BE49-F238E27FC236}">
+                <a16:creationId xmlns:a16="http://schemas.microsoft.com/office/drawing/2014/main" id="{23F6C6DB-9CDE-4A12-94C2-BC57E850939C}"/>
+              </a:ext>
+            </a:extLst>
+          </p:cNvPr>
+          <p:cNvCxnSpPr>
+            <a:cxnSpLocks/>
+            <a:stCxn id="2" idx="4"/>
+            <a:endCxn id="17" idx="1"/>
+          </p:cNvCxnSpPr>
+          <p:nvPr/>
+        </p:nvCxnSpPr>
+        <p:spPr>
+          <a:xfrm>
+            <a:off x="7441293" y="3952875"/>
+            <a:ext cx="1396658" cy="542868"/>
+          </a:xfrm>
+          <a:prstGeom prst="straightConnector1">
+            <a:avLst/>
+          </a:prstGeom>
+          <a:ln w="38100">
+            <a:solidFill>
+              <a:schemeClr val="tx1"/>
+            </a:solidFill>
+            <a:headEnd type="triangle"/>
+            <a:tailEnd type="triangle"/>
+          </a:ln>
+        </p:spPr>
+        <p:style>
+          <a:lnRef idx="1">
+            <a:schemeClr val="accent1"/>
+          </a:lnRef>
+          <a:fillRef idx="0">
+            <a:schemeClr val="accent1"/>
+          </a:fillRef>
+          <a:effectRef idx="0">
+            <a:schemeClr val="accent1"/>
+          </a:effectRef>
+          <a:fontRef idx="minor">
+            <a:schemeClr val="tx1"/>
+          </a:fontRef>
+        </p:style>
+      </p:cxnSp>
+      <p:sp>
+        <p:nvSpPr>
+          <p:cNvPr id="22" name="TextBox 21">
+            <a:extLst>
+              <a:ext uri="{FF2B5EF4-FFF2-40B4-BE49-F238E27FC236}">
+                <a16:creationId xmlns:a16="http://schemas.microsoft.com/office/drawing/2014/main" id="{1F16BDD8-0D12-472E-BB90-AE1006AB02D2}"/>
+              </a:ext>
+            </a:extLst>
+          </p:cNvPr>
+          <p:cNvSpPr txBox="1"/>
+          <p:nvPr/>
+        </p:nvSpPr>
+        <p:spPr>
+          <a:xfrm>
+            <a:off x="7661514" y="3361195"/>
+            <a:ext cx="1037079" cy="646331"/>
+          </a:xfrm>
+          <a:prstGeom prst="rect">
+            <a:avLst/>
+          </a:prstGeom>
+          <a:noFill/>
+        </p:spPr>
+        <p:txBody>
+          <a:bodyPr wrap="none" rtlCol="0">
+            <a:spAutoFit/>
+          </a:bodyPr>
+          <a:lstStyle/>
+          <a:p>
+            <a:pPr algn="ctr"/>
+            <a:r>
+              <a:rPr lang="en-US" dirty="0"/>
+              <a:t>Parser / </a:t>
+            </a:r>
+          </a:p>
+          <a:p>
+            <a:pPr algn="ctr"/>
+            <a:r>
+              <a:rPr lang="en-US" dirty="0"/>
+              <a:t>Serializer</a:t>
+            </a:r>
+          </a:p>
+        </p:txBody>
+      </p:sp>
+    </p:spTree>
+    <p:extLst>
+      <p:ext uri="{BB962C8B-B14F-4D97-AF65-F5344CB8AC3E}">
+        <p14:creationId xmlns:p14="http://schemas.microsoft.com/office/powerpoint/2010/main" val="3552353889"/>
+      </p:ext>
+    </p:extLst>
+  </p:cSld>
+  <p:clrMapOvr>
+    <a:masterClrMapping/>
+  </p:clrMapOvr>
+</p:sld>
+</file>
+
+<file path=ppt/slides/slide16.xml><?xml version="1.0" encoding="utf-8"?>
 <p:sld xmlns:a="http://schemas.openxmlformats.org/drawingml/2006/main" xmlns:r="http://schemas.openxmlformats.org/officeDocument/2006/relationships" xmlns:p="http://schemas.openxmlformats.org/presentationml/2006/main">
   <p:cSld>
     <p:spTree>
@@ -13852,7 +14742,7 @@
 </p:sld>
 </file>
 
-<file path=ppt/slides/slide16.xml><?xml version="1.0" encoding="utf-8"?>
+<file path=ppt/slides/slide17.xml><?xml version="1.0" encoding="utf-8"?>
 <p:sld xmlns:a="http://schemas.openxmlformats.org/drawingml/2006/main" xmlns:r="http://schemas.openxmlformats.org/officeDocument/2006/relationships" xmlns:p="http://schemas.openxmlformats.org/presentationml/2006/main">
   <p:cSld>
     <p:spTree>

</xml_diff>